<commit_message>
0808 added final ppt presentation
</commit_message>
<xml_diff>
--- a/other/presentation.pptx
+++ b/other/presentation.pptx
@@ -15,11 +15,15 @@
     <p:sldId id="262" r:id="rId9"/>
     <p:sldId id="264" r:id="rId10"/>
     <p:sldId id="265" r:id="rId11"/>
-    <p:sldId id="266" r:id="rId12"/>
-    <p:sldId id="269" r:id="rId13"/>
-    <p:sldId id="263" r:id="rId14"/>
-    <p:sldId id="270" r:id="rId15"/>
-    <p:sldId id="257" r:id="rId16"/>
+    <p:sldId id="272" r:id="rId12"/>
+    <p:sldId id="266" r:id="rId13"/>
+    <p:sldId id="273" r:id="rId14"/>
+    <p:sldId id="274" r:id="rId15"/>
+    <p:sldId id="275" r:id="rId16"/>
+    <p:sldId id="269" r:id="rId17"/>
+    <p:sldId id="263" r:id="rId18"/>
+    <p:sldId id="270" r:id="rId19"/>
+    <p:sldId id="257" r:id="rId20"/>
   </p:sldIdLst>
   <p:sldSz cx="12192000" cy="6858000"/>
   <p:notesSz cx="6858000" cy="9144000"/>
@@ -8796,7 +8800,7 @@
           <a:p>
             <a:fld id="{9914EFB9-60E5-45AC-AB78-10D3AEFA680E}" type="datetimeFigureOut">
               <a:rPr lang="en-US" smtClean="0"/>
-              <a:t>8/6/2019</a:t>
+              <a:t>8/8/2019</a:t>
             </a:fld>
             <a:endParaRPr lang="en-US"/>
           </a:p>
@@ -9128,7 +9132,7 @@
           <a:p>
             <a:fld id="{9914EFB9-60E5-45AC-AB78-10D3AEFA680E}" type="datetimeFigureOut">
               <a:rPr lang="en-US" smtClean="0"/>
-              <a:t>8/6/2019</a:t>
+              <a:t>8/8/2019</a:t>
             </a:fld>
             <a:endParaRPr lang="en-US"/>
           </a:p>
@@ -9324,7 +9328,7 @@
           <a:p>
             <a:fld id="{9914EFB9-60E5-45AC-AB78-10D3AEFA680E}" type="datetimeFigureOut">
               <a:rPr lang="en-US" smtClean="0"/>
-              <a:t>8/6/2019</a:t>
+              <a:t>8/8/2019</a:t>
             </a:fld>
             <a:endParaRPr lang="en-US"/>
           </a:p>
@@ -9594,7 +9598,7 @@
           <a:p>
             <a:fld id="{9914EFB9-60E5-45AC-AB78-10D3AEFA680E}" type="datetimeFigureOut">
               <a:rPr lang="en-US" smtClean="0"/>
-              <a:t>8/6/2019</a:t>
+              <a:t>8/8/2019</a:t>
             </a:fld>
             <a:endParaRPr lang="en-US"/>
           </a:p>
@@ -10022,7 +10026,7 @@
           <a:p>
             <a:fld id="{9914EFB9-60E5-45AC-AB78-10D3AEFA680E}" type="datetimeFigureOut">
               <a:rPr lang="en-US" smtClean="0"/>
-              <a:t>8/6/2019</a:t>
+              <a:t>8/8/2019</a:t>
             </a:fld>
             <a:endParaRPr lang="en-US"/>
           </a:p>
@@ -10572,7 +10576,7 @@
           <a:p>
             <a:fld id="{9914EFB9-60E5-45AC-AB78-10D3AEFA680E}" type="datetimeFigureOut">
               <a:rPr lang="en-US" smtClean="0"/>
-              <a:t>8/6/2019</a:t>
+              <a:t>8/8/2019</a:t>
             </a:fld>
             <a:endParaRPr lang="en-US"/>
           </a:p>
@@ -11362,7 +11366,7 @@
           <a:p>
             <a:fld id="{9914EFB9-60E5-45AC-AB78-10D3AEFA680E}" type="datetimeFigureOut">
               <a:rPr lang="en-US" smtClean="0"/>
-              <a:t>8/6/2019</a:t>
+              <a:t>8/8/2019</a:t>
             </a:fld>
             <a:endParaRPr lang="en-US"/>
           </a:p>
@@ -11541,7 +11545,7 @@
           <a:p>
             <a:fld id="{9914EFB9-60E5-45AC-AB78-10D3AEFA680E}" type="datetimeFigureOut">
               <a:rPr lang="en-US" smtClean="0"/>
-              <a:t>8/6/2019</a:t>
+              <a:t>8/8/2019</a:t>
             </a:fld>
             <a:endParaRPr lang="en-US"/>
           </a:p>
@@ -11725,7 +11729,7 @@
           <a:p>
             <a:fld id="{9914EFB9-60E5-45AC-AB78-10D3AEFA680E}" type="datetimeFigureOut">
               <a:rPr lang="en-US" smtClean="0"/>
-              <a:t>8/6/2019</a:t>
+              <a:t>8/8/2019</a:t>
             </a:fld>
             <a:endParaRPr lang="en-US"/>
           </a:p>
@@ -12108,7 +12112,7 @@
           <a:p>
             <a:fld id="{9914EFB9-60E5-45AC-AB78-10D3AEFA680E}" type="datetimeFigureOut">
               <a:rPr lang="en-US" smtClean="0"/>
-              <a:t>8/6/2019</a:t>
+              <a:t>8/8/2019</a:t>
             </a:fld>
             <a:endParaRPr lang="en-US"/>
           </a:p>
@@ -12283,7 +12287,7 @@
           <a:p>
             <a:fld id="{9914EFB9-60E5-45AC-AB78-10D3AEFA680E}" type="datetimeFigureOut">
               <a:rPr lang="en-US" smtClean="0"/>
-              <a:t>8/6/2019</a:t>
+              <a:t>8/8/2019</a:t>
             </a:fld>
             <a:endParaRPr lang="en-US"/>
           </a:p>
@@ -12533,7 +12537,7 @@
           <a:p>
             <a:fld id="{9914EFB9-60E5-45AC-AB78-10D3AEFA680E}" type="datetimeFigureOut">
               <a:rPr lang="en-US" smtClean="0"/>
-              <a:t>8/6/2019</a:t>
+              <a:t>8/8/2019</a:t>
             </a:fld>
             <a:endParaRPr lang="en-US"/>
           </a:p>
@@ -12770,7 +12774,7 @@
           <a:p>
             <a:fld id="{9914EFB9-60E5-45AC-AB78-10D3AEFA680E}" type="datetimeFigureOut">
               <a:rPr lang="en-US" smtClean="0"/>
-              <a:t>8/6/2019</a:t>
+              <a:t>8/8/2019</a:t>
             </a:fld>
             <a:endParaRPr lang="en-US"/>
           </a:p>
@@ -13155,7 +13159,7 @@
           <a:p>
             <a:fld id="{9914EFB9-60E5-45AC-AB78-10D3AEFA680E}" type="datetimeFigureOut">
               <a:rPr lang="en-US" smtClean="0"/>
-              <a:t>8/6/2019</a:t>
+              <a:t>8/8/2019</a:t>
             </a:fld>
             <a:endParaRPr lang="en-US"/>
           </a:p>
@@ -13273,7 +13277,7 @@
           <a:p>
             <a:fld id="{9914EFB9-60E5-45AC-AB78-10D3AEFA680E}" type="datetimeFigureOut">
               <a:rPr lang="en-US" smtClean="0"/>
-              <a:t>8/6/2019</a:t>
+              <a:t>8/8/2019</a:t>
             </a:fld>
             <a:endParaRPr lang="en-US"/>
           </a:p>
@@ -13368,7 +13372,7 @@
           <a:p>
             <a:fld id="{9914EFB9-60E5-45AC-AB78-10D3AEFA680E}" type="datetimeFigureOut">
               <a:rPr lang="en-US" smtClean="0"/>
-              <a:t>8/6/2019</a:t>
+              <a:t>8/8/2019</a:t>
             </a:fld>
             <a:endParaRPr lang="en-US"/>
           </a:p>
@@ -13621,7 +13625,7 @@
           <a:p>
             <a:fld id="{9914EFB9-60E5-45AC-AB78-10D3AEFA680E}" type="datetimeFigureOut">
               <a:rPr lang="en-US" smtClean="0"/>
-              <a:t>8/6/2019</a:t>
+              <a:t>8/8/2019</a:t>
             </a:fld>
             <a:endParaRPr lang="en-US"/>
           </a:p>
@@ -13890,7 +13894,7 @@
           <a:p>
             <a:fld id="{9914EFB9-60E5-45AC-AB78-10D3AEFA680E}" type="datetimeFigureOut">
               <a:rPr lang="en-US" smtClean="0"/>
-              <a:t>8/6/2019</a:t>
+              <a:t>8/8/2019</a:t>
             </a:fld>
             <a:endParaRPr lang="en-US"/>
           </a:p>
@@ -14293,7 +14297,7 @@
           <a:p>
             <a:fld id="{9914EFB9-60E5-45AC-AB78-10D3AEFA680E}" type="datetimeFigureOut">
               <a:rPr lang="en-US" smtClean="0"/>
-              <a:t>8/6/2019</a:t>
+              <a:t>8/8/2019</a:t>
             </a:fld>
             <a:endParaRPr lang="en-US"/>
           </a:p>
@@ -14757,7 +14761,6 @@
                 <a:lumMod val="106000"/>
               </a:schemeClr>
             </a:duotone>
-            <a:extLst/>
           </a:blip>
           <a:stretch/>
         </a:blipFill>
@@ -15688,7 +15691,6 @@
                 <a:lumMod val="106000"/>
               </a:schemeClr>
             </a:duotone>
-            <a:extLst/>
           </a:blip>
           <a:stretch/>
         </a:blipFill>
@@ -16673,6 +16675,130 @@
   <p:clrMapOvr>
     <a:masterClrMapping/>
   </p:clrMapOvr>
+  <p:timing>
+    <p:tnLst>
+      <p:par>
+        <p:cTn id="1" dur="indefinite" restart="never" nodeType="tmRoot">
+          <p:childTnLst>
+            <p:seq concurrent="1" nextAc="seek">
+              <p:cTn id="2" dur="indefinite" nodeType="mainSeq">
+                <p:childTnLst>
+                  <p:par>
+                    <p:cTn id="3" fill="hold">
+                      <p:stCondLst>
+                        <p:cond delay="indefinite"/>
+                        <p:cond evt="onBegin" delay="0">
+                          <p:tn val="2"/>
+                        </p:cond>
+                      </p:stCondLst>
+                      <p:childTnLst>
+                        <p:par>
+                          <p:cTn id="4" fill="hold">
+                            <p:stCondLst>
+                              <p:cond delay="0"/>
+                            </p:stCondLst>
+                            <p:childTnLst>
+                              <p:par>
+                                <p:cTn id="5" presetID="2" presetClass="entr" presetSubtype="4" fill="hold" nodeType="afterEffect">
+                                  <p:stCondLst>
+                                    <p:cond delay="0"/>
+                                  </p:stCondLst>
+                                  <p:childTnLst>
+                                    <p:set>
+                                      <p:cBhvr>
+                                        <p:cTn id="6" dur="1" fill="hold">
+                                          <p:stCondLst>
+                                            <p:cond delay="0"/>
+                                          </p:stCondLst>
+                                        </p:cTn>
+                                        <p:tgtEl>
+                                          <p:spTgt spid="3"/>
+                                        </p:tgtEl>
+                                        <p:attrNameLst>
+                                          <p:attrName>style.visibility</p:attrName>
+                                        </p:attrNameLst>
+                                      </p:cBhvr>
+                                      <p:to>
+                                        <p:strVal val="visible"/>
+                                      </p:to>
+                                    </p:set>
+                                    <p:anim calcmode="lin" valueType="num">
+                                      <p:cBhvr additive="base">
+                                        <p:cTn id="7" dur="1500" fill="hold"/>
+                                        <p:tgtEl>
+                                          <p:spTgt spid="3"/>
+                                        </p:tgtEl>
+                                        <p:attrNameLst>
+                                          <p:attrName>ppt_x</p:attrName>
+                                        </p:attrNameLst>
+                                      </p:cBhvr>
+                                      <p:tavLst>
+                                        <p:tav tm="0">
+                                          <p:val>
+                                            <p:strVal val="#ppt_x"/>
+                                          </p:val>
+                                        </p:tav>
+                                        <p:tav tm="100000">
+                                          <p:val>
+                                            <p:strVal val="#ppt_x"/>
+                                          </p:val>
+                                        </p:tav>
+                                      </p:tavLst>
+                                    </p:anim>
+                                    <p:anim calcmode="lin" valueType="num">
+                                      <p:cBhvr additive="base">
+                                        <p:cTn id="8" dur="1500" fill="hold"/>
+                                        <p:tgtEl>
+                                          <p:spTgt spid="3"/>
+                                        </p:tgtEl>
+                                        <p:attrNameLst>
+                                          <p:attrName>ppt_y</p:attrName>
+                                        </p:attrNameLst>
+                                      </p:cBhvr>
+                                      <p:tavLst>
+                                        <p:tav tm="0">
+                                          <p:val>
+                                            <p:strVal val="1+#ppt_h/2"/>
+                                          </p:val>
+                                        </p:tav>
+                                        <p:tav tm="100000">
+                                          <p:val>
+                                            <p:strVal val="#ppt_y"/>
+                                          </p:val>
+                                        </p:tav>
+                                      </p:tavLst>
+                                    </p:anim>
+                                  </p:childTnLst>
+                                </p:cTn>
+                              </p:par>
+                            </p:childTnLst>
+                          </p:cTn>
+                        </p:par>
+                      </p:childTnLst>
+                    </p:cTn>
+                  </p:par>
+                </p:childTnLst>
+              </p:cTn>
+              <p:prevCondLst>
+                <p:cond evt="onPrev" delay="0">
+                  <p:tgtEl>
+                    <p:sldTgt/>
+                  </p:tgtEl>
+                </p:cond>
+              </p:prevCondLst>
+              <p:nextCondLst>
+                <p:cond evt="onNext" delay="0">
+                  <p:tgtEl>
+                    <p:sldTgt/>
+                  </p:tgtEl>
+                </p:cond>
+              </p:nextCondLst>
+            </p:seq>
+          </p:childTnLst>
+        </p:cTn>
+      </p:par>
+    </p:tnLst>
+  </p:timing>
 </p:sld>
 </file>
 
@@ -16743,15 +16869,20 @@
           <p:nvPr/>
         </p:nvPicPr>
         <p:blipFill>
-          <a:blip r:embed="rId2"/>
-          <a:stretch>
-            <a:fillRect/>
-          </a:stretch>
+          <a:blip r:embed="rId2">
+            <a:extLst>
+              <a:ext uri="{28A0092B-C50C-407E-A947-70E740481C1C}">
+                <a14:useLocalDpi xmlns:a14="http://schemas.microsoft.com/office/drawing/2010/main" val="0"/>
+              </a:ext>
+            </a:extLst>
+          </a:blip>
+          <a:srcRect/>
+          <a:stretch/>
         </p:blipFill>
         <p:spPr>
           <a:xfrm>
-            <a:off x="6400802" y="1854199"/>
-            <a:ext cx="4859683" cy="3072118"/>
+            <a:off x="6400801" y="2087889"/>
+            <a:ext cx="5118019" cy="2743200"/>
           </a:xfrm>
           <a:prstGeom prst="round2DiagRect">
             <a:avLst>
@@ -16789,7 +16920,7 @@
         <p:spPr>
           <a:xfrm>
             <a:off x="7549550" y="5195911"/>
-            <a:ext cx="2783326" cy="338554"/>
+            <a:ext cx="1463157" cy="338554"/>
           </a:xfrm>
           <a:prstGeom prst="rect">
             <a:avLst/>
@@ -16803,7 +16934,7 @@
           <a:p>
             <a:r>
               <a:rPr lang="en-US" sz="1600" dirty="0"/>
-              <a:t>Smoothing method (red line)</a:t>
+              <a:t>Initial forecast</a:t>
             </a:r>
           </a:p>
         </p:txBody>
@@ -16823,15 +16954,20 @@
           <p:nvPr/>
         </p:nvPicPr>
         <p:blipFill>
-          <a:blip r:embed="rId3"/>
-          <a:stretch>
-            <a:fillRect/>
-          </a:stretch>
+          <a:blip r:embed="rId3">
+            <a:extLst>
+              <a:ext uri="{28A0092B-C50C-407E-A947-70E740481C1C}">
+                <a14:useLocalDpi xmlns:a14="http://schemas.microsoft.com/office/drawing/2010/main" val="0"/>
+              </a:ext>
+            </a:extLst>
+          </a:blip>
+          <a:srcRect/>
+          <a:stretch/>
         </p:blipFill>
         <p:spPr>
           <a:xfrm>
-            <a:off x="493044" y="1805764"/>
-            <a:ext cx="4859684" cy="3186179"/>
+            <a:off x="493044" y="1862794"/>
+            <a:ext cx="4859684" cy="3072118"/>
           </a:xfrm>
           <a:prstGeom prst="round2DiagRect">
             <a:avLst>
@@ -16869,7 +17005,7 @@
         <p:spPr>
           <a:xfrm>
             <a:off x="1984971" y="5201699"/>
-            <a:ext cx="1698029" cy="338554"/>
+            <a:ext cx="2783326" cy="338554"/>
           </a:xfrm>
           <a:prstGeom prst="rect">
             <a:avLst/>
@@ -16883,8 +17019,515 @@
           <a:p>
             <a:r>
               <a:rPr lang="en-US" sz="1600" dirty="0"/>
-              <a:t>With seasonality</a:t>
+              <a:t>Smoothing method (red line)</a:t>
             </a:r>
+          </a:p>
+        </p:txBody>
+      </p:sp>
+      <p:pic>
+        <p:nvPicPr>
+          <p:cNvPr id="8" name="Picture 10" descr="http://www.rstudio.com/wp-content/uploads/2014/06/RStudio-Ball.png">
+            <a:extLst>
+              <a:ext uri="{FF2B5EF4-FFF2-40B4-BE49-F238E27FC236}">
+                <a16:creationId xmlns:a16="http://schemas.microsoft.com/office/drawing/2014/main" id="{2BD26815-E378-4A32-9571-7F5E8F4F2232}"/>
+              </a:ext>
+            </a:extLst>
+          </p:cNvPr>
+          <p:cNvPicPr>
+            <a:picLocks noChangeAspect="1" noChangeArrowheads="1"/>
+          </p:cNvPicPr>
+          <p:nvPr/>
+        </p:nvPicPr>
+        <p:blipFill>
+          <a:blip r:embed="rId4">
+            <a:extLst>
+              <a:ext uri="{28A0092B-C50C-407E-A947-70E740481C1C}">
+                <a14:useLocalDpi xmlns:a14="http://schemas.microsoft.com/office/drawing/2010/main" val="0"/>
+              </a:ext>
+            </a:extLst>
+          </a:blip>
+          <a:srcRect/>
+          <a:stretch>
+            <a:fillRect/>
+          </a:stretch>
+        </p:blipFill>
+        <p:spPr bwMode="auto">
+          <a:xfrm>
+            <a:off x="11429764" y="69314"/>
+            <a:ext cx="450954" cy="450954"/>
+          </a:xfrm>
+          <a:prstGeom prst="rect">
+            <a:avLst/>
+          </a:prstGeom>
+          <a:noFill/>
+          <a:extLst>
+            <a:ext uri="{909E8E84-426E-40DD-AFC4-6F175D3DCCD1}">
+              <a14:hiddenFill xmlns:a14="http://schemas.microsoft.com/office/drawing/2010/main">
+                <a:solidFill>
+                  <a:srgbClr val="FFFFFF"/>
+                </a:solidFill>
+              </a14:hiddenFill>
+            </a:ext>
+          </a:extLst>
+        </p:spPr>
+      </p:pic>
+    </p:spTree>
+    <p:extLst>
+      <p:ext uri="{BB962C8B-B14F-4D97-AF65-F5344CB8AC3E}">
+        <p14:creationId xmlns:p14="http://schemas.microsoft.com/office/powerpoint/2010/main" val="1727593191"/>
+      </p:ext>
+    </p:extLst>
+  </p:cSld>
+  <p:clrMapOvr>
+    <a:masterClrMapping/>
+  </p:clrMapOvr>
+  <p:timing>
+    <p:tnLst>
+      <p:par>
+        <p:cTn id="1" dur="indefinite" restart="never" nodeType="tmRoot">
+          <p:childTnLst>
+            <p:seq concurrent="1" nextAc="seek">
+              <p:cTn id="2" dur="indefinite" nodeType="mainSeq">
+                <p:childTnLst>
+                  <p:par>
+                    <p:cTn id="3" fill="hold">
+                      <p:stCondLst>
+                        <p:cond delay="indefinite"/>
+                        <p:cond evt="onBegin" delay="0">
+                          <p:tn val="2"/>
+                        </p:cond>
+                      </p:stCondLst>
+                      <p:childTnLst>
+                        <p:par>
+                          <p:cTn id="4" fill="hold">
+                            <p:stCondLst>
+                              <p:cond delay="0"/>
+                            </p:stCondLst>
+                            <p:childTnLst>
+                              <p:par>
+                                <p:cTn id="5" presetID="10" presetClass="entr" presetSubtype="0" fill="hold" nodeType="afterEffect">
+                                  <p:stCondLst>
+                                    <p:cond delay="0"/>
+                                  </p:stCondLst>
+                                  <p:childTnLst>
+                                    <p:set>
+                                      <p:cBhvr>
+                                        <p:cTn id="6" dur="1" fill="hold">
+                                          <p:stCondLst>
+                                            <p:cond delay="0"/>
+                                          </p:stCondLst>
+                                        </p:cTn>
+                                        <p:tgtEl>
+                                          <p:spTgt spid="6"/>
+                                        </p:tgtEl>
+                                        <p:attrNameLst>
+                                          <p:attrName>style.visibility</p:attrName>
+                                        </p:attrNameLst>
+                                      </p:cBhvr>
+                                      <p:to>
+                                        <p:strVal val="visible"/>
+                                      </p:to>
+                                    </p:set>
+                                    <p:animEffect transition="in" filter="fade">
+                                      <p:cBhvr>
+                                        <p:cTn id="7" dur="1000"/>
+                                        <p:tgtEl>
+                                          <p:spTgt spid="6"/>
+                                        </p:tgtEl>
+                                      </p:cBhvr>
+                                    </p:animEffect>
+                                  </p:childTnLst>
+                                </p:cTn>
+                              </p:par>
+                            </p:childTnLst>
+                          </p:cTn>
+                        </p:par>
+                        <p:par>
+                          <p:cTn id="8" fill="hold">
+                            <p:stCondLst>
+                              <p:cond delay="1000"/>
+                            </p:stCondLst>
+                            <p:childTnLst>
+                              <p:par>
+                                <p:cTn id="9" presetID="10" presetClass="entr" presetSubtype="0" fill="hold" grpId="0" nodeType="afterEffect">
+                                  <p:stCondLst>
+                                    <p:cond delay="0"/>
+                                  </p:stCondLst>
+                                  <p:childTnLst>
+                                    <p:set>
+                                      <p:cBhvr>
+                                        <p:cTn id="10" dur="1" fill="hold">
+                                          <p:stCondLst>
+                                            <p:cond delay="0"/>
+                                          </p:stCondLst>
+                                        </p:cTn>
+                                        <p:tgtEl>
+                                          <p:spTgt spid="7"/>
+                                        </p:tgtEl>
+                                        <p:attrNameLst>
+                                          <p:attrName>style.visibility</p:attrName>
+                                        </p:attrNameLst>
+                                      </p:cBhvr>
+                                      <p:to>
+                                        <p:strVal val="visible"/>
+                                      </p:to>
+                                    </p:set>
+                                    <p:animEffect transition="in" filter="fade">
+                                      <p:cBhvr>
+                                        <p:cTn id="11" dur="500"/>
+                                        <p:tgtEl>
+                                          <p:spTgt spid="7"/>
+                                        </p:tgtEl>
+                                      </p:cBhvr>
+                                    </p:animEffect>
+                                  </p:childTnLst>
+                                </p:cTn>
+                              </p:par>
+                            </p:childTnLst>
+                          </p:cTn>
+                        </p:par>
+                        <p:par>
+                          <p:cTn id="12" fill="hold">
+                            <p:stCondLst>
+                              <p:cond delay="1500"/>
+                            </p:stCondLst>
+                            <p:childTnLst>
+                              <p:par>
+                                <p:cTn id="13" presetID="10" presetClass="entr" presetSubtype="0" fill="hold" nodeType="afterEffect">
+                                  <p:stCondLst>
+                                    <p:cond delay="500"/>
+                                  </p:stCondLst>
+                                  <p:childTnLst>
+                                    <p:set>
+                                      <p:cBhvr>
+                                        <p:cTn id="14" dur="1" fill="hold">
+                                          <p:stCondLst>
+                                            <p:cond delay="0"/>
+                                          </p:stCondLst>
+                                        </p:cTn>
+                                        <p:tgtEl>
+                                          <p:spTgt spid="4"/>
+                                        </p:tgtEl>
+                                        <p:attrNameLst>
+                                          <p:attrName>style.visibility</p:attrName>
+                                        </p:attrNameLst>
+                                      </p:cBhvr>
+                                      <p:to>
+                                        <p:strVal val="visible"/>
+                                      </p:to>
+                                    </p:set>
+                                    <p:animEffect transition="in" filter="fade">
+                                      <p:cBhvr>
+                                        <p:cTn id="15" dur="1000"/>
+                                        <p:tgtEl>
+                                          <p:spTgt spid="4"/>
+                                        </p:tgtEl>
+                                      </p:cBhvr>
+                                    </p:animEffect>
+                                  </p:childTnLst>
+                                </p:cTn>
+                              </p:par>
+                            </p:childTnLst>
+                          </p:cTn>
+                        </p:par>
+                        <p:par>
+                          <p:cTn id="16" fill="hold">
+                            <p:stCondLst>
+                              <p:cond delay="3000"/>
+                            </p:stCondLst>
+                            <p:childTnLst>
+                              <p:par>
+                                <p:cTn id="17" presetID="10" presetClass="entr" presetSubtype="0" fill="hold" grpId="0" nodeType="afterEffect">
+                                  <p:stCondLst>
+                                    <p:cond delay="0"/>
+                                  </p:stCondLst>
+                                  <p:childTnLst>
+                                    <p:set>
+                                      <p:cBhvr>
+                                        <p:cTn id="18" dur="1" fill="hold">
+                                          <p:stCondLst>
+                                            <p:cond delay="0"/>
+                                          </p:stCondLst>
+                                        </p:cTn>
+                                        <p:tgtEl>
+                                          <p:spTgt spid="5"/>
+                                        </p:tgtEl>
+                                        <p:attrNameLst>
+                                          <p:attrName>style.visibility</p:attrName>
+                                        </p:attrNameLst>
+                                      </p:cBhvr>
+                                      <p:to>
+                                        <p:strVal val="visible"/>
+                                      </p:to>
+                                    </p:set>
+                                    <p:animEffect transition="in" filter="fade">
+                                      <p:cBhvr>
+                                        <p:cTn id="19" dur="500"/>
+                                        <p:tgtEl>
+                                          <p:spTgt spid="5"/>
+                                        </p:tgtEl>
+                                      </p:cBhvr>
+                                    </p:animEffect>
+                                  </p:childTnLst>
+                                </p:cTn>
+                              </p:par>
+                            </p:childTnLst>
+                          </p:cTn>
+                        </p:par>
+                      </p:childTnLst>
+                    </p:cTn>
+                  </p:par>
+                </p:childTnLst>
+              </p:cTn>
+              <p:prevCondLst>
+                <p:cond evt="onPrev" delay="0">
+                  <p:tgtEl>
+                    <p:sldTgt/>
+                  </p:tgtEl>
+                </p:cond>
+              </p:prevCondLst>
+              <p:nextCondLst>
+                <p:cond evt="onNext" delay="0">
+                  <p:tgtEl>
+                    <p:sldTgt/>
+                  </p:tgtEl>
+                </p:cond>
+              </p:nextCondLst>
+            </p:seq>
+          </p:childTnLst>
+        </p:cTn>
+      </p:par>
+    </p:tnLst>
+    <p:bldLst>
+      <p:bldP spid="5" grpId="0"/>
+      <p:bldP spid="7" grpId="0"/>
+    </p:bldLst>
+  </p:timing>
+</p:sld>
+</file>
+
+<file path=ppt/slides/slide12.xml><?xml version="1.0" encoding="utf-8"?>
+<p:sld xmlns:a="http://schemas.openxmlformats.org/drawingml/2006/main" xmlns:r="http://schemas.openxmlformats.org/officeDocument/2006/relationships" xmlns:p="http://schemas.openxmlformats.org/presentationml/2006/main">
+  <p:cSld>
+    <p:spTree>
+      <p:nvGrpSpPr>
+        <p:cNvPr id="1" name=""/>
+        <p:cNvGrpSpPr/>
+        <p:nvPr/>
+      </p:nvGrpSpPr>
+      <p:grpSpPr>
+        <a:xfrm>
+          <a:off x="0" y="0"/>
+          <a:ext cx="0" cy="0"/>
+          <a:chOff x="0" y="0"/>
+          <a:chExt cx="0" cy="0"/>
+        </a:xfrm>
+      </p:grpSpPr>
+      <p:sp>
+        <p:nvSpPr>
+          <p:cNvPr id="2" name="Title 1">
+            <a:extLst>
+              <a:ext uri="{FF2B5EF4-FFF2-40B4-BE49-F238E27FC236}">
+                <a16:creationId xmlns:a16="http://schemas.microsoft.com/office/drawing/2014/main" id="{5761C009-2BEA-46C9-9FFB-27075863405C}"/>
+              </a:ext>
+            </a:extLst>
+          </p:cNvPr>
+          <p:cNvSpPr>
+            <a:spLocks noGrp="1"/>
+          </p:cNvSpPr>
+          <p:nvPr>
+            <p:ph type="title"/>
+          </p:nvPr>
+        </p:nvSpPr>
+        <p:spPr/>
+        <p:txBody>
+          <a:bodyPr>
+            <a:noAutofit/>
+          </a:bodyPr>
+          <a:lstStyle/>
+          <a:p>
+            <a:r>
+              <a:rPr lang="en-US" sz="4000" dirty="0"/>
+              <a:t>R - forecast using Holt-Winters </a:t>
+            </a:r>
+            <a:r>
+              <a:rPr lang="en-US" sz="4000" dirty="0" err="1"/>
+              <a:t>methoD</a:t>
+            </a:r>
+            <a:endParaRPr lang="en-US" sz="4000" dirty="0"/>
+          </a:p>
+        </p:txBody>
+      </p:sp>
+      <p:pic>
+        <p:nvPicPr>
+          <p:cNvPr id="4" name="Picture 3">
+            <a:extLst>
+              <a:ext uri="{FF2B5EF4-FFF2-40B4-BE49-F238E27FC236}">
+                <a16:creationId xmlns:a16="http://schemas.microsoft.com/office/drawing/2014/main" id="{87D77F2C-FE83-4C10-8AB4-17882438F2A6}"/>
+              </a:ext>
+            </a:extLst>
+          </p:cNvPr>
+          <p:cNvPicPr>
+            <a:picLocks noChangeAspect="1"/>
+          </p:cNvPicPr>
+          <p:nvPr/>
+        </p:nvPicPr>
+        <p:blipFill>
+          <a:blip r:embed="rId2">
+            <a:extLst>
+              <a:ext uri="{28A0092B-C50C-407E-A947-70E740481C1C}">
+                <a14:useLocalDpi xmlns:a14="http://schemas.microsoft.com/office/drawing/2010/main" val="0"/>
+              </a:ext>
+            </a:extLst>
+          </a:blip>
+          <a:srcRect/>
+          <a:stretch/>
+        </p:blipFill>
+        <p:spPr>
+          <a:xfrm>
+            <a:off x="6487787" y="1854199"/>
+            <a:ext cx="4685713" cy="3072118"/>
+          </a:xfrm>
+          <a:prstGeom prst="round2DiagRect">
+            <a:avLst>
+              <a:gd name="adj1" fmla="val 16667"/>
+              <a:gd name="adj2" fmla="val 0"/>
+            </a:avLst>
+          </a:prstGeom>
+          <a:ln w="88900" cap="sq">
+            <a:solidFill>
+              <a:srgbClr val="FFFFFF"/>
+            </a:solidFill>
+            <a:miter lim="800000"/>
+          </a:ln>
+          <a:effectLst>
+            <a:outerShdw blurRad="254000" algn="tl" rotWithShape="0">
+              <a:srgbClr val="000000">
+                <a:alpha val="43000"/>
+              </a:srgbClr>
+            </a:outerShdw>
+          </a:effectLst>
+        </p:spPr>
+      </p:pic>
+      <p:sp>
+        <p:nvSpPr>
+          <p:cNvPr id="5" name="Rectangle 4">
+            <a:extLst>
+              <a:ext uri="{FF2B5EF4-FFF2-40B4-BE49-F238E27FC236}">
+                <a16:creationId xmlns:a16="http://schemas.microsoft.com/office/drawing/2014/main" id="{749792BA-D25E-4CCD-9C32-26FA714BFE11}"/>
+              </a:ext>
+            </a:extLst>
+          </p:cNvPr>
+          <p:cNvSpPr/>
+          <p:nvPr/>
+        </p:nvSpPr>
+        <p:spPr>
+          <a:xfrm>
+            <a:off x="8137984" y="5159365"/>
+            <a:ext cx="1691745" cy="338554"/>
+          </a:xfrm>
+          <a:prstGeom prst="rect">
+            <a:avLst/>
+          </a:prstGeom>
+        </p:spPr>
+        <p:txBody>
+          <a:bodyPr wrap="none">
+            <a:spAutoFit/>
+          </a:bodyPr>
+          <a:lstStyle/>
+          <a:p>
+            <a:r>
+              <a:rPr lang="en-US" sz="1600" dirty="0"/>
+              <a:t>Updated forecast</a:t>
+            </a:r>
+          </a:p>
+        </p:txBody>
+      </p:sp>
+      <p:pic>
+        <p:nvPicPr>
+          <p:cNvPr id="6" name="Picture 5">
+            <a:extLst>
+              <a:ext uri="{FF2B5EF4-FFF2-40B4-BE49-F238E27FC236}">
+                <a16:creationId xmlns:a16="http://schemas.microsoft.com/office/drawing/2014/main" id="{1790B05D-337B-4DFD-8AE3-178D57EAA899}"/>
+              </a:ext>
+            </a:extLst>
+          </p:cNvPr>
+          <p:cNvPicPr>
+            <a:picLocks noChangeAspect="1"/>
+          </p:cNvPicPr>
+          <p:nvPr/>
+        </p:nvPicPr>
+        <p:blipFill>
+          <a:blip r:embed="rId3">
+            <a:extLst>
+              <a:ext uri="{28A0092B-C50C-407E-A947-70E740481C1C}">
+                <a14:useLocalDpi xmlns:a14="http://schemas.microsoft.com/office/drawing/2010/main" val="0"/>
+              </a:ext>
+            </a:extLst>
+          </a:blip>
+          <a:srcRect/>
+          <a:stretch/>
+        </p:blipFill>
+        <p:spPr>
+          <a:xfrm>
+            <a:off x="511037" y="1805764"/>
+            <a:ext cx="4823697" cy="3186179"/>
+          </a:xfrm>
+          <a:prstGeom prst="round2DiagRect">
+            <a:avLst>
+              <a:gd name="adj1" fmla="val 16667"/>
+              <a:gd name="adj2" fmla="val 0"/>
+            </a:avLst>
+          </a:prstGeom>
+          <a:ln w="88900" cap="sq">
+            <a:solidFill>
+              <a:srgbClr val="FFFFFF"/>
+            </a:solidFill>
+            <a:miter lim="800000"/>
+          </a:ln>
+          <a:effectLst>
+            <a:outerShdw blurRad="254000" algn="tl" rotWithShape="0">
+              <a:srgbClr val="000000">
+                <a:alpha val="43000"/>
+              </a:srgbClr>
+            </a:outerShdw>
+          </a:effectLst>
+        </p:spPr>
+      </p:pic>
+      <p:sp>
+        <p:nvSpPr>
+          <p:cNvPr id="7" name="Rectangle 6">
+            <a:extLst>
+              <a:ext uri="{FF2B5EF4-FFF2-40B4-BE49-F238E27FC236}">
+                <a16:creationId xmlns:a16="http://schemas.microsoft.com/office/drawing/2014/main" id="{C74A6CD3-97C8-4008-B7EA-FC98927605E8}"/>
+              </a:ext>
+            </a:extLst>
+          </p:cNvPr>
+          <p:cNvSpPr/>
+          <p:nvPr/>
+        </p:nvSpPr>
+        <p:spPr>
+          <a:xfrm>
+            <a:off x="1235671" y="5159365"/>
+            <a:ext cx="3502434" cy="584775"/>
+          </a:xfrm>
+          <a:prstGeom prst="rect">
+            <a:avLst/>
+          </a:prstGeom>
+        </p:spPr>
+        <p:txBody>
+          <a:bodyPr wrap="none">
+            <a:spAutoFit/>
+          </a:bodyPr>
+          <a:lstStyle/>
+          <a:p>
+            <a:r>
+              <a:rPr lang="en-US" sz="1600" dirty="0"/>
+              <a:t>Smoothing method with seasonality</a:t>
+            </a:r>
+          </a:p>
+          <a:p>
+            <a:endParaRPr lang="en-US" sz="1600" dirty="0"/>
           </a:p>
         </p:txBody>
       </p:sp>
@@ -17170,7 +17813,7 @@
 </p:sld>
 </file>
 
-<file path=ppt/slides/slide12.xml><?xml version="1.0" encoding="utf-8"?>
+<file path=ppt/slides/slide13.xml><?xml version="1.0" encoding="utf-8"?>
 <p:sld xmlns:a="http://schemas.openxmlformats.org/drawingml/2006/main" xmlns:r="http://schemas.openxmlformats.org/officeDocument/2006/relationships" xmlns:p="http://schemas.openxmlformats.org/presentationml/2006/main">
   <p:cSld>
     <p:spTree>
@@ -17189,10 +17832,10 @@
       </p:grpSpPr>
       <p:sp>
         <p:nvSpPr>
-          <p:cNvPr id="6" name="Title 5">
+          <p:cNvPr id="2" name="Title 1">
             <a:extLst>
               <a:ext uri="{FF2B5EF4-FFF2-40B4-BE49-F238E27FC236}">
-                <a16:creationId xmlns:a16="http://schemas.microsoft.com/office/drawing/2014/main" id="{605F00E5-FCA4-481E-856C-1DF535DD2029}"/>
+                <a16:creationId xmlns:a16="http://schemas.microsoft.com/office/drawing/2014/main" id="{5761C009-2BEA-46C9-9FFB-27075863405C}"/>
               </a:ext>
             </a:extLst>
           </p:cNvPr>
@@ -17206,31 +17849,500 @@
         <p:spPr/>
         <p:txBody>
           <a:bodyPr>
-            <a:normAutofit fontScale="90000"/>
+            <a:noAutofit/>
           </a:bodyPr>
           <a:lstStyle/>
           <a:p>
             <a:r>
-              <a:rPr lang="en-US" dirty="0"/>
-              <a:t>Can we Forecast Alcohol Sales in </a:t>
+              <a:rPr lang="en-US" sz="4000" dirty="0"/>
+              <a:t>R - forecast using Holt-Winters </a:t>
             </a:r>
             <a:r>
-              <a:rPr lang="en-US" dirty="0" err="1"/>
-              <a:t>IowA</a:t>
+              <a:rPr lang="en-US" sz="4000" dirty="0" err="1"/>
+              <a:t>methoD</a:t>
             </a:r>
+            <a:endParaRPr lang="en-US" sz="4000" dirty="0"/>
+          </a:p>
+        </p:txBody>
+      </p:sp>
+      <p:pic>
+        <p:nvPicPr>
+          <p:cNvPr id="4" name="Picture 3">
+            <a:extLst>
+              <a:ext uri="{FF2B5EF4-FFF2-40B4-BE49-F238E27FC236}">
+                <a16:creationId xmlns:a16="http://schemas.microsoft.com/office/drawing/2014/main" id="{87D77F2C-FE83-4C10-8AB4-17882438F2A6}"/>
+              </a:ext>
+            </a:extLst>
+          </p:cNvPr>
+          <p:cNvPicPr>
+            <a:picLocks noChangeAspect="1"/>
+          </p:cNvPicPr>
+          <p:nvPr/>
+        </p:nvPicPr>
+        <p:blipFill>
+          <a:blip r:embed="rId2">
+            <a:extLst>
+              <a:ext uri="{28A0092B-C50C-407E-A947-70E740481C1C}">
+                <a14:useLocalDpi xmlns:a14="http://schemas.microsoft.com/office/drawing/2010/main" val="0"/>
+              </a:ext>
+            </a:extLst>
+          </a:blip>
+          <a:srcRect/>
+          <a:stretch/>
+        </p:blipFill>
+        <p:spPr>
+          <a:xfrm>
+            <a:off x="5874413" y="1971432"/>
+            <a:ext cx="5472651" cy="2854841"/>
+          </a:xfrm>
+          <a:prstGeom prst="round2DiagRect">
+            <a:avLst>
+              <a:gd name="adj1" fmla="val 16667"/>
+              <a:gd name="adj2" fmla="val 0"/>
+            </a:avLst>
+          </a:prstGeom>
+          <a:ln w="88900" cap="sq">
+            <a:solidFill>
+              <a:srgbClr val="FFFFFF"/>
+            </a:solidFill>
+            <a:miter lim="800000"/>
+          </a:ln>
+          <a:effectLst>
+            <a:outerShdw blurRad="254000" algn="tl" rotWithShape="0">
+              <a:srgbClr val="000000">
+                <a:alpha val="43000"/>
+              </a:srgbClr>
+            </a:outerShdw>
+          </a:effectLst>
+        </p:spPr>
+      </p:pic>
+      <p:sp>
+        <p:nvSpPr>
+          <p:cNvPr id="5" name="Rectangle 4">
+            <a:extLst>
+              <a:ext uri="{FF2B5EF4-FFF2-40B4-BE49-F238E27FC236}">
+                <a16:creationId xmlns:a16="http://schemas.microsoft.com/office/drawing/2014/main" id="{749792BA-D25E-4CCD-9C32-26FA714BFE11}"/>
+              </a:ext>
+            </a:extLst>
+          </p:cNvPr>
+          <p:cNvSpPr/>
+          <p:nvPr/>
+        </p:nvSpPr>
+        <p:spPr>
+          <a:xfrm>
+            <a:off x="8137984" y="5159365"/>
+            <a:ext cx="1691745" cy="338554"/>
+          </a:xfrm>
+          <a:prstGeom prst="rect">
+            <a:avLst/>
+          </a:prstGeom>
+        </p:spPr>
+        <p:txBody>
+          <a:bodyPr wrap="none">
+            <a:spAutoFit/>
+          </a:bodyPr>
+          <a:lstStyle/>
+          <a:p>
             <a:r>
-              <a:rPr lang="en-US" dirty="0"/>
-              <a:t>?</a:t>
+              <a:rPr lang="en-US" sz="1600" dirty="0"/>
+              <a:t>Updated forecast</a:t>
             </a:r>
           </a:p>
         </p:txBody>
       </p:sp>
+      <p:pic>
+        <p:nvPicPr>
+          <p:cNvPr id="6" name="Picture 5">
+            <a:extLst>
+              <a:ext uri="{FF2B5EF4-FFF2-40B4-BE49-F238E27FC236}">
+                <a16:creationId xmlns:a16="http://schemas.microsoft.com/office/drawing/2014/main" id="{1790B05D-337B-4DFD-8AE3-178D57EAA899}"/>
+              </a:ext>
+            </a:extLst>
+          </p:cNvPr>
+          <p:cNvPicPr>
+            <a:picLocks noChangeAspect="1"/>
+          </p:cNvPicPr>
+          <p:nvPr/>
+        </p:nvPicPr>
+        <p:blipFill>
+          <a:blip r:embed="rId3">
+            <a:extLst>
+              <a:ext uri="{28A0092B-C50C-407E-A947-70E740481C1C}">
+                <a14:useLocalDpi xmlns:a14="http://schemas.microsoft.com/office/drawing/2010/main" val="0"/>
+              </a:ext>
+            </a:extLst>
+          </a:blip>
+          <a:srcRect/>
+          <a:stretch/>
+        </p:blipFill>
+        <p:spPr>
+          <a:xfrm>
+            <a:off x="511037" y="1971433"/>
+            <a:ext cx="4823697" cy="2854841"/>
+          </a:xfrm>
+          <a:prstGeom prst="round2DiagRect">
+            <a:avLst>
+              <a:gd name="adj1" fmla="val 16667"/>
+              <a:gd name="adj2" fmla="val 0"/>
+            </a:avLst>
+          </a:prstGeom>
+          <a:ln w="88900" cap="sq">
+            <a:solidFill>
+              <a:srgbClr val="FFFFFF"/>
+            </a:solidFill>
+            <a:miter lim="800000"/>
+          </a:ln>
+          <a:effectLst>
+            <a:outerShdw blurRad="254000" algn="tl" rotWithShape="0">
+              <a:srgbClr val="000000">
+                <a:alpha val="43000"/>
+              </a:srgbClr>
+            </a:outerShdw>
+          </a:effectLst>
+        </p:spPr>
+      </p:pic>
       <p:sp>
         <p:nvSpPr>
-          <p:cNvPr id="9" name="Content Placeholder 8">
+          <p:cNvPr id="7" name="Rectangle 6">
             <a:extLst>
               <a:ext uri="{FF2B5EF4-FFF2-40B4-BE49-F238E27FC236}">
-                <a16:creationId xmlns:a16="http://schemas.microsoft.com/office/drawing/2014/main" id="{D885A1CC-C55D-43C0-8810-FD300CD439BF}"/>
+                <a16:creationId xmlns:a16="http://schemas.microsoft.com/office/drawing/2014/main" id="{C74A6CD3-97C8-4008-B7EA-FC98927605E8}"/>
+              </a:ext>
+            </a:extLst>
+          </p:cNvPr>
+          <p:cNvSpPr/>
+          <p:nvPr/>
+        </p:nvSpPr>
+        <p:spPr>
+          <a:xfrm>
+            <a:off x="1235671" y="5159365"/>
+            <a:ext cx="3502434" cy="584775"/>
+          </a:xfrm>
+          <a:prstGeom prst="rect">
+            <a:avLst/>
+          </a:prstGeom>
+        </p:spPr>
+        <p:txBody>
+          <a:bodyPr wrap="none">
+            <a:spAutoFit/>
+          </a:bodyPr>
+          <a:lstStyle/>
+          <a:p>
+            <a:r>
+              <a:rPr lang="en-US" sz="1600" dirty="0"/>
+              <a:t>Smoothing method with seasonality</a:t>
+            </a:r>
+          </a:p>
+          <a:p>
+            <a:endParaRPr lang="en-US" sz="1600" dirty="0"/>
+          </a:p>
+        </p:txBody>
+      </p:sp>
+      <p:pic>
+        <p:nvPicPr>
+          <p:cNvPr id="8" name="Picture 10" descr="http://www.rstudio.com/wp-content/uploads/2014/06/RStudio-Ball.png">
+            <a:extLst>
+              <a:ext uri="{FF2B5EF4-FFF2-40B4-BE49-F238E27FC236}">
+                <a16:creationId xmlns:a16="http://schemas.microsoft.com/office/drawing/2014/main" id="{2BD26815-E378-4A32-9571-7F5E8F4F2232}"/>
+              </a:ext>
+            </a:extLst>
+          </p:cNvPr>
+          <p:cNvPicPr>
+            <a:picLocks noChangeAspect="1" noChangeArrowheads="1"/>
+          </p:cNvPicPr>
+          <p:nvPr/>
+        </p:nvPicPr>
+        <p:blipFill>
+          <a:blip r:embed="rId4">
+            <a:extLst>
+              <a:ext uri="{28A0092B-C50C-407E-A947-70E740481C1C}">
+                <a14:useLocalDpi xmlns:a14="http://schemas.microsoft.com/office/drawing/2010/main" val="0"/>
+              </a:ext>
+            </a:extLst>
+          </a:blip>
+          <a:srcRect/>
+          <a:stretch>
+            <a:fillRect/>
+          </a:stretch>
+        </p:blipFill>
+        <p:spPr bwMode="auto">
+          <a:xfrm>
+            <a:off x="11429764" y="69314"/>
+            <a:ext cx="450954" cy="450954"/>
+          </a:xfrm>
+          <a:prstGeom prst="rect">
+            <a:avLst/>
+          </a:prstGeom>
+          <a:noFill/>
+          <a:extLst>
+            <a:ext uri="{909E8E84-426E-40DD-AFC4-6F175D3DCCD1}">
+              <a14:hiddenFill xmlns:a14="http://schemas.microsoft.com/office/drawing/2010/main">
+                <a:solidFill>
+                  <a:srgbClr val="FFFFFF"/>
+                </a:solidFill>
+              </a14:hiddenFill>
+            </a:ext>
+          </a:extLst>
+        </p:spPr>
+      </p:pic>
+    </p:spTree>
+    <p:extLst>
+      <p:ext uri="{BB962C8B-B14F-4D97-AF65-F5344CB8AC3E}">
+        <p14:creationId xmlns:p14="http://schemas.microsoft.com/office/powerpoint/2010/main" val="2124908194"/>
+      </p:ext>
+    </p:extLst>
+  </p:cSld>
+  <p:clrMapOvr>
+    <a:masterClrMapping/>
+  </p:clrMapOvr>
+  <p:timing>
+    <p:tnLst>
+      <p:par>
+        <p:cTn id="1" dur="indefinite" restart="never" nodeType="tmRoot">
+          <p:childTnLst>
+            <p:seq concurrent="1" nextAc="seek">
+              <p:cTn id="2" dur="indefinite" nodeType="mainSeq">
+                <p:childTnLst>
+                  <p:par>
+                    <p:cTn id="3" fill="hold">
+                      <p:stCondLst>
+                        <p:cond delay="indefinite"/>
+                        <p:cond evt="onBegin" delay="0">
+                          <p:tn val="2"/>
+                        </p:cond>
+                      </p:stCondLst>
+                      <p:childTnLst>
+                        <p:par>
+                          <p:cTn id="4" fill="hold">
+                            <p:stCondLst>
+                              <p:cond delay="0"/>
+                            </p:stCondLst>
+                            <p:childTnLst>
+                              <p:par>
+                                <p:cTn id="5" presetID="10" presetClass="entr" presetSubtype="0" fill="hold" nodeType="afterEffect">
+                                  <p:stCondLst>
+                                    <p:cond delay="0"/>
+                                  </p:stCondLst>
+                                  <p:childTnLst>
+                                    <p:set>
+                                      <p:cBhvr>
+                                        <p:cTn id="6" dur="1" fill="hold">
+                                          <p:stCondLst>
+                                            <p:cond delay="0"/>
+                                          </p:stCondLst>
+                                        </p:cTn>
+                                        <p:tgtEl>
+                                          <p:spTgt spid="6"/>
+                                        </p:tgtEl>
+                                        <p:attrNameLst>
+                                          <p:attrName>style.visibility</p:attrName>
+                                        </p:attrNameLst>
+                                      </p:cBhvr>
+                                      <p:to>
+                                        <p:strVal val="visible"/>
+                                      </p:to>
+                                    </p:set>
+                                    <p:animEffect transition="in" filter="fade">
+                                      <p:cBhvr>
+                                        <p:cTn id="7" dur="1000"/>
+                                        <p:tgtEl>
+                                          <p:spTgt spid="6"/>
+                                        </p:tgtEl>
+                                      </p:cBhvr>
+                                    </p:animEffect>
+                                  </p:childTnLst>
+                                </p:cTn>
+                              </p:par>
+                            </p:childTnLst>
+                          </p:cTn>
+                        </p:par>
+                        <p:par>
+                          <p:cTn id="8" fill="hold">
+                            <p:stCondLst>
+                              <p:cond delay="1000"/>
+                            </p:stCondLst>
+                            <p:childTnLst>
+                              <p:par>
+                                <p:cTn id="9" presetID="10" presetClass="entr" presetSubtype="0" fill="hold" grpId="0" nodeType="afterEffect">
+                                  <p:stCondLst>
+                                    <p:cond delay="0"/>
+                                  </p:stCondLst>
+                                  <p:childTnLst>
+                                    <p:set>
+                                      <p:cBhvr>
+                                        <p:cTn id="10" dur="1" fill="hold">
+                                          <p:stCondLst>
+                                            <p:cond delay="0"/>
+                                          </p:stCondLst>
+                                        </p:cTn>
+                                        <p:tgtEl>
+                                          <p:spTgt spid="7"/>
+                                        </p:tgtEl>
+                                        <p:attrNameLst>
+                                          <p:attrName>style.visibility</p:attrName>
+                                        </p:attrNameLst>
+                                      </p:cBhvr>
+                                      <p:to>
+                                        <p:strVal val="visible"/>
+                                      </p:to>
+                                    </p:set>
+                                    <p:animEffect transition="in" filter="fade">
+                                      <p:cBhvr>
+                                        <p:cTn id="11" dur="500"/>
+                                        <p:tgtEl>
+                                          <p:spTgt spid="7"/>
+                                        </p:tgtEl>
+                                      </p:cBhvr>
+                                    </p:animEffect>
+                                  </p:childTnLst>
+                                </p:cTn>
+                              </p:par>
+                            </p:childTnLst>
+                          </p:cTn>
+                        </p:par>
+                        <p:par>
+                          <p:cTn id="12" fill="hold">
+                            <p:stCondLst>
+                              <p:cond delay="1500"/>
+                            </p:stCondLst>
+                            <p:childTnLst>
+                              <p:par>
+                                <p:cTn id="13" presetID="10" presetClass="entr" presetSubtype="0" fill="hold" nodeType="afterEffect">
+                                  <p:stCondLst>
+                                    <p:cond delay="500"/>
+                                  </p:stCondLst>
+                                  <p:childTnLst>
+                                    <p:set>
+                                      <p:cBhvr>
+                                        <p:cTn id="14" dur="1" fill="hold">
+                                          <p:stCondLst>
+                                            <p:cond delay="0"/>
+                                          </p:stCondLst>
+                                        </p:cTn>
+                                        <p:tgtEl>
+                                          <p:spTgt spid="4"/>
+                                        </p:tgtEl>
+                                        <p:attrNameLst>
+                                          <p:attrName>style.visibility</p:attrName>
+                                        </p:attrNameLst>
+                                      </p:cBhvr>
+                                      <p:to>
+                                        <p:strVal val="visible"/>
+                                      </p:to>
+                                    </p:set>
+                                    <p:animEffect transition="in" filter="fade">
+                                      <p:cBhvr>
+                                        <p:cTn id="15" dur="1000"/>
+                                        <p:tgtEl>
+                                          <p:spTgt spid="4"/>
+                                        </p:tgtEl>
+                                      </p:cBhvr>
+                                    </p:animEffect>
+                                  </p:childTnLst>
+                                </p:cTn>
+                              </p:par>
+                            </p:childTnLst>
+                          </p:cTn>
+                        </p:par>
+                        <p:par>
+                          <p:cTn id="16" fill="hold">
+                            <p:stCondLst>
+                              <p:cond delay="3000"/>
+                            </p:stCondLst>
+                            <p:childTnLst>
+                              <p:par>
+                                <p:cTn id="17" presetID="10" presetClass="entr" presetSubtype="0" fill="hold" grpId="0" nodeType="afterEffect">
+                                  <p:stCondLst>
+                                    <p:cond delay="0"/>
+                                  </p:stCondLst>
+                                  <p:childTnLst>
+                                    <p:set>
+                                      <p:cBhvr>
+                                        <p:cTn id="18" dur="1" fill="hold">
+                                          <p:stCondLst>
+                                            <p:cond delay="0"/>
+                                          </p:stCondLst>
+                                        </p:cTn>
+                                        <p:tgtEl>
+                                          <p:spTgt spid="5"/>
+                                        </p:tgtEl>
+                                        <p:attrNameLst>
+                                          <p:attrName>style.visibility</p:attrName>
+                                        </p:attrNameLst>
+                                      </p:cBhvr>
+                                      <p:to>
+                                        <p:strVal val="visible"/>
+                                      </p:to>
+                                    </p:set>
+                                    <p:animEffect transition="in" filter="fade">
+                                      <p:cBhvr>
+                                        <p:cTn id="19" dur="500"/>
+                                        <p:tgtEl>
+                                          <p:spTgt spid="5"/>
+                                        </p:tgtEl>
+                                      </p:cBhvr>
+                                    </p:animEffect>
+                                  </p:childTnLst>
+                                </p:cTn>
+                              </p:par>
+                            </p:childTnLst>
+                          </p:cTn>
+                        </p:par>
+                      </p:childTnLst>
+                    </p:cTn>
+                  </p:par>
+                </p:childTnLst>
+              </p:cTn>
+              <p:prevCondLst>
+                <p:cond evt="onPrev" delay="0">
+                  <p:tgtEl>
+                    <p:sldTgt/>
+                  </p:tgtEl>
+                </p:cond>
+              </p:prevCondLst>
+              <p:nextCondLst>
+                <p:cond evt="onNext" delay="0">
+                  <p:tgtEl>
+                    <p:sldTgt/>
+                  </p:tgtEl>
+                </p:cond>
+              </p:nextCondLst>
+            </p:seq>
+          </p:childTnLst>
+        </p:cTn>
+      </p:par>
+    </p:tnLst>
+    <p:bldLst>
+      <p:bldP spid="5" grpId="0"/>
+      <p:bldP spid="7" grpId="0"/>
+    </p:bldLst>
+  </p:timing>
+</p:sld>
+</file>
+
+<file path=ppt/slides/slide14.xml><?xml version="1.0" encoding="utf-8"?>
+<p:sld xmlns:a="http://schemas.openxmlformats.org/drawingml/2006/main" xmlns:r="http://schemas.openxmlformats.org/officeDocument/2006/relationships" xmlns:p="http://schemas.openxmlformats.org/presentationml/2006/main">
+  <p:cSld>
+    <p:spTree>
+      <p:nvGrpSpPr>
+        <p:cNvPr id="1" name=""/>
+        <p:cNvGrpSpPr/>
+        <p:nvPr/>
+      </p:nvGrpSpPr>
+      <p:grpSpPr>
+        <a:xfrm>
+          <a:off x="0" y="0"/>
+          <a:ext cx="0" cy="0"/>
+          <a:chOff x="0" y="0"/>
+          <a:chExt cx="0" cy="0"/>
+        </a:xfrm>
+      </p:grpSpPr>
+      <p:sp>
+        <p:nvSpPr>
+          <p:cNvPr id="2" name="Title 1">
+            <a:extLst>
+              <a:ext uri="{FF2B5EF4-FFF2-40B4-BE49-F238E27FC236}">
+                <a16:creationId xmlns:a16="http://schemas.microsoft.com/office/drawing/2014/main" id="{5761C009-2BEA-46C9-9FFB-27075863405C}"/>
               </a:ext>
             </a:extLst>
           </p:cNvPr>
@@ -17238,24 +18350,332 @@
             <a:spLocks noGrp="1"/>
           </p:cNvSpPr>
           <p:nvPr>
-            <p:ph sz="quarter" idx="13"/>
+            <p:ph type="title"/>
           </p:nvPr>
         </p:nvSpPr>
         <p:spPr/>
         <p:txBody>
-          <a:bodyPr/>
+          <a:bodyPr>
+            <a:noAutofit/>
+          </a:bodyPr>
           <a:lstStyle/>
           <a:p>
-            <a:endParaRPr lang="en-US"/>
+            <a:r>
+              <a:rPr lang="en-US" sz="4000" dirty="0"/>
+              <a:t>R - forecast using Holt-Winters </a:t>
+            </a:r>
+            <a:r>
+              <a:rPr lang="en-US" sz="4000" dirty="0" err="1"/>
+              <a:t>methoD</a:t>
+            </a:r>
+            <a:endParaRPr lang="en-US" sz="4000" dirty="0"/>
           </a:p>
         </p:txBody>
       </p:sp>
+      <p:pic>
+        <p:nvPicPr>
+          <p:cNvPr id="6" name="Picture 5">
+            <a:extLst>
+              <a:ext uri="{FF2B5EF4-FFF2-40B4-BE49-F238E27FC236}">
+                <a16:creationId xmlns:a16="http://schemas.microsoft.com/office/drawing/2014/main" id="{1790B05D-337B-4DFD-8AE3-178D57EAA899}"/>
+              </a:ext>
+            </a:extLst>
+          </p:cNvPr>
+          <p:cNvPicPr>
+            <a:picLocks noChangeAspect="1"/>
+          </p:cNvPicPr>
+          <p:nvPr/>
+        </p:nvPicPr>
+        <p:blipFill>
+          <a:blip r:embed="rId2">
+            <a:extLst>
+              <a:ext uri="{28A0092B-C50C-407E-A947-70E740481C1C}">
+                <a14:useLocalDpi xmlns:a14="http://schemas.microsoft.com/office/drawing/2010/main" val="0"/>
+              </a:ext>
+            </a:extLst>
+          </a:blip>
+          <a:srcRect/>
+          <a:stretch/>
+        </p:blipFill>
+        <p:spPr>
+          <a:xfrm>
+            <a:off x="3217336" y="1566695"/>
+            <a:ext cx="5447566" cy="3962038"/>
+          </a:xfrm>
+          <a:prstGeom prst="round2DiagRect">
+            <a:avLst>
+              <a:gd name="adj1" fmla="val 16667"/>
+              <a:gd name="adj2" fmla="val 0"/>
+            </a:avLst>
+          </a:prstGeom>
+          <a:ln w="88900" cap="sq">
+            <a:solidFill>
+              <a:srgbClr val="FFFFFF"/>
+            </a:solidFill>
+            <a:miter lim="800000"/>
+          </a:ln>
+          <a:effectLst>
+            <a:outerShdw blurRad="254000" algn="tl" rotWithShape="0">
+              <a:srgbClr val="000000">
+                <a:alpha val="43000"/>
+              </a:srgbClr>
+            </a:outerShdw>
+          </a:effectLst>
+        </p:spPr>
+      </p:pic>
       <p:sp>
         <p:nvSpPr>
-          <p:cNvPr id="10" name="Content Placeholder 9">
+          <p:cNvPr id="7" name="Rectangle 6">
             <a:extLst>
               <a:ext uri="{FF2B5EF4-FFF2-40B4-BE49-F238E27FC236}">
-                <a16:creationId xmlns:a16="http://schemas.microsoft.com/office/drawing/2014/main" id="{D8B0269D-600B-4C45-894A-F219B22EF10E}"/>
+                <a16:creationId xmlns:a16="http://schemas.microsoft.com/office/drawing/2014/main" id="{C74A6CD3-97C8-4008-B7EA-FC98927605E8}"/>
+              </a:ext>
+            </a:extLst>
+          </p:cNvPr>
+          <p:cNvSpPr/>
+          <p:nvPr/>
+        </p:nvSpPr>
+        <p:spPr>
+          <a:xfrm>
+            <a:off x="5094347" y="5757045"/>
+            <a:ext cx="2003305" cy="584775"/>
+          </a:xfrm>
+          <a:prstGeom prst="rect">
+            <a:avLst/>
+          </a:prstGeom>
+        </p:spPr>
+        <p:txBody>
+          <a:bodyPr wrap="none">
+            <a:spAutoFit/>
+          </a:bodyPr>
+          <a:lstStyle/>
+          <a:p>
+            <a:r>
+              <a:rPr lang="en-US" sz="1600" dirty="0"/>
+              <a:t>Forecast Output (R)</a:t>
+            </a:r>
+          </a:p>
+          <a:p>
+            <a:endParaRPr lang="en-US" sz="1600" dirty="0"/>
+          </a:p>
+        </p:txBody>
+      </p:sp>
+      <p:pic>
+        <p:nvPicPr>
+          <p:cNvPr id="8" name="Picture 10" descr="http://www.rstudio.com/wp-content/uploads/2014/06/RStudio-Ball.png">
+            <a:extLst>
+              <a:ext uri="{FF2B5EF4-FFF2-40B4-BE49-F238E27FC236}">
+                <a16:creationId xmlns:a16="http://schemas.microsoft.com/office/drawing/2014/main" id="{2BD26815-E378-4A32-9571-7F5E8F4F2232}"/>
+              </a:ext>
+            </a:extLst>
+          </p:cNvPr>
+          <p:cNvPicPr>
+            <a:picLocks noChangeAspect="1" noChangeArrowheads="1"/>
+          </p:cNvPicPr>
+          <p:nvPr/>
+        </p:nvPicPr>
+        <p:blipFill>
+          <a:blip r:embed="rId3">
+            <a:extLst>
+              <a:ext uri="{28A0092B-C50C-407E-A947-70E740481C1C}">
+                <a14:useLocalDpi xmlns:a14="http://schemas.microsoft.com/office/drawing/2010/main" val="0"/>
+              </a:ext>
+            </a:extLst>
+          </a:blip>
+          <a:srcRect/>
+          <a:stretch>
+            <a:fillRect/>
+          </a:stretch>
+        </p:blipFill>
+        <p:spPr bwMode="auto">
+          <a:xfrm>
+            <a:off x="11429764" y="69314"/>
+            <a:ext cx="450954" cy="450954"/>
+          </a:xfrm>
+          <a:prstGeom prst="rect">
+            <a:avLst/>
+          </a:prstGeom>
+          <a:noFill/>
+          <a:extLst>
+            <a:ext uri="{909E8E84-426E-40DD-AFC4-6F175D3DCCD1}">
+              <a14:hiddenFill xmlns:a14="http://schemas.microsoft.com/office/drawing/2010/main">
+                <a:solidFill>
+                  <a:srgbClr val="FFFFFF"/>
+                </a:solidFill>
+              </a14:hiddenFill>
+            </a:ext>
+          </a:extLst>
+        </p:spPr>
+      </p:pic>
+    </p:spTree>
+    <p:extLst>
+      <p:ext uri="{BB962C8B-B14F-4D97-AF65-F5344CB8AC3E}">
+        <p14:creationId xmlns:p14="http://schemas.microsoft.com/office/powerpoint/2010/main" val="3838609730"/>
+      </p:ext>
+    </p:extLst>
+  </p:cSld>
+  <p:clrMapOvr>
+    <a:masterClrMapping/>
+  </p:clrMapOvr>
+  <p:timing>
+    <p:tnLst>
+      <p:par>
+        <p:cTn id="1" dur="indefinite" restart="never" nodeType="tmRoot">
+          <p:childTnLst>
+            <p:seq concurrent="1" nextAc="seek">
+              <p:cTn id="2" dur="indefinite" nodeType="mainSeq">
+                <p:childTnLst>
+                  <p:par>
+                    <p:cTn id="3" fill="hold">
+                      <p:stCondLst>
+                        <p:cond delay="indefinite"/>
+                        <p:cond evt="onBegin" delay="0">
+                          <p:tn val="2"/>
+                        </p:cond>
+                      </p:stCondLst>
+                      <p:childTnLst>
+                        <p:par>
+                          <p:cTn id="4" fill="hold">
+                            <p:stCondLst>
+                              <p:cond delay="0"/>
+                            </p:stCondLst>
+                            <p:childTnLst>
+                              <p:par>
+                                <p:cTn id="5" presetID="10" presetClass="entr" presetSubtype="0" fill="hold" nodeType="afterEffect">
+                                  <p:stCondLst>
+                                    <p:cond delay="0"/>
+                                  </p:stCondLst>
+                                  <p:childTnLst>
+                                    <p:set>
+                                      <p:cBhvr>
+                                        <p:cTn id="6" dur="1" fill="hold">
+                                          <p:stCondLst>
+                                            <p:cond delay="0"/>
+                                          </p:stCondLst>
+                                        </p:cTn>
+                                        <p:tgtEl>
+                                          <p:spTgt spid="6"/>
+                                        </p:tgtEl>
+                                        <p:attrNameLst>
+                                          <p:attrName>style.visibility</p:attrName>
+                                        </p:attrNameLst>
+                                      </p:cBhvr>
+                                      <p:to>
+                                        <p:strVal val="visible"/>
+                                      </p:to>
+                                    </p:set>
+                                    <p:animEffect transition="in" filter="fade">
+                                      <p:cBhvr>
+                                        <p:cTn id="7" dur="1000"/>
+                                        <p:tgtEl>
+                                          <p:spTgt spid="6"/>
+                                        </p:tgtEl>
+                                      </p:cBhvr>
+                                    </p:animEffect>
+                                  </p:childTnLst>
+                                </p:cTn>
+                              </p:par>
+                            </p:childTnLst>
+                          </p:cTn>
+                        </p:par>
+                        <p:par>
+                          <p:cTn id="8" fill="hold">
+                            <p:stCondLst>
+                              <p:cond delay="1000"/>
+                            </p:stCondLst>
+                            <p:childTnLst>
+                              <p:par>
+                                <p:cTn id="9" presetID="10" presetClass="entr" presetSubtype="0" fill="hold" grpId="0" nodeType="afterEffect">
+                                  <p:stCondLst>
+                                    <p:cond delay="0"/>
+                                  </p:stCondLst>
+                                  <p:childTnLst>
+                                    <p:set>
+                                      <p:cBhvr>
+                                        <p:cTn id="10" dur="1" fill="hold">
+                                          <p:stCondLst>
+                                            <p:cond delay="0"/>
+                                          </p:stCondLst>
+                                        </p:cTn>
+                                        <p:tgtEl>
+                                          <p:spTgt spid="7"/>
+                                        </p:tgtEl>
+                                        <p:attrNameLst>
+                                          <p:attrName>style.visibility</p:attrName>
+                                        </p:attrNameLst>
+                                      </p:cBhvr>
+                                      <p:to>
+                                        <p:strVal val="visible"/>
+                                      </p:to>
+                                    </p:set>
+                                    <p:animEffect transition="in" filter="fade">
+                                      <p:cBhvr>
+                                        <p:cTn id="11" dur="500"/>
+                                        <p:tgtEl>
+                                          <p:spTgt spid="7"/>
+                                        </p:tgtEl>
+                                      </p:cBhvr>
+                                    </p:animEffect>
+                                  </p:childTnLst>
+                                </p:cTn>
+                              </p:par>
+                            </p:childTnLst>
+                          </p:cTn>
+                        </p:par>
+                      </p:childTnLst>
+                    </p:cTn>
+                  </p:par>
+                </p:childTnLst>
+              </p:cTn>
+              <p:prevCondLst>
+                <p:cond evt="onPrev" delay="0">
+                  <p:tgtEl>
+                    <p:sldTgt/>
+                  </p:tgtEl>
+                </p:cond>
+              </p:prevCondLst>
+              <p:nextCondLst>
+                <p:cond evt="onNext" delay="0">
+                  <p:tgtEl>
+                    <p:sldTgt/>
+                  </p:tgtEl>
+                </p:cond>
+              </p:nextCondLst>
+            </p:seq>
+          </p:childTnLst>
+        </p:cTn>
+      </p:par>
+    </p:tnLst>
+    <p:bldLst>
+      <p:bldP spid="7" grpId="0"/>
+    </p:bldLst>
+  </p:timing>
+</p:sld>
+</file>
+
+<file path=ppt/slides/slide15.xml><?xml version="1.0" encoding="utf-8"?>
+<p:sld xmlns:a="http://schemas.openxmlformats.org/drawingml/2006/main" xmlns:r="http://schemas.openxmlformats.org/officeDocument/2006/relationships" xmlns:p="http://schemas.openxmlformats.org/presentationml/2006/main">
+  <p:cSld>
+    <p:spTree>
+      <p:nvGrpSpPr>
+        <p:cNvPr id="1" name=""/>
+        <p:cNvGrpSpPr/>
+        <p:nvPr/>
+      </p:nvGrpSpPr>
+      <p:grpSpPr>
+        <a:xfrm>
+          <a:off x="0" y="0"/>
+          <a:ext cx="0" cy="0"/>
+          <a:chOff x="0" y="0"/>
+          <a:chExt cx="0" cy="0"/>
+        </a:xfrm>
+      </p:grpSpPr>
+      <p:sp>
+        <p:nvSpPr>
+          <p:cNvPr id="2" name="Title 1">
+            <a:extLst>
+              <a:ext uri="{FF2B5EF4-FFF2-40B4-BE49-F238E27FC236}">
+                <a16:creationId xmlns:a16="http://schemas.microsoft.com/office/drawing/2014/main" id="{5761C009-2BEA-46C9-9FFB-27075863405C}"/>
               </a:ext>
             </a:extLst>
           </p:cNvPr>
@@ -17263,32 +18683,305 @@
             <a:spLocks noGrp="1"/>
           </p:cNvSpPr>
           <p:nvPr>
-            <p:ph sz="quarter" idx="14"/>
+            <p:ph type="title"/>
           </p:nvPr>
         </p:nvSpPr>
         <p:spPr/>
         <p:txBody>
-          <a:bodyPr/>
+          <a:bodyPr>
+            <a:noAutofit/>
+          </a:bodyPr>
           <a:lstStyle/>
           <a:p>
-            <a:endParaRPr lang="en-US"/>
+            <a:r>
+              <a:rPr lang="en-US" sz="4000" dirty="0"/>
+              <a:t>R - forecast Output in tableau</a:t>
+            </a:r>
           </a:p>
         </p:txBody>
       </p:sp>
+      <p:pic>
+        <p:nvPicPr>
+          <p:cNvPr id="6" name="Picture 5">
+            <a:extLst>
+              <a:ext uri="{FF2B5EF4-FFF2-40B4-BE49-F238E27FC236}">
+                <a16:creationId xmlns:a16="http://schemas.microsoft.com/office/drawing/2014/main" id="{1790B05D-337B-4DFD-8AE3-178D57EAA899}"/>
+              </a:ext>
+            </a:extLst>
+          </p:cNvPr>
+          <p:cNvPicPr>
+            <a:picLocks noChangeAspect="1"/>
+          </p:cNvPicPr>
+          <p:nvPr/>
+        </p:nvPicPr>
+        <p:blipFill>
+          <a:blip r:embed="rId2">
+            <a:extLst>
+              <a:ext uri="{28A0092B-C50C-407E-A947-70E740481C1C}">
+                <a14:useLocalDpi xmlns:a14="http://schemas.microsoft.com/office/drawing/2010/main" val="0"/>
+              </a:ext>
+            </a:extLst>
+          </a:blip>
+          <a:srcRect/>
+          <a:stretch/>
+        </p:blipFill>
+        <p:spPr>
+          <a:xfrm>
+            <a:off x="3160459" y="2566518"/>
+            <a:ext cx="5447566" cy="1115726"/>
+          </a:xfrm>
+          <a:prstGeom prst="round2DiagRect">
+            <a:avLst>
+              <a:gd name="adj1" fmla="val 16667"/>
+              <a:gd name="adj2" fmla="val 0"/>
+            </a:avLst>
+          </a:prstGeom>
+          <a:ln w="88900" cap="sq">
+            <a:solidFill>
+              <a:srgbClr val="FFFFFF"/>
+            </a:solidFill>
+            <a:miter lim="800000"/>
+          </a:ln>
+          <a:effectLst>
+            <a:outerShdw blurRad="254000" algn="tl" rotWithShape="0">
+              <a:srgbClr val="000000">
+                <a:alpha val="43000"/>
+              </a:srgbClr>
+            </a:outerShdw>
+          </a:effectLst>
+        </p:spPr>
+      </p:pic>
+      <p:sp>
+        <p:nvSpPr>
+          <p:cNvPr id="7" name="Rectangle 6">
+            <a:extLst>
+              <a:ext uri="{FF2B5EF4-FFF2-40B4-BE49-F238E27FC236}">
+                <a16:creationId xmlns:a16="http://schemas.microsoft.com/office/drawing/2014/main" id="{C74A6CD3-97C8-4008-B7EA-FC98927605E8}"/>
+              </a:ext>
+            </a:extLst>
+          </p:cNvPr>
+          <p:cNvSpPr/>
+          <p:nvPr/>
+        </p:nvSpPr>
+        <p:spPr>
+          <a:xfrm>
+            <a:off x="4517489" y="4410997"/>
+            <a:ext cx="2733505" cy="584775"/>
+          </a:xfrm>
+          <a:prstGeom prst="rect">
+            <a:avLst/>
+          </a:prstGeom>
+        </p:spPr>
+        <p:txBody>
+          <a:bodyPr wrap="none">
+            <a:spAutoFit/>
+          </a:bodyPr>
+          <a:lstStyle/>
+          <a:p>
+            <a:r>
+              <a:rPr lang="en-US" sz="1600" dirty="0"/>
+              <a:t>Output visualized in Tableau</a:t>
+            </a:r>
+          </a:p>
+          <a:p>
+            <a:endParaRPr lang="en-US" sz="1600" dirty="0"/>
+          </a:p>
+        </p:txBody>
+      </p:sp>
+      <p:pic>
+        <p:nvPicPr>
+          <p:cNvPr id="8" name="Picture 10" descr="http://www.rstudio.com/wp-content/uploads/2014/06/RStudio-Ball.png">
+            <a:extLst>
+              <a:ext uri="{FF2B5EF4-FFF2-40B4-BE49-F238E27FC236}">
+                <a16:creationId xmlns:a16="http://schemas.microsoft.com/office/drawing/2014/main" id="{2BD26815-E378-4A32-9571-7F5E8F4F2232}"/>
+              </a:ext>
+            </a:extLst>
+          </p:cNvPr>
+          <p:cNvPicPr>
+            <a:picLocks noChangeAspect="1" noChangeArrowheads="1"/>
+          </p:cNvPicPr>
+          <p:nvPr/>
+        </p:nvPicPr>
+        <p:blipFill>
+          <a:blip r:embed="rId3">
+            <a:extLst>
+              <a:ext uri="{28A0092B-C50C-407E-A947-70E740481C1C}">
+                <a14:useLocalDpi xmlns:a14="http://schemas.microsoft.com/office/drawing/2010/main" val="0"/>
+              </a:ext>
+            </a:extLst>
+          </a:blip>
+          <a:srcRect/>
+          <a:stretch>
+            <a:fillRect/>
+          </a:stretch>
+        </p:blipFill>
+        <p:spPr bwMode="auto">
+          <a:xfrm>
+            <a:off x="11429764" y="69314"/>
+            <a:ext cx="450954" cy="450954"/>
+          </a:xfrm>
+          <a:prstGeom prst="rect">
+            <a:avLst/>
+          </a:prstGeom>
+          <a:noFill/>
+          <a:extLst>
+            <a:ext uri="{909E8E84-426E-40DD-AFC4-6F175D3DCCD1}">
+              <a14:hiddenFill xmlns:a14="http://schemas.microsoft.com/office/drawing/2010/main">
+                <a:solidFill>
+                  <a:srgbClr val="FFFFFF"/>
+                </a:solidFill>
+              </a14:hiddenFill>
+            </a:ext>
+          </a:extLst>
+        </p:spPr>
+      </p:pic>
     </p:spTree>
     <p:extLst>
       <p:ext uri="{BB962C8B-B14F-4D97-AF65-F5344CB8AC3E}">
-        <p14:creationId xmlns:p14="http://schemas.microsoft.com/office/powerpoint/2010/main" val="2052400882"/>
+        <p14:creationId xmlns:p14="http://schemas.microsoft.com/office/powerpoint/2010/main" val="3356399626"/>
       </p:ext>
     </p:extLst>
   </p:cSld>
   <p:clrMapOvr>
     <a:masterClrMapping/>
   </p:clrMapOvr>
+  <p:timing>
+    <p:tnLst>
+      <p:par>
+        <p:cTn id="1" dur="indefinite" restart="never" nodeType="tmRoot">
+          <p:childTnLst>
+            <p:seq concurrent="1" nextAc="seek">
+              <p:cTn id="2" dur="indefinite" nodeType="mainSeq">
+                <p:childTnLst>
+                  <p:par>
+                    <p:cTn id="3" fill="hold">
+                      <p:stCondLst>
+                        <p:cond delay="indefinite"/>
+                        <p:cond evt="onBegin" delay="0">
+                          <p:tn val="2"/>
+                        </p:cond>
+                      </p:stCondLst>
+                      <p:childTnLst>
+                        <p:par>
+                          <p:cTn id="4" fill="hold">
+                            <p:stCondLst>
+                              <p:cond delay="0"/>
+                            </p:stCondLst>
+                            <p:childTnLst>
+                              <p:par>
+                                <p:cTn id="5" presetID="10" presetClass="entr" presetSubtype="0" fill="hold" nodeType="afterEffect">
+                                  <p:stCondLst>
+                                    <p:cond delay="0"/>
+                                  </p:stCondLst>
+                                  <p:childTnLst>
+                                    <p:set>
+                                      <p:cBhvr>
+                                        <p:cTn id="6" dur="1" fill="hold">
+                                          <p:stCondLst>
+                                            <p:cond delay="0"/>
+                                          </p:stCondLst>
+                                        </p:cTn>
+                                        <p:tgtEl>
+                                          <p:spTgt spid="6"/>
+                                        </p:tgtEl>
+                                        <p:attrNameLst>
+                                          <p:attrName>style.visibility</p:attrName>
+                                        </p:attrNameLst>
+                                      </p:cBhvr>
+                                      <p:to>
+                                        <p:strVal val="visible"/>
+                                      </p:to>
+                                    </p:set>
+                                    <p:animEffect transition="in" filter="fade">
+                                      <p:cBhvr>
+                                        <p:cTn id="7" dur="1000"/>
+                                        <p:tgtEl>
+                                          <p:spTgt spid="6"/>
+                                        </p:tgtEl>
+                                      </p:cBhvr>
+                                    </p:animEffect>
+                                  </p:childTnLst>
+                                </p:cTn>
+                              </p:par>
+                            </p:childTnLst>
+                          </p:cTn>
+                        </p:par>
+                        <p:par>
+                          <p:cTn id="8" fill="hold">
+                            <p:stCondLst>
+                              <p:cond delay="1000"/>
+                            </p:stCondLst>
+                            <p:childTnLst>
+                              <p:par>
+                                <p:cTn id="9" presetID="10" presetClass="entr" presetSubtype="0" fill="hold" grpId="0" nodeType="afterEffect">
+                                  <p:stCondLst>
+                                    <p:cond delay="0"/>
+                                  </p:stCondLst>
+                                  <p:childTnLst>
+                                    <p:set>
+                                      <p:cBhvr>
+                                        <p:cTn id="10" dur="1" fill="hold">
+                                          <p:stCondLst>
+                                            <p:cond delay="0"/>
+                                          </p:stCondLst>
+                                        </p:cTn>
+                                        <p:tgtEl>
+                                          <p:spTgt spid="7"/>
+                                        </p:tgtEl>
+                                        <p:attrNameLst>
+                                          <p:attrName>style.visibility</p:attrName>
+                                        </p:attrNameLst>
+                                      </p:cBhvr>
+                                      <p:to>
+                                        <p:strVal val="visible"/>
+                                      </p:to>
+                                    </p:set>
+                                    <p:animEffect transition="in" filter="fade">
+                                      <p:cBhvr>
+                                        <p:cTn id="11" dur="500"/>
+                                        <p:tgtEl>
+                                          <p:spTgt spid="7"/>
+                                        </p:tgtEl>
+                                      </p:cBhvr>
+                                    </p:animEffect>
+                                  </p:childTnLst>
+                                </p:cTn>
+                              </p:par>
+                            </p:childTnLst>
+                          </p:cTn>
+                        </p:par>
+                      </p:childTnLst>
+                    </p:cTn>
+                  </p:par>
+                </p:childTnLst>
+              </p:cTn>
+              <p:prevCondLst>
+                <p:cond evt="onPrev" delay="0">
+                  <p:tgtEl>
+                    <p:sldTgt/>
+                  </p:tgtEl>
+                </p:cond>
+              </p:prevCondLst>
+              <p:nextCondLst>
+                <p:cond evt="onNext" delay="0">
+                  <p:tgtEl>
+                    <p:sldTgt/>
+                  </p:tgtEl>
+                </p:cond>
+              </p:nextCondLst>
+            </p:seq>
+          </p:childTnLst>
+        </p:cTn>
+      </p:par>
+    </p:tnLst>
+    <p:bldLst>
+      <p:bldP spid="7" grpId="0"/>
+    </p:bldLst>
+  </p:timing>
 </p:sld>
 </file>
 
-<file path=ppt/slides/slide13.xml><?xml version="1.0" encoding="utf-8"?>
+<file path=ppt/slides/slide16.xml><?xml version="1.0" encoding="utf-8"?>
 <p:sld xmlns:a="http://schemas.openxmlformats.org/drawingml/2006/main" xmlns:r="http://schemas.openxmlformats.org/officeDocument/2006/relationships" xmlns:p="http://schemas.openxmlformats.org/presentationml/2006/main">
   <p:cSld>
     <p:bg>
@@ -17307,6 +19000,608 @@
               </a:schemeClr>
             </a:duotone>
             <a:extLst/>
+          </a:blip>
+          <a:stretch/>
+        </a:blipFill>
+        <a:effectLst/>
+      </p:bgPr>
+    </p:bg>
+    <p:spTree>
+      <p:nvGrpSpPr>
+        <p:cNvPr id="1" name=""/>
+        <p:cNvGrpSpPr/>
+        <p:nvPr/>
+      </p:nvGrpSpPr>
+      <p:grpSpPr>
+        <a:xfrm>
+          <a:off x="0" y="0"/>
+          <a:ext cx="0" cy="0"/>
+          <a:chOff x="0" y="0"/>
+          <a:chExt cx="0" cy="0"/>
+        </a:xfrm>
+      </p:grpSpPr>
+      <p:pic>
+        <p:nvPicPr>
+          <p:cNvPr id="192" name="Picture 191">
+            <a:extLst>
+              <a:ext uri="{FF2B5EF4-FFF2-40B4-BE49-F238E27FC236}">
+                <a16:creationId xmlns:a16="http://schemas.microsoft.com/office/drawing/2014/main" id="{5F18A929-900B-4B7E-9A8C-8BCB5AF99B56}"/>
+              </a:ext>
+              <a:ext uri="{C183D7F6-B498-43B3-948B-1728B52AA6E4}">
+                <adec:decorative xmlns:adec="http://schemas.microsoft.com/office/drawing/2017/decorative" val="1"/>
+              </a:ext>
+            </a:extLst>
+          </p:cNvPr>
+          <p:cNvPicPr>
+            <a:picLocks noGrp="1" noRot="1" noChangeAspect="1" noMove="1" noResize="1" noEditPoints="1" noAdjustHandles="1" noChangeArrowheads="1" noChangeShapeType="1" noCrop="1"/>
+          </p:cNvPicPr>
+          <p:nvPr>
+            <p:extLst>
+              <p:ext uri="{386F3935-93C4-4BCD-93E2-E3B085C9AB24}">
+                <p16:designElem xmlns:p16="http://schemas.microsoft.com/office/powerpoint/2015/main" val="1"/>
+              </p:ext>
+            </p:extLst>
+          </p:nvPr>
+        </p:nvPicPr>
+        <p:blipFill>
+          <a:blip r:embed="rId3">
+            <a:extLst>
+              <a:ext uri="{28A0092B-C50C-407E-A947-70E740481C1C}">
+                <a14:useLocalDpi xmlns:a14="http://schemas.microsoft.com/office/drawing/2010/main" val="0"/>
+              </a:ext>
+            </a:extLst>
+          </a:blip>
+          <a:stretch>
+            <a:fillRect/>
+          </a:stretch>
+        </p:blipFill>
+        <p:spPr>
+          <a:xfrm>
+            <a:off x="0" y="0"/>
+            <a:ext cx="12192000" cy="6858000"/>
+          </a:xfrm>
+          <a:prstGeom prst="rect">
+            <a:avLst/>
+          </a:prstGeom>
+        </p:spPr>
+      </p:pic>
+      <p:grpSp>
+        <p:nvGrpSpPr>
+          <p:cNvPr id="193" name="Group 192">
+            <a:extLst>
+              <a:ext uri="{FF2B5EF4-FFF2-40B4-BE49-F238E27FC236}">
+                <a16:creationId xmlns:a16="http://schemas.microsoft.com/office/drawing/2014/main" id="{18DD6843-E893-4C9F-9C1F-8FE909BDF9A8}"/>
+              </a:ext>
+              <a:ext uri="{C183D7F6-B498-43B3-948B-1728B52AA6E4}">
+                <adec:decorative xmlns:adec="http://schemas.microsoft.com/office/drawing/2017/decorative" val="1"/>
+              </a:ext>
+            </a:extLst>
+          </p:cNvPr>
+          <p:cNvGrpSpPr>
+            <a:grpSpLocks noGrp="1" noUngrp="1" noRot="1" noChangeAspect="1" noMove="1" noResize="1"/>
+          </p:cNvGrpSpPr>
+          <p:nvPr>
+            <p:extLst>
+              <p:ext uri="{386F3935-93C4-4BCD-93E2-E3B085C9AB24}">
+                <p16:designElem xmlns:p16="http://schemas.microsoft.com/office/powerpoint/2015/main" val="1"/>
+              </p:ext>
+            </p:extLst>
+          </p:nvPr>
+        </p:nvGrpSpPr>
+        <p:grpSpPr>
+          <a:xfrm>
+            <a:off x="-25397" y="0"/>
+            <a:ext cx="12005350" cy="6644081"/>
+            <a:chOff x="-25397" y="0"/>
+            <a:chExt cx="12005350" cy="6644081"/>
+          </a:xfrm>
+        </p:grpSpPr>
+        <p:sp useBgFill="1">
+          <p:nvSpPr>
+            <p:cNvPr id="194" name="Rectangle 193">
+              <a:extLst>
+                <a:ext uri="{FF2B5EF4-FFF2-40B4-BE49-F238E27FC236}">
+                  <a16:creationId xmlns:a16="http://schemas.microsoft.com/office/drawing/2014/main" id="{F32B4704-8546-4AB4-85B8-A9C85EA1156F}"/>
+                </a:ext>
+                <a:ext uri="{C183D7F6-B498-43B3-948B-1728B52AA6E4}">
+                  <adec:decorative xmlns:adec="http://schemas.microsoft.com/office/drawing/2017/decorative" val="1"/>
+                </a:ext>
+              </a:extLst>
+            </p:cNvPr>
+            <p:cNvSpPr/>
+            <p:nvPr>
+              <p:extLst>
+                <p:ext uri="{386F3935-93C4-4BCD-93E2-E3B085C9AB24}">
+                  <p16:designElem xmlns:p16="http://schemas.microsoft.com/office/powerpoint/2015/main" val="1"/>
+                </p:ext>
+              </p:extLst>
+            </p:nvPr>
+          </p:nvSpPr>
+          <p:spPr>
+            <a:xfrm>
+              <a:off x="1" y="0"/>
+              <a:ext cx="11979952" cy="6644081"/>
+            </a:xfrm>
+            <a:prstGeom prst="rect">
+              <a:avLst/>
+            </a:prstGeom>
+            <a:ln>
+              <a:noFill/>
+            </a:ln>
+            <a:effectLst>
+              <a:outerShdw blurRad="98425" dist="76200" dir="4380000" algn="tl" rotWithShape="0">
+                <a:srgbClr val="000000">
+                  <a:alpha val="68000"/>
+                </a:srgbClr>
+              </a:outerShdw>
+            </a:effectLst>
+          </p:spPr>
+          <p:style>
+            <a:lnRef idx="1">
+              <a:schemeClr val="accent1"/>
+            </a:lnRef>
+            <a:fillRef idx="3">
+              <a:schemeClr val="accent1"/>
+            </a:fillRef>
+            <a:effectRef idx="2">
+              <a:schemeClr val="accent1"/>
+            </a:effectRef>
+            <a:fontRef idx="minor">
+              <a:schemeClr val="lt1"/>
+            </a:fontRef>
+          </p:style>
+        </p:sp>
+        <p:sp>
+          <p:nvSpPr>
+            <p:cNvPr id="195" name="Freeform 11">
+              <a:extLst>
+                <a:ext uri="{FF2B5EF4-FFF2-40B4-BE49-F238E27FC236}">
+                  <a16:creationId xmlns:a16="http://schemas.microsoft.com/office/drawing/2014/main" id="{966CBD22-E7EA-4C2B-96A1-021D9343A819}"/>
+                </a:ext>
+                <a:ext uri="{C183D7F6-B498-43B3-948B-1728B52AA6E4}">
+                  <adec:decorative xmlns:adec="http://schemas.microsoft.com/office/drawing/2017/decorative" val="1"/>
+                </a:ext>
+              </a:extLst>
+            </p:cNvPr>
+            <p:cNvSpPr/>
+            <p:nvPr>
+              <p:extLst>
+                <p:ext uri="{386F3935-93C4-4BCD-93E2-E3B085C9AB24}">
+                  <p16:designElem xmlns:p16="http://schemas.microsoft.com/office/powerpoint/2015/main" val="1"/>
+                </p:ext>
+              </p:extLst>
+            </p:nvPr>
+          </p:nvSpPr>
+          <p:spPr>
+            <a:xfrm>
+              <a:off x="-25397" y="0"/>
+              <a:ext cx="11773291" cy="6419514"/>
+            </a:xfrm>
+            <a:custGeom>
+              <a:avLst/>
+              <a:gdLst/>
+              <a:ahLst/>
+              <a:cxnLst/>
+              <a:rect l="l" t="t" r="r" b="b"/>
+              <a:pathLst>
+                <a:path w="11773291" h="6419514">
+                  <a:moveTo>
+                    <a:pt x="11750059" y="0"/>
+                  </a:moveTo>
+                  <a:lnTo>
+                    <a:pt x="11773291" y="6419514"/>
+                  </a:lnTo>
+                  <a:lnTo>
+                    <a:pt x="0" y="6411047"/>
+                  </a:lnTo>
+                </a:path>
+              </a:pathLst>
+            </a:custGeom>
+            <a:ln w="82550">
+              <a:solidFill>
+                <a:schemeClr val="tx1">
+                  <a:lumMod val="50000"/>
+                  <a:lumOff val="50000"/>
+                </a:schemeClr>
+              </a:solidFill>
+              <a:miter lim="800000"/>
+            </a:ln>
+          </p:spPr>
+          <p:style>
+            <a:lnRef idx="2">
+              <a:schemeClr val="accent1"/>
+            </a:lnRef>
+            <a:fillRef idx="0">
+              <a:schemeClr val="accent1"/>
+            </a:fillRef>
+            <a:effectRef idx="1">
+              <a:schemeClr val="accent1"/>
+            </a:effectRef>
+            <a:fontRef idx="minor">
+              <a:schemeClr val="tx1"/>
+            </a:fontRef>
+          </p:style>
+        </p:sp>
+        <p:sp>
+          <p:nvSpPr>
+            <p:cNvPr id="196" name="Rectangle 195">
+              <a:extLst>
+                <a:ext uri="{FF2B5EF4-FFF2-40B4-BE49-F238E27FC236}">
+                  <a16:creationId xmlns:a16="http://schemas.microsoft.com/office/drawing/2014/main" id="{237FA93B-89A3-43F5-87A5-A5B4E1BB2595}"/>
+                </a:ext>
+                <a:ext uri="{C183D7F6-B498-43B3-948B-1728B52AA6E4}">
+                  <adec:decorative xmlns:adec="http://schemas.microsoft.com/office/drawing/2017/decorative" val="1"/>
+                </a:ext>
+              </a:extLst>
+            </p:cNvPr>
+            <p:cNvSpPr/>
+            <p:nvPr>
+              <p:extLst>
+                <p:ext uri="{386F3935-93C4-4BCD-93E2-E3B085C9AB24}">
+                  <p16:designElem xmlns:p16="http://schemas.microsoft.com/office/powerpoint/2015/main" val="1"/>
+                </p:ext>
+              </p:extLst>
+            </p:nvPr>
+          </p:nvSpPr>
+          <p:spPr>
+            <a:xfrm>
+              <a:off x="1" y="5600215"/>
+              <a:ext cx="11706512" cy="780581"/>
+            </a:xfrm>
+            <a:prstGeom prst="rect">
+              <a:avLst/>
+            </a:prstGeom>
+            <a:gradFill flip="none" rotWithShape="1">
+              <a:gsLst>
+                <a:gs pos="34000">
+                  <a:schemeClr val="accent2"/>
+                </a:gs>
+                <a:gs pos="100000">
+                  <a:schemeClr val="accent2">
+                    <a:lumMod val="50000"/>
+                  </a:schemeClr>
+                </a:gs>
+              </a:gsLst>
+              <a:path path="circle">
+                <a:fillToRect l="50000" t="50000" r="50000" b="50000"/>
+              </a:path>
+              <a:tileRect/>
+            </a:gradFill>
+            <a:ln>
+              <a:noFill/>
+            </a:ln>
+          </p:spPr>
+          <p:style>
+            <a:lnRef idx="1">
+              <a:schemeClr val="accent1"/>
+            </a:lnRef>
+            <a:fillRef idx="3">
+              <a:schemeClr val="accent1"/>
+            </a:fillRef>
+            <a:effectRef idx="2">
+              <a:schemeClr val="accent1"/>
+            </a:effectRef>
+            <a:fontRef idx="minor">
+              <a:schemeClr val="lt1"/>
+            </a:fontRef>
+          </p:style>
+        </p:sp>
+      </p:grpSp>
+      <p:sp>
+        <p:nvSpPr>
+          <p:cNvPr id="6" name="Title 5">
+            <a:extLst>
+              <a:ext uri="{FF2B5EF4-FFF2-40B4-BE49-F238E27FC236}">
+                <a16:creationId xmlns:a16="http://schemas.microsoft.com/office/drawing/2014/main" id="{605F00E5-FCA4-481E-856C-1DF535DD2029}"/>
+              </a:ext>
+            </a:extLst>
+          </p:cNvPr>
+          <p:cNvSpPr>
+            <a:spLocks noGrp="1"/>
+          </p:cNvSpPr>
+          <p:nvPr>
+            <p:ph type="title"/>
+          </p:nvPr>
+        </p:nvSpPr>
+        <p:spPr>
+          <a:xfrm>
+            <a:off x="8009812" y="685800"/>
+            <a:ext cx="3681948" cy="1151965"/>
+          </a:xfrm>
+        </p:spPr>
+        <p:txBody>
+          <a:bodyPr vert="horz" lIns="91440" tIns="45720" rIns="91440" bIns="45720" rtlCol="0" anchor="ctr">
+            <a:noAutofit/>
+          </a:bodyPr>
+          <a:lstStyle/>
+          <a:p>
+            <a:r>
+              <a:rPr lang="en-US" sz="3600" b="1" dirty="0"/>
+              <a:t>Can we Forecast Alcohol Sales in </a:t>
+            </a:r>
+            <a:r>
+              <a:rPr lang="en-US" sz="3600" b="1" dirty="0" err="1"/>
+              <a:t>IowA</a:t>
+            </a:r>
+            <a:r>
+              <a:rPr lang="en-US" sz="3600" b="1" dirty="0"/>
+              <a:t>?</a:t>
+            </a:r>
+          </a:p>
+        </p:txBody>
+      </p:sp>
+      <p:sp>
+        <p:nvSpPr>
+          <p:cNvPr id="197" name="Rectangle 196">
+            <a:extLst>
+              <a:ext uri="{FF2B5EF4-FFF2-40B4-BE49-F238E27FC236}">
+                <a16:creationId xmlns:a16="http://schemas.microsoft.com/office/drawing/2014/main" id="{4DD6A7B6-3808-491D-9EB0-0459CA4040D1}"/>
+              </a:ext>
+              <a:ext uri="{C183D7F6-B498-43B3-948B-1728B52AA6E4}">
+                <adec:decorative xmlns:adec="http://schemas.microsoft.com/office/drawing/2017/decorative" val="1"/>
+              </a:ext>
+            </a:extLst>
+          </p:cNvPr>
+          <p:cNvSpPr>
+            <a:spLocks noGrp="1" noRot="1" noChangeAspect="1" noMove="1" noResize="1" noEditPoints="1" noAdjustHandles="1" noChangeArrowheads="1" noChangeShapeType="1" noTextEdit="1"/>
+          </p:cNvSpPr>
+          <p:nvPr>
+            <p:extLst>
+              <p:ext uri="{386F3935-93C4-4BCD-93E2-E3B085C9AB24}">
+                <p16:designElem xmlns:p16="http://schemas.microsoft.com/office/powerpoint/2015/main" val="1"/>
+              </p:ext>
+            </p:extLst>
+          </p:nvPr>
+        </p:nvSpPr>
+        <p:spPr>
+          <a:xfrm>
+            <a:off x="500240" y="457200"/>
+            <a:ext cx="7045932" cy="4686138"/>
+          </a:xfrm>
+          <a:prstGeom prst="rect">
+            <a:avLst/>
+          </a:prstGeom>
+          <a:solidFill>
+            <a:schemeClr val="bg1"/>
+          </a:solidFill>
+          <a:ln w="57150" cmpd="thinThick">
+            <a:solidFill>
+              <a:schemeClr val="bg1">
+                <a:lumMod val="50000"/>
+              </a:schemeClr>
+            </a:solidFill>
+            <a:miter lim="800000"/>
+          </a:ln>
+        </p:spPr>
+        <p:style>
+          <a:lnRef idx="2">
+            <a:schemeClr val="accent1">
+              <a:shade val="50000"/>
+            </a:schemeClr>
+          </a:lnRef>
+          <a:fillRef idx="1">
+            <a:schemeClr val="accent1"/>
+          </a:fillRef>
+          <a:effectRef idx="0">
+            <a:schemeClr val="accent1"/>
+          </a:effectRef>
+          <a:fontRef idx="minor">
+            <a:schemeClr val="lt1"/>
+          </a:fontRef>
+        </p:style>
+        <p:txBody>
+          <a:bodyPr rtlCol="0" anchor="ctr"/>
+          <a:lstStyle/>
+          <a:p>
+            <a:pPr algn="ctr"/>
+            <a:endParaRPr lang="en-US"/>
+          </a:p>
+        </p:txBody>
+      </p:sp>
+      <p:pic>
+        <p:nvPicPr>
+          <p:cNvPr id="1026" name="Picture 2" descr="https://www.nutritionadvance.com/wp-content/uploads/2016/10/best-alcohol-low-carb-diet.jpg">
+            <a:extLst>
+              <a:ext uri="{FF2B5EF4-FFF2-40B4-BE49-F238E27FC236}">
+                <a16:creationId xmlns:a16="http://schemas.microsoft.com/office/drawing/2014/main" id="{F6CFCDA8-E6E0-469B-B912-F72BFFD84C6C}"/>
+              </a:ext>
+            </a:extLst>
+          </p:cNvPr>
+          <p:cNvPicPr>
+            <a:picLocks noGrp="1" noChangeAspect="1" noChangeArrowheads="1"/>
+          </p:cNvPicPr>
+          <p:nvPr>
+            <p:ph sz="quarter" idx="14"/>
+          </p:nvPr>
+        </p:nvPicPr>
+        <p:blipFill rotWithShape="1">
+          <a:blip r:embed="rId4">
+            <a:extLst>
+              <a:ext uri="{28A0092B-C50C-407E-A947-70E740481C1C}">
+                <a14:useLocalDpi xmlns:a14="http://schemas.microsoft.com/office/drawing/2010/main" val="0"/>
+              </a:ext>
+            </a:extLst>
+          </a:blip>
+          <a:srcRect l="9091" t="23391"/>
+          <a:stretch/>
+        </p:blipFill>
+        <p:spPr bwMode="auto">
+          <a:xfrm>
+            <a:off x="750707" y="954759"/>
+            <a:ext cx="6557897" cy="3688831"/>
+          </a:xfrm>
+          <a:prstGeom prst="rect">
+            <a:avLst/>
+          </a:prstGeom>
+          <a:noFill/>
+          <a:extLst>
+            <a:ext uri="{909E8E84-426E-40DD-AFC4-6F175D3DCCD1}">
+              <a14:hiddenFill xmlns:a14="http://schemas.microsoft.com/office/drawing/2010/main">
+                <a:solidFill>
+                  <a:srgbClr val="FFFFFF"/>
+                </a:solidFill>
+              </a14:hiddenFill>
+            </a:ext>
+          </a:extLst>
+        </p:spPr>
+      </p:pic>
+      <p:sp>
+        <p:nvSpPr>
+          <p:cNvPr id="9" name="Content Placeholder 8">
+            <a:extLst>
+              <a:ext uri="{FF2B5EF4-FFF2-40B4-BE49-F238E27FC236}">
+                <a16:creationId xmlns:a16="http://schemas.microsoft.com/office/drawing/2014/main" id="{D885A1CC-C55D-43C0-8810-FD300CD439BF}"/>
+              </a:ext>
+            </a:extLst>
+          </p:cNvPr>
+          <p:cNvSpPr>
+            <a:spLocks noGrp="1"/>
+          </p:cNvSpPr>
+          <p:nvPr>
+            <p:ph sz="quarter" idx="13"/>
+          </p:nvPr>
+        </p:nvSpPr>
+        <p:spPr>
+          <a:xfrm>
+            <a:off x="7699991" y="2294642"/>
+            <a:ext cx="3741302" cy="2837943"/>
+          </a:xfrm>
+        </p:spPr>
+        <p:txBody>
+          <a:bodyPr vert="horz" lIns="91440" tIns="45720" rIns="91440" bIns="45720" rtlCol="0" anchor="ctr">
+            <a:normAutofit lnSpcReduction="10000"/>
+          </a:bodyPr>
+          <a:lstStyle/>
+          <a:p>
+            <a:pPr>
+              <a:lnSpc>
+                <a:spcPct val="110000"/>
+              </a:lnSpc>
+            </a:pPr>
+            <a:r>
+              <a:rPr lang="en-US" sz="2400" cap="none" dirty="0"/>
+              <a:t>Using the monthly forecast, For the month of September 2019 we believe ~70,000 liters of alcohol will be sold. This is a decrease compared to the previous month</a:t>
+            </a:r>
+          </a:p>
+        </p:txBody>
+      </p:sp>
+    </p:spTree>
+    <p:extLst>
+      <p:ext uri="{BB962C8B-B14F-4D97-AF65-F5344CB8AC3E}">
+        <p14:creationId xmlns:p14="http://schemas.microsoft.com/office/powerpoint/2010/main" val="2052400882"/>
+      </p:ext>
+    </p:extLst>
+  </p:cSld>
+  <p:clrMapOvr>
+    <a:masterClrMapping/>
+  </p:clrMapOvr>
+  <p:timing>
+    <p:tnLst>
+      <p:par>
+        <p:cTn id="1" dur="indefinite" restart="never" nodeType="tmRoot">
+          <p:childTnLst>
+            <p:seq concurrent="1" nextAc="seek">
+              <p:cTn id="2" dur="indefinite" nodeType="mainSeq">
+                <p:childTnLst>
+                  <p:par>
+                    <p:cTn id="3" fill="hold">
+                      <p:stCondLst>
+                        <p:cond delay="indefinite"/>
+                        <p:cond evt="onBegin" delay="0">
+                          <p:tn val="2"/>
+                        </p:cond>
+                      </p:stCondLst>
+                      <p:childTnLst>
+                        <p:par>
+                          <p:cTn id="4" fill="hold">
+                            <p:stCondLst>
+                              <p:cond delay="0"/>
+                            </p:stCondLst>
+                            <p:childTnLst>
+                              <p:par>
+                                <p:cTn id="5" presetID="13" presetClass="entr" presetSubtype="16" fill="hold" nodeType="afterEffect">
+                                  <p:stCondLst>
+                                    <p:cond delay="0"/>
+                                  </p:stCondLst>
+                                  <p:childTnLst>
+                                    <p:set>
+                                      <p:cBhvr>
+                                        <p:cTn id="6" dur="1" fill="hold">
+                                          <p:stCondLst>
+                                            <p:cond delay="0"/>
+                                          </p:stCondLst>
+                                        </p:cTn>
+                                        <p:tgtEl>
+                                          <p:spTgt spid="1026"/>
+                                        </p:tgtEl>
+                                        <p:attrNameLst>
+                                          <p:attrName>style.visibility</p:attrName>
+                                        </p:attrNameLst>
+                                      </p:cBhvr>
+                                      <p:to>
+                                        <p:strVal val="visible"/>
+                                      </p:to>
+                                    </p:set>
+                                    <p:animEffect transition="in" filter="plus(in)">
+                                      <p:cBhvr>
+                                        <p:cTn id="7" dur="2750"/>
+                                        <p:tgtEl>
+                                          <p:spTgt spid="1026"/>
+                                        </p:tgtEl>
+                                      </p:cBhvr>
+                                    </p:animEffect>
+                                  </p:childTnLst>
+                                </p:cTn>
+                              </p:par>
+                            </p:childTnLst>
+                          </p:cTn>
+                        </p:par>
+                      </p:childTnLst>
+                    </p:cTn>
+                  </p:par>
+                </p:childTnLst>
+              </p:cTn>
+              <p:prevCondLst>
+                <p:cond evt="onPrev" delay="0">
+                  <p:tgtEl>
+                    <p:sldTgt/>
+                  </p:tgtEl>
+                </p:cond>
+              </p:prevCondLst>
+              <p:nextCondLst>
+                <p:cond evt="onNext" delay="0">
+                  <p:tgtEl>
+                    <p:sldTgt/>
+                  </p:tgtEl>
+                </p:cond>
+              </p:nextCondLst>
+            </p:seq>
+          </p:childTnLst>
+        </p:cTn>
+      </p:par>
+    </p:tnLst>
+  </p:timing>
+</p:sld>
+</file>
+
+<file path=ppt/slides/slide17.xml><?xml version="1.0" encoding="utf-8"?>
+<p:sld xmlns:a="http://schemas.openxmlformats.org/drawingml/2006/main" xmlns:r="http://schemas.openxmlformats.org/officeDocument/2006/relationships" xmlns:p="http://schemas.openxmlformats.org/presentationml/2006/main">
+  <p:cSld>
+    <p:bg>
+      <p:bgPr>
+        <a:blipFill>
+          <a:blip r:embed="rId2">
+            <a:duotone>
+              <a:schemeClr val="bg1">
+                <a:shade val="48000"/>
+                <a:satMod val="110000"/>
+                <a:lumMod val="40000"/>
+              </a:schemeClr>
+              <a:schemeClr val="bg1">
+                <a:tint val="90000"/>
+                <a:lumMod val="106000"/>
+              </a:schemeClr>
+            </a:duotone>
           </a:blip>
           <a:stretch/>
         </a:blipFill>
@@ -18144,7 +20439,7 @@
 </p:sld>
 </file>
 
-<file path=ppt/slides/slide14.xml><?xml version="1.0" encoding="utf-8"?>
+<file path=ppt/slides/slide18.xml><?xml version="1.0" encoding="utf-8"?>
 <p:sld xmlns:a="http://schemas.openxmlformats.org/drawingml/2006/main" xmlns:r="http://schemas.openxmlformats.org/officeDocument/2006/relationships" xmlns:p="http://schemas.openxmlformats.org/presentationml/2006/main">
   <p:cSld>
     <p:bg>
@@ -18162,7 +20457,6 @@
                 <a:lumMod val="106000"/>
               </a:schemeClr>
             </a:duotone>
-            <a:extLst/>
           </a:blip>
           <a:stretch/>
         </a:blipFill>
@@ -18967,7 +21261,7 @@
 </p:sld>
 </file>
 
-<file path=ppt/slides/slide15.xml><?xml version="1.0" encoding="utf-8"?>
+<file path=ppt/slides/slide19.xml><?xml version="1.0" encoding="utf-8"?>
 <p:sld xmlns:a="http://schemas.openxmlformats.org/drawingml/2006/main" xmlns:r="http://schemas.openxmlformats.org/officeDocument/2006/relationships" xmlns:p="http://schemas.openxmlformats.org/presentationml/2006/main">
   <p:cSld>
     <p:spTree>
@@ -23090,7 +25384,7 @@
         <p:spPr>
           <a:xfrm>
             <a:off x="4523418" y="3480538"/>
-            <a:ext cx="1524000" cy="338554"/>
+            <a:ext cx="1524000" cy="584775"/>
           </a:xfrm>
           <a:prstGeom prst="rect">
             <a:avLst/>
@@ -23110,6 +25404,17 @@
               <a:rPr lang="en-US" sz="1600" dirty="0"/>
               <a:t>Forecast</a:t>
             </a:r>
+          </a:p>
+          <a:p>
+            <a:pPr marL="285750" indent="-285750">
+              <a:buFont typeface="Arial" panose="020B0604020202020204" pitchFamily="34" charset="0"/>
+              <a:buChar char="•"/>
+            </a:pPr>
+            <a:r>
+              <a:rPr lang="en-US" sz="1600" dirty="0" err="1"/>
+              <a:t>TSeries</a:t>
+            </a:r>
+            <a:endParaRPr lang="en-US" sz="1600" dirty="0"/>
           </a:p>
         </p:txBody>
       </p:sp>
@@ -23726,6 +26031,224 @@
   <p:clrMapOvr>
     <a:masterClrMapping/>
   </p:clrMapOvr>
+  <p:timing>
+    <p:tnLst>
+      <p:par>
+        <p:cTn id="1" dur="indefinite" restart="never" nodeType="tmRoot">
+          <p:childTnLst>
+            <p:seq concurrent="1" nextAc="seek">
+              <p:cTn id="2" dur="indefinite" nodeType="mainSeq">
+                <p:childTnLst>
+                  <p:par>
+                    <p:cTn id="3" fill="hold">
+                      <p:stCondLst>
+                        <p:cond delay="indefinite"/>
+                        <p:cond evt="onBegin" delay="0">
+                          <p:tn val="2"/>
+                        </p:cond>
+                      </p:stCondLst>
+                      <p:childTnLst>
+                        <p:par>
+                          <p:cTn id="4" fill="hold">
+                            <p:stCondLst>
+                              <p:cond delay="0"/>
+                            </p:stCondLst>
+                            <p:childTnLst>
+                              <p:par>
+                                <p:cTn id="5" presetID="10" presetClass="entr" presetSubtype="0" fill="hold" nodeType="afterEffect">
+                                  <p:stCondLst>
+                                    <p:cond delay="0"/>
+                                  </p:stCondLst>
+                                  <p:childTnLst>
+                                    <p:set>
+                                      <p:cBhvr>
+                                        <p:cTn id="6" dur="1" fill="hold">
+                                          <p:stCondLst>
+                                            <p:cond delay="0"/>
+                                          </p:stCondLst>
+                                        </p:cTn>
+                                        <p:tgtEl>
+                                          <p:spTgt spid="1028"/>
+                                        </p:tgtEl>
+                                        <p:attrNameLst>
+                                          <p:attrName>style.visibility</p:attrName>
+                                        </p:attrNameLst>
+                                      </p:cBhvr>
+                                      <p:to>
+                                        <p:strVal val="visible"/>
+                                      </p:to>
+                                    </p:set>
+                                    <p:animEffect transition="in" filter="fade">
+                                      <p:cBhvr>
+                                        <p:cTn id="7" dur="500"/>
+                                        <p:tgtEl>
+                                          <p:spTgt spid="1028"/>
+                                        </p:tgtEl>
+                                      </p:cBhvr>
+                                    </p:animEffect>
+                                  </p:childTnLst>
+                                </p:cTn>
+                              </p:par>
+                            </p:childTnLst>
+                          </p:cTn>
+                        </p:par>
+                        <p:par>
+                          <p:cTn id="8" fill="hold">
+                            <p:stCondLst>
+                              <p:cond delay="500"/>
+                            </p:stCondLst>
+                            <p:childTnLst>
+                              <p:par>
+                                <p:cTn id="9" presetID="10" presetClass="entr" presetSubtype="0" fill="hold" nodeType="afterEffect">
+                                  <p:stCondLst>
+                                    <p:cond delay="0"/>
+                                  </p:stCondLst>
+                                  <p:childTnLst>
+                                    <p:set>
+                                      <p:cBhvr>
+                                        <p:cTn id="10" dur="1" fill="hold">
+                                          <p:stCondLst>
+                                            <p:cond delay="0"/>
+                                          </p:stCondLst>
+                                        </p:cTn>
+                                        <p:tgtEl>
+                                          <p:spTgt spid="1034"/>
+                                        </p:tgtEl>
+                                        <p:attrNameLst>
+                                          <p:attrName>style.visibility</p:attrName>
+                                        </p:attrNameLst>
+                                      </p:cBhvr>
+                                      <p:to>
+                                        <p:strVal val="visible"/>
+                                      </p:to>
+                                    </p:set>
+                                    <p:animEffect transition="in" filter="fade">
+                                      <p:cBhvr>
+                                        <p:cTn id="11" dur="500"/>
+                                        <p:tgtEl>
+                                          <p:spTgt spid="1034"/>
+                                        </p:tgtEl>
+                                      </p:cBhvr>
+                                    </p:animEffect>
+                                  </p:childTnLst>
+                                </p:cTn>
+                              </p:par>
+                            </p:childTnLst>
+                          </p:cTn>
+                        </p:par>
+                        <p:par>
+                          <p:cTn id="12" fill="hold">
+                            <p:stCondLst>
+                              <p:cond delay="1000"/>
+                            </p:stCondLst>
+                            <p:childTnLst>
+                              <p:par>
+                                <p:cTn id="13" presetID="10" presetClass="entr" presetSubtype="0" fill="hold" nodeType="afterEffect">
+                                  <p:stCondLst>
+                                    <p:cond delay="0"/>
+                                  </p:stCondLst>
+                                  <p:childTnLst>
+                                    <p:set>
+                                      <p:cBhvr>
+                                        <p:cTn id="14" dur="1" fill="hold">
+                                          <p:stCondLst>
+                                            <p:cond delay="0"/>
+                                          </p:stCondLst>
+                                        </p:cTn>
+                                        <p:tgtEl>
+                                          <p:spTgt spid="1040"/>
+                                        </p:tgtEl>
+                                        <p:attrNameLst>
+                                          <p:attrName>style.visibility</p:attrName>
+                                        </p:attrNameLst>
+                                      </p:cBhvr>
+                                      <p:to>
+                                        <p:strVal val="visible"/>
+                                      </p:to>
+                                    </p:set>
+                                    <p:animEffect transition="in" filter="fade">
+                                      <p:cBhvr>
+                                        <p:cTn id="15" dur="500"/>
+                                        <p:tgtEl>
+                                          <p:spTgt spid="1040"/>
+                                        </p:tgtEl>
+                                      </p:cBhvr>
+                                    </p:animEffect>
+                                  </p:childTnLst>
+                                </p:cTn>
+                              </p:par>
+                            </p:childTnLst>
+                          </p:cTn>
+                        </p:par>
+                        <p:par>
+                          <p:cTn id="16" fill="hold">
+                            <p:stCondLst>
+                              <p:cond delay="1500"/>
+                            </p:stCondLst>
+                            <p:childTnLst>
+                              <p:par>
+                                <p:cTn id="17" presetID="10" presetClass="entr" presetSubtype="0" fill="hold" nodeType="afterEffect">
+                                  <p:stCondLst>
+                                    <p:cond delay="0"/>
+                                  </p:stCondLst>
+                                  <p:childTnLst>
+                                    <p:set>
+                                      <p:cBhvr>
+                                        <p:cTn id="18" dur="1" fill="hold">
+                                          <p:stCondLst>
+                                            <p:cond delay="0"/>
+                                          </p:stCondLst>
+                                        </p:cTn>
+                                        <p:tgtEl>
+                                          <p:spTgt spid="1032"/>
+                                        </p:tgtEl>
+                                        <p:attrNameLst>
+                                          <p:attrName>style.visibility</p:attrName>
+                                        </p:attrNameLst>
+                                      </p:cBhvr>
+                                      <p:to>
+                                        <p:strVal val="visible"/>
+                                      </p:to>
+                                    </p:set>
+                                    <p:animEffect transition="in" filter="fade">
+                                      <p:cBhvr>
+                                        <p:cTn id="19" dur="500"/>
+                                        <p:tgtEl>
+                                          <p:spTgt spid="1032"/>
+                                        </p:tgtEl>
+                                      </p:cBhvr>
+                                    </p:animEffect>
+                                  </p:childTnLst>
+                                </p:cTn>
+                              </p:par>
+                            </p:childTnLst>
+                          </p:cTn>
+                        </p:par>
+                      </p:childTnLst>
+                    </p:cTn>
+                  </p:par>
+                </p:childTnLst>
+              </p:cTn>
+              <p:prevCondLst>
+                <p:cond evt="onPrev" delay="0">
+                  <p:tgtEl>
+                    <p:sldTgt/>
+                  </p:tgtEl>
+                </p:cond>
+              </p:prevCondLst>
+              <p:nextCondLst>
+                <p:cond evt="onNext" delay="0">
+                  <p:tgtEl>
+                    <p:sldTgt/>
+                  </p:tgtEl>
+                </p:cond>
+              </p:nextCondLst>
+            </p:seq>
+          </p:childTnLst>
+        </p:cTn>
+      </p:par>
+    </p:tnLst>
+  </p:timing>
 </p:sld>
 </file>
 
@@ -23747,7 +26270,6 @@
                 <a:lumMod val="106000"/>
               </a:schemeClr>
             </a:duotone>
-            <a:extLst/>
           </a:blip>
           <a:stretch/>
         </a:blipFill>
@@ -27085,8 +29607,8 @@
         </p:nvSpPr>
         <p:spPr>
           <a:xfrm>
-            <a:off x="9144000" y="1028343"/>
-            <a:ext cx="2235199" cy="4801314"/>
+            <a:off x="9144000" y="2136336"/>
+            <a:ext cx="2235199" cy="2585323"/>
           </a:xfrm>
           <a:prstGeom prst="rect">
             <a:avLst/>
@@ -27121,40 +29643,40 @@
             <a:endParaRPr lang="en-US" dirty="0"/>
           </a:p>
           <a:p>
-            <a:endParaRPr lang="en-US" dirty="0"/>
-          </a:p>
-          <a:p>
-            <a:endParaRPr lang="en-US" dirty="0"/>
-          </a:p>
-          <a:p>
-            <a:endParaRPr lang="en-US" dirty="0"/>
-          </a:p>
-          <a:p>
             <a:r>
-              <a:rPr lang="en-US" dirty="0"/>
-              <a:t>Is a text box needed??</a:t>
+              <a:rPr lang="en-US" b="1" dirty="0"/>
+              <a:t>About the data:</a:t>
             </a:r>
           </a:p>
           <a:p>
-            <a:endParaRPr lang="en-US" dirty="0"/>
+            <a:pPr marL="285750" indent="-285750">
+              <a:buFont typeface="Arial" panose="020B0604020202020204" pitchFamily="34" charset="0"/>
+              <a:buChar char="•"/>
+            </a:pPr>
+            <a:r>
+              <a:rPr lang="en-US" dirty="0"/>
+              <a:t>4.17 GB file</a:t>
+            </a:r>
           </a:p>
           <a:p>
-            <a:endParaRPr lang="en-US" dirty="0"/>
+            <a:pPr marL="285750" indent="-285750">
+              <a:buFont typeface="Arial" panose="020B0604020202020204" pitchFamily="34" charset="0"/>
+              <a:buChar char="•"/>
+            </a:pPr>
+            <a:r>
+              <a:rPr lang="en-US" dirty="0"/>
+              <a:t>16,494,826 rows</a:t>
+            </a:r>
           </a:p>
           <a:p>
-            <a:endParaRPr lang="en-US" dirty="0"/>
-          </a:p>
-          <a:p>
-            <a:endParaRPr lang="en-US" dirty="0"/>
-          </a:p>
-          <a:p>
-            <a:endParaRPr lang="en-US" dirty="0"/>
-          </a:p>
-          <a:p>
-            <a:endParaRPr lang="en-US" dirty="0"/>
-          </a:p>
-          <a:p>
-            <a:endParaRPr lang="en-US" dirty="0"/>
+            <a:pPr marL="285750" indent="-285750">
+              <a:buFont typeface="Arial" panose="020B0604020202020204" pitchFamily="34" charset="0"/>
+              <a:buChar char="•"/>
+            </a:pPr>
+            <a:r>
+              <a:rPr lang="en-US" dirty="0"/>
+              <a:t>2012-2019(June)</a:t>
+            </a:r>
           </a:p>
           <a:p>
             <a:endParaRPr lang="en-US" dirty="0"/>
@@ -27219,6 +29741,92 @@
   <p:clrMapOvr>
     <a:masterClrMapping/>
   </p:clrMapOvr>
+  <p:timing>
+    <p:tnLst>
+      <p:par>
+        <p:cTn id="1" dur="indefinite" restart="never" nodeType="tmRoot">
+          <p:childTnLst>
+            <p:seq concurrent="1" nextAc="seek">
+              <p:cTn id="2" dur="indefinite" nodeType="mainSeq">
+                <p:childTnLst>
+                  <p:par>
+                    <p:cTn id="3" fill="hold">
+                      <p:stCondLst>
+                        <p:cond delay="indefinite"/>
+                        <p:cond evt="onBegin" delay="0">
+                          <p:tn val="2"/>
+                        </p:cond>
+                      </p:stCondLst>
+                      <p:childTnLst>
+                        <p:par>
+                          <p:cTn id="4" fill="hold">
+                            <p:stCondLst>
+                              <p:cond delay="0"/>
+                            </p:stCondLst>
+                            <p:childTnLst>
+                              <p:par>
+                                <p:cTn id="5" presetID="16" presetClass="entr" presetSubtype="21" fill="hold" nodeType="afterEffect">
+                                  <p:stCondLst>
+                                    <p:cond delay="0"/>
+                                  </p:stCondLst>
+                                  <p:childTnLst>
+                                    <p:set>
+                                      <p:cBhvr>
+                                        <p:cTn id="6" dur="1" fill="hold">
+                                          <p:stCondLst>
+                                            <p:cond delay="0"/>
+                                          </p:stCondLst>
+                                        </p:cTn>
+                                        <p:tgtEl>
+                                          <p:spTgt spid="6"/>
+                                        </p:tgtEl>
+                                        <p:attrNameLst>
+                                          <p:attrName>style.visibility</p:attrName>
+                                        </p:attrNameLst>
+                                      </p:cBhvr>
+                                      <p:to>
+                                        <p:strVal val="visible"/>
+                                      </p:to>
+                                    </p:set>
+                                    <p:animEffect transition="in" filter="barn(inVertical)">
+                                      <p:cBhvr>
+                                        <p:cTn id="7" dur="1000"/>
+                                        <p:tgtEl>
+                                          <p:spTgt spid="6"/>
+                                        </p:tgtEl>
+                                      </p:cBhvr>
+                                    </p:animEffect>
+                                  </p:childTnLst>
+                                </p:cTn>
+                              </p:par>
+                            </p:childTnLst>
+                          </p:cTn>
+                        </p:par>
+                      </p:childTnLst>
+                    </p:cTn>
+                  </p:par>
+                </p:childTnLst>
+              </p:cTn>
+              <p:prevCondLst>
+                <p:cond evt="onPrev" delay="0">
+                  <p:tgtEl>
+                    <p:sldTgt/>
+                  </p:tgtEl>
+                </p:cond>
+              </p:prevCondLst>
+              <p:nextCondLst>
+                <p:cond evt="onNext" delay="0">
+                  <p:tgtEl>
+                    <p:sldTgt/>
+                  </p:tgtEl>
+                </p:cond>
+              </p:nextCondLst>
+            </p:seq>
+          </p:childTnLst>
+        </p:cTn>
+      </p:par>
+    </p:tnLst>
+  </p:timing>
 </p:sld>
 </file>
 
@@ -28672,7 +31280,6 @@
                 <a:lumMod val="106000"/>
               </a:schemeClr>
             </a:duotone>
-            <a:extLst/>
           </a:blip>
           <a:stretch/>
         </a:blipFill>
@@ -28840,6 +31447,92 @@
   <p:clrMapOvr>
     <a:masterClrMapping/>
   </p:clrMapOvr>
+  <p:timing>
+    <p:tnLst>
+      <p:par>
+        <p:cTn id="1" dur="indefinite" restart="never" nodeType="tmRoot">
+          <p:childTnLst>
+            <p:seq concurrent="1" nextAc="seek">
+              <p:cTn id="2" dur="indefinite" nodeType="mainSeq">
+                <p:childTnLst>
+                  <p:par>
+                    <p:cTn id="3" fill="hold">
+                      <p:stCondLst>
+                        <p:cond delay="indefinite"/>
+                        <p:cond evt="onBegin" delay="0">
+                          <p:tn val="2"/>
+                        </p:cond>
+                      </p:stCondLst>
+                      <p:childTnLst>
+                        <p:par>
+                          <p:cTn id="4" fill="hold">
+                            <p:stCondLst>
+                              <p:cond delay="0"/>
+                            </p:stCondLst>
+                            <p:childTnLst>
+                              <p:par>
+                                <p:cTn id="5" presetID="21" presetClass="entr" presetSubtype="1" fill="hold" nodeType="afterEffect">
+                                  <p:stCondLst>
+                                    <p:cond delay="0"/>
+                                  </p:stCondLst>
+                                  <p:childTnLst>
+                                    <p:set>
+                                      <p:cBhvr>
+                                        <p:cTn id="6" dur="1" fill="hold">
+                                          <p:stCondLst>
+                                            <p:cond delay="0"/>
+                                          </p:stCondLst>
+                                        </p:cTn>
+                                        <p:tgtEl>
+                                          <p:spTgt spid="4"/>
+                                        </p:tgtEl>
+                                        <p:attrNameLst>
+                                          <p:attrName>style.visibility</p:attrName>
+                                        </p:attrNameLst>
+                                      </p:cBhvr>
+                                      <p:to>
+                                        <p:strVal val="visible"/>
+                                      </p:to>
+                                    </p:set>
+                                    <p:animEffect transition="in" filter="wheel(1)">
+                                      <p:cBhvr>
+                                        <p:cTn id="7" dur="2500"/>
+                                        <p:tgtEl>
+                                          <p:spTgt spid="4"/>
+                                        </p:tgtEl>
+                                      </p:cBhvr>
+                                    </p:animEffect>
+                                  </p:childTnLst>
+                                </p:cTn>
+                              </p:par>
+                            </p:childTnLst>
+                          </p:cTn>
+                        </p:par>
+                      </p:childTnLst>
+                    </p:cTn>
+                  </p:par>
+                </p:childTnLst>
+              </p:cTn>
+              <p:prevCondLst>
+                <p:cond evt="onPrev" delay="0">
+                  <p:tgtEl>
+                    <p:sldTgt/>
+                  </p:tgtEl>
+                </p:cond>
+              </p:prevCondLst>
+              <p:nextCondLst>
+                <p:cond evt="onNext" delay="0">
+                  <p:tgtEl>
+                    <p:sldTgt/>
+                  </p:tgtEl>
+                </p:cond>
+              </p:nextCondLst>
+            </p:seq>
+          </p:childTnLst>
+        </p:cTn>
+      </p:par>
+    </p:tnLst>
+  </p:timing>
 </p:sld>
 </file>
 
@@ -28890,7 +31583,7 @@
           <a:p>
             <a:r>
               <a:rPr lang="en-US" dirty="0"/>
-              <a:t>volume sold in liters (2012-2018)</a:t>
+              <a:t>volume sold in liters (2012-2019)</a:t>
             </a:r>
           </a:p>
         </p:txBody>
@@ -29043,6 +31736,92 @@
   <p:clrMapOvr>
     <a:masterClrMapping/>
   </p:clrMapOvr>
+  <p:timing>
+    <p:tnLst>
+      <p:par>
+        <p:cTn id="1" dur="indefinite" restart="never" nodeType="tmRoot">
+          <p:childTnLst>
+            <p:seq concurrent="1" nextAc="seek">
+              <p:cTn id="2" dur="indefinite" nodeType="mainSeq">
+                <p:childTnLst>
+                  <p:par>
+                    <p:cTn id="3" fill="hold">
+                      <p:stCondLst>
+                        <p:cond delay="indefinite"/>
+                        <p:cond evt="onBegin" delay="0">
+                          <p:tn val="2"/>
+                        </p:cond>
+                      </p:stCondLst>
+                      <p:childTnLst>
+                        <p:par>
+                          <p:cTn id="4" fill="hold">
+                            <p:stCondLst>
+                              <p:cond delay="0"/>
+                            </p:stCondLst>
+                            <p:childTnLst>
+                              <p:par>
+                                <p:cTn id="5" presetID="14" presetClass="entr" presetSubtype="10" fill="hold" nodeType="afterEffect">
+                                  <p:stCondLst>
+                                    <p:cond delay="0"/>
+                                  </p:stCondLst>
+                                  <p:childTnLst>
+                                    <p:set>
+                                      <p:cBhvr>
+                                        <p:cTn id="6" dur="1" fill="hold">
+                                          <p:stCondLst>
+                                            <p:cond delay="0"/>
+                                          </p:stCondLst>
+                                        </p:cTn>
+                                        <p:tgtEl>
+                                          <p:spTgt spid="4"/>
+                                        </p:tgtEl>
+                                        <p:attrNameLst>
+                                          <p:attrName>style.visibility</p:attrName>
+                                        </p:attrNameLst>
+                                      </p:cBhvr>
+                                      <p:to>
+                                        <p:strVal val="visible"/>
+                                      </p:to>
+                                    </p:set>
+                                    <p:animEffect transition="in" filter="randombar(horizontal)">
+                                      <p:cBhvr>
+                                        <p:cTn id="7" dur="1000"/>
+                                        <p:tgtEl>
+                                          <p:spTgt spid="4"/>
+                                        </p:tgtEl>
+                                      </p:cBhvr>
+                                    </p:animEffect>
+                                  </p:childTnLst>
+                                </p:cTn>
+                              </p:par>
+                            </p:childTnLst>
+                          </p:cTn>
+                        </p:par>
+                      </p:childTnLst>
+                    </p:cTn>
+                  </p:par>
+                </p:childTnLst>
+              </p:cTn>
+              <p:prevCondLst>
+                <p:cond evt="onPrev" delay="0">
+                  <p:tgtEl>
+                    <p:sldTgt/>
+                  </p:tgtEl>
+                </p:cond>
+              </p:prevCondLst>
+              <p:nextCondLst>
+                <p:cond evt="onNext" delay="0">
+                  <p:tgtEl>
+                    <p:sldTgt/>
+                  </p:tgtEl>
+                </p:cond>
+              </p:nextCondLst>
+            </p:seq>
+          </p:childTnLst>
+        </p:cTn>
+      </p:par>
+    </p:tnLst>
+  </p:timing>
 </p:sld>
 </file>
 

</xml_diff>

<commit_message>
0808 added work after presentation
</commit_message>
<xml_diff>
--- a/other/presentation.pptx
+++ b/other/presentation.pptx
@@ -21,9 +21,10 @@
     <p:sldId id="274" r:id="rId15"/>
     <p:sldId id="275" r:id="rId16"/>
     <p:sldId id="269" r:id="rId17"/>
-    <p:sldId id="263" r:id="rId18"/>
-    <p:sldId id="270" r:id="rId19"/>
-    <p:sldId id="257" r:id="rId20"/>
+    <p:sldId id="276" r:id="rId18"/>
+    <p:sldId id="263" r:id="rId19"/>
+    <p:sldId id="270" r:id="rId20"/>
+    <p:sldId id="277" r:id="rId21"/>
   </p:sldIdLst>
   <p:sldSz cx="12192000" cy="6858000"/>
   <p:notesSz cx="6858000" cy="9144000"/>
@@ -14810,10 +14811,9 @@
           <a:lstStyle/>
           <a:p>
             <a:r>
-              <a:rPr lang="en-US"/>
+              <a:rPr lang="en-US" dirty="0"/>
               <a:t>Liquor in Iowa</a:t>
             </a:r>
-            <a:endParaRPr lang="en-US" dirty="0"/>
           </a:p>
         </p:txBody>
       </p:sp>
@@ -15657,6 +15657,166 @@
           <a:p>
             <a:pPr algn="ctr"/>
             <a:endParaRPr lang="en-US"/>
+          </a:p>
+        </p:txBody>
+      </p:sp>
+      <p:sp>
+        <p:nvSpPr>
+          <p:cNvPr id="5" name="TextBox 4">
+            <a:extLst>
+              <a:ext uri="{FF2B5EF4-FFF2-40B4-BE49-F238E27FC236}">
+                <a16:creationId xmlns:a16="http://schemas.microsoft.com/office/drawing/2014/main" id="{7EB0C623-F87E-4758-967C-3FE40A8E5BFD}"/>
+              </a:ext>
+            </a:extLst>
+          </p:cNvPr>
+          <p:cNvSpPr txBox="1"/>
+          <p:nvPr/>
+        </p:nvSpPr>
+        <p:spPr>
+          <a:xfrm rot="21401836">
+            <a:off x="7314897" y="4523362"/>
+            <a:ext cx="3877637" cy="1138773"/>
+          </a:xfrm>
+          <a:prstGeom prst="rect">
+            <a:avLst/>
+          </a:prstGeom>
+          <a:noFill/>
+        </p:spPr>
+        <p:txBody>
+          <a:bodyPr wrap="square" rtlCol="0">
+            <a:spAutoFit/>
+          </a:bodyPr>
+          <a:lstStyle/>
+          <a:p>
+            <a:r>
+              <a:rPr lang="en-US" dirty="0"/>
+              <a:t>Prepared by Data Distilleries Group</a:t>
+            </a:r>
+          </a:p>
+          <a:p>
+            <a:endParaRPr lang="en-US" dirty="0"/>
+          </a:p>
+          <a:p>
+            <a:r>
+              <a:rPr lang="en-US" sz="1600" dirty="0"/>
+              <a:t>Adrian Jackson, Francis </a:t>
+            </a:r>
+            <a:r>
+              <a:rPr lang="en-US" sz="1600" dirty="0" err="1"/>
+              <a:t>Kabongo</a:t>
+            </a:r>
+            <a:r>
+              <a:rPr lang="en-US" sz="1600" dirty="0"/>
+              <a:t>, </a:t>
+            </a:r>
+          </a:p>
+          <a:p>
+            <a:r>
+              <a:rPr lang="en-US" sz="1600" dirty="0"/>
+              <a:t>Farah </a:t>
+            </a:r>
+            <a:r>
+              <a:rPr lang="en-US" sz="1600" dirty="0" err="1"/>
+              <a:t>Clerveau</a:t>
+            </a:r>
+            <a:r>
+              <a:rPr lang="en-US" sz="1600" dirty="0"/>
+              <a:t>, &amp; Lorie Grant</a:t>
+            </a:r>
+          </a:p>
+        </p:txBody>
+      </p:sp>
+      <p:pic>
+        <p:nvPicPr>
+          <p:cNvPr id="1026" name="Picture 2" descr="https://tse3.mm.bing.net/th?id=OIP.Pw8DXg2GkL1cZ0uK_pYnhwHaBx&amp;pid=Api&amp;P=0&amp;w=489&amp;h=118">
+            <a:extLst>
+              <a:ext uri="{FF2B5EF4-FFF2-40B4-BE49-F238E27FC236}">
+                <a16:creationId xmlns:a16="http://schemas.microsoft.com/office/drawing/2014/main" id="{C9F90FF5-8DBD-440E-96D0-D9BD4F498B8D}"/>
+              </a:ext>
+            </a:extLst>
+          </p:cNvPr>
+          <p:cNvPicPr>
+            <a:picLocks noChangeAspect="1" noChangeArrowheads="1"/>
+          </p:cNvPicPr>
+          <p:nvPr/>
+        </p:nvPicPr>
+        <p:blipFill>
+          <a:blip r:embed="rId4">
+            <a:extLst>
+              <a:ext uri="{28A0092B-C50C-407E-A947-70E740481C1C}">
+                <a14:useLocalDpi xmlns:a14="http://schemas.microsoft.com/office/drawing/2010/main" val="0"/>
+              </a:ext>
+            </a:extLst>
+          </a:blip>
+          <a:srcRect/>
+          <a:stretch>
+            <a:fillRect/>
+          </a:stretch>
+        </p:blipFill>
+        <p:spPr bwMode="auto">
+          <a:xfrm rot="21391516">
+            <a:off x="180422" y="454785"/>
+            <a:ext cx="2439357" cy="581534"/>
+          </a:xfrm>
+          <a:prstGeom prst="rect">
+            <a:avLst/>
+          </a:prstGeom>
+          <a:noFill/>
+          <a:extLst>
+            <a:ext uri="{909E8E84-426E-40DD-AFC4-6F175D3DCCD1}">
+              <a14:hiddenFill xmlns:a14="http://schemas.microsoft.com/office/drawing/2010/main">
+                <a:solidFill>
+                  <a:srgbClr val="FFFFFF"/>
+                </a:solidFill>
+              </a14:hiddenFill>
+            </a:ext>
+          </a:extLst>
+        </p:spPr>
+      </p:pic>
+      <p:sp>
+        <p:nvSpPr>
+          <p:cNvPr id="8" name="TextBox 7">
+            <a:extLst>
+              <a:ext uri="{FF2B5EF4-FFF2-40B4-BE49-F238E27FC236}">
+                <a16:creationId xmlns:a16="http://schemas.microsoft.com/office/drawing/2014/main" id="{F03641F0-569C-4E35-BEDA-EF2E26D1828A}"/>
+              </a:ext>
+            </a:extLst>
+          </p:cNvPr>
+          <p:cNvSpPr txBox="1"/>
+          <p:nvPr/>
+        </p:nvSpPr>
+        <p:spPr>
+          <a:xfrm rot="21401836">
+            <a:off x="16424" y="5132645"/>
+            <a:ext cx="3709554" cy="800219"/>
+          </a:xfrm>
+          <a:prstGeom prst="rect">
+            <a:avLst/>
+          </a:prstGeom>
+          <a:noFill/>
+        </p:spPr>
+        <p:txBody>
+          <a:bodyPr wrap="square" rtlCol="0">
+            <a:spAutoFit/>
+          </a:bodyPr>
+          <a:lstStyle/>
+          <a:p>
+            <a:r>
+              <a:rPr lang="en-US" dirty="0"/>
+              <a:t>08 August 2019</a:t>
+            </a:r>
+          </a:p>
+          <a:p>
+            <a:r>
+              <a:rPr lang="en-US" sz="1400" dirty="0"/>
+              <a:t>Data Science &amp; Analytics Bootcamp</a:t>
+            </a:r>
+          </a:p>
+          <a:p>
+            <a:r>
+              <a:rPr lang="en-US" sz="1400" dirty="0"/>
+              <a:t>Project 3</a:t>
+            </a:r>
           </a:p>
         </p:txBody>
       </p:sp>
@@ -19315,17 +19475,10 @@
           </a:bodyPr>
           <a:lstStyle/>
           <a:p>
+            <a:pPr algn="ctr"/>
             <a:r>
               <a:rPr lang="en-US" sz="3600" b="1" dirty="0"/>
-              <a:t>Can we Forecast Alcohol Sales in </a:t>
-            </a:r>
-            <a:r>
-              <a:rPr lang="en-US" sz="3600" b="1" dirty="0" err="1"/>
-              <a:t>IowA</a:t>
-            </a:r>
-            <a:r>
-              <a:rPr lang="en-US" sz="3600" b="1" dirty="0"/>
-              <a:t>?</a:t>
+              <a:t>Can we Forecast Demand?</a:t>
             </a:r>
           </a:p>
         </p:txBody>
@@ -19585,6 +19738,221 @@
 </file>
 
 <file path=ppt/slides/slide17.xml><?xml version="1.0" encoding="utf-8"?>
+<p:sld xmlns:a="http://schemas.openxmlformats.org/drawingml/2006/main" xmlns:r="http://schemas.openxmlformats.org/officeDocument/2006/relationships" xmlns:p="http://schemas.openxmlformats.org/presentationml/2006/main">
+  <p:cSld>
+    <p:spTree>
+      <p:nvGrpSpPr>
+        <p:cNvPr id="1" name=""/>
+        <p:cNvGrpSpPr/>
+        <p:nvPr/>
+      </p:nvGrpSpPr>
+      <p:grpSpPr>
+        <a:xfrm>
+          <a:off x="0" y="0"/>
+          <a:ext cx="0" cy="0"/>
+          <a:chOff x="0" y="0"/>
+          <a:chExt cx="0" cy="0"/>
+        </a:xfrm>
+      </p:grpSpPr>
+      <p:sp>
+        <p:nvSpPr>
+          <p:cNvPr id="2" name="Title 1">
+            <a:extLst>
+              <a:ext uri="{FF2B5EF4-FFF2-40B4-BE49-F238E27FC236}">
+                <a16:creationId xmlns:a16="http://schemas.microsoft.com/office/drawing/2014/main" id="{EB8ACC2B-C18C-46C3-9D18-E9B5112DE8D3}"/>
+              </a:ext>
+            </a:extLst>
+          </p:cNvPr>
+          <p:cNvSpPr>
+            <a:spLocks noGrp="1"/>
+          </p:cNvSpPr>
+          <p:nvPr>
+            <p:ph type="title"/>
+          </p:nvPr>
+        </p:nvSpPr>
+        <p:spPr/>
+        <p:txBody>
+          <a:bodyPr/>
+          <a:lstStyle/>
+          <a:p>
+            <a:r>
+              <a:rPr lang="en-US" dirty="0"/>
+              <a:t>Tableau Visualization Forecast</a:t>
+            </a:r>
+          </a:p>
+        </p:txBody>
+      </p:sp>
+      <p:pic>
+        <p:nvPicPr>
+          <p:cNvPr id="3" name="Picture 2">
+            <a:extLst>
+              <a:ext uri="{FF2B5EF4-FFF2-40B4-BE49-F238E27FC236}">
+                <a16:creationId xmlns:a16="http://schemas.microsoft.com/office/drawing/2014/main" id="{96B24BD7-F6C2-4244-A380-A992714A7A6B}"/>
+              </a:ext>
+            </a:extLst>
+          </p:cNvPr>
+          <p:cNvPicPr>
+            <a:picLocks noChangeAspect="1"/>
+          </p:cNvPicPr>
+          <p:nvPr/>
+        </p:nvPicPr>
+        <p:blipFill>
+          <a:blip r:embed="rId2"/>
+          <a:stretch>
+            <a:fillRect/>
+          </a:stretch>
+        </p:blipFill>
+        <p:spPr>
+          <a:xfrm>
+            <a:off x="1700780" y="1691701"/>
+            <a:ext cx="8124354" cy="3824474"/>
+          </a:xfrm>
+          <a:prstGeom prst="rect">
+            <a:avLst/>
+          </a:prstGeom>
+        </p:spPr>
+      </p:pic>
+      <p:sp>
+        <p:nvSpPr>
+          <p:cNvPr id="4" name="Rectangle 3">
+            <a:extLst>
+              <a:ext uri="{FF2B5EF4-FFF2-40B4-BE49-F238E27FC236}">
+                <a16:creationId xmlns:a16="http://schemas.microsoft.com/office/drawing/2014/main" id="{8D5E7AE7-755F-40AB-8B29-2FA94F3BD6D2}"/>
+              </a:ext>
+            </a:extLst>
+          </p:cNvPr>
+          <p:cNvSpPr/>
+          <p:nvPr/>
+        </p:nvSpPr>
+        <p:spPr>
+          <a:xfrm>
+            <a:off x="651588" y="5802868"/>
+            <a:ext cx="10888824" cy="369332"/>
+          </a:xfrm>
+          <a:prstGeom prst="rect">
+            <a:avLst/>
+          </a:prstGeom>
+        </p:spPr>
+        <p:txBody>
+          <a:bodyPr wrap="square">
+            <a:spAutoFit/>
+          </a:bodyPr>
+          <a:lstStyle/>
+          <a:p>
+            <a:r>
+              <a:rPr lang="en-US" dirty="0">
+                <a:solidFill>
+                  <a:srgbClr val="1264A3"/>
+                </a:solidFill>
+                <a:latin typeface="Slack-Lato"/>
+                <a:hlinkClick r:id="rId3"/>
+              </a:rPr>
+              <a:t>https://public.tableau.com/profile/farah.clerveau#!/vizhome/Iowa_Tableau/HoltsWinter?publish=yes</a:t>
+            </a:r>
+            <a:endParaRPr lang="en-US" dirty="0"/>
+          </a:p>
+        </p:txBody>
+      </p:sp>
+    </p:spTree>
+    <p:extLst>
+      <p:ext uri="{BB962C8B-B14F-4D97-AF65-F5344CB8AC3E}">
+        <p14:creationId xmlns:p14="http://schemas.microsoft.com/office/powerpoint/2010/main" val="1531200119"/>
+      </p:ext>
+    </p:extLst>
+  </p:cSld>
+  <p:clrMapOvr>
+    <a:masterClrMapping/>
+  </p:clrMapOvr>
+  <p:timing>
+    <p:tnLst>
+      <p:par>
+        <p:cTn id="1" dur="indefinite" restart="never" nodeType="tmRoot">
+          <p:childTnLst>
+            <p:seq concurrent="1" nextAc="seek">
+              <p:cTn id="2" dur="indefinite" nodeType="mainSeq">
+                <p:childTnLst>
+                  <p:par>
+                    <p:cTn id="3" fill="hold">
+                      <p:stCondLst>
+                        <p:cond delay="indefinite"/>
+                        <p:cond evt="onBegin" delay="0">
+                          <p:tn val="2"/>
+                        </p:cond>
+                      </p:stCondLst>
+                      <p:childTnLst>
+                        <p:par>
+                          <p:cTn id="4" fill="hold">
+                            <p:stCondLst>
+                              <p:cond delay="0"/>
+                            </p:stCondLst>
+                            <p:childTnLst>
+                              <p:par>
+                                <p:cTn id="5" presetID="16" presetClass="entr" presetSubtype="21" fill="hold" nodeType="afterEffect">
+                                  <p:stCondLst>
+                                    <p:cond delay="0"/>
+                                  </p:stCondLst>
+                                  <p:childTnLst>
+                                    <p:set>
+                                      <p:cBhvr>
+                                        <p:cTn id="6" dur="1" fill="hold">
+                                          <p:stCondLst>
+                                            <p:cond delay="0"/>
+                                          </p:stCondLst>
+                                        </p:cTn>
+                                        <p:tgtEl>
+                                          <p:spTgt spid="3"/>
+                                        </p:tgtEl>
+                                        <p:attrNameLst>
+                                          <p:attrName>style.visibility</p:attrName>
+                                        </p:attrNameLst>
+                                      </p:cBhvr>
+                                      <p:to>
+                                        <p:strVal val="visible"/>
+                                      </p:to>
+                                    </p:set>
+                                    <p:animEffect transition="in" filter="barn(inVertical)">
+                                      <p:cBhvr>
+                                        <p:cTn id="7" dur="1500"/>
+                                        <p:tgtEl>
+                                          <p:spTgt spid="3"/>
+                                        </p:tgtEl>
+                                      </p:cBhvr>
+                                    </p:animEffect>
+                                  </p:childTnLst>
+                                </p:cTn>
+                              </p:par>
+                            </p:childTnLst>
+                          </p:cTn>
+                        </p:par>
+                      </p:childTnLst>
+                    </p:cTn>
+                  </p:par>
+                </p:childTnLst>
+              </p:cTn>
+              <p:prevCondLst>
+                <p:cond evt="onPrev" delay="0">
+                  <p:tgtEl>
+                    <p:sldTgt/>
+                  </p:tgtEl>
+                </p:cond>
+              </p:prevCondLst>
+              <p:nextCondLst>
+                <p:cond evt="onNext" delay="0">
+                  <p:tgtEl>
+                    <p:sldTgt/>
+                  </p:tgtEl>
+                </p:cond>
+              </p:nextCondLst>
+            </p:seq>
+          </p:childTnLst>
+        </p:cTn>
+      </p:par>
+    </p:tnLst>
+  </p:timing>
+</p:sld>
+</file>
+
+<file path=ppt/slides/slide18.xml><?xml version="1.0" encoding="utf-8"?>
 <p:sld xmlns:a="http://schemas.openxmlformats.org/drawingml/2006/main" xmlns:r="http://schemas.openxmlformats.org/officeDocument/2006/relationships" xmlns:p="http://schemas.openxmlformats.org/presentationml/2006/main">
   <p:cSld>
     <p:bg>
@@ -20439,7 +20807,7 @@
 </p:sld>
 </file>
 
-<file path=ppt/slides/slide18.xml><?xml version="1.0" encoding="utf-8"?>
+<file path=ppt/slides/slide19.xml><?xml version="1.0" encoding="utf-8"?>
 <p:sld xmlns:a="http://schemas.openxmlformats.org/drawingml/2006/main" xmlns:r="http://schemas.openxmlformats.org/officeDocument/2006/relationships" xmlns:p="http://schemas.openxmlformats.org/presentationml/2006/main">
   <p:cSld>
     <p:bg>
@@ -21252,3622 +21620,6 @@
     <p:extLst>
       <p:ext uri="{BB962C8B-B14F-4D97-AF65-F5344CB8AC3E}">
         <p14:creationId xmlns:p14="http://schemas.microsoft.com/office/powerpoint/2010/main" val="2332253610"/>
-      </p:ext>
-    </p:extLst>
-  </p:cSld>
-  <p:clrMapOvr>
-    <a:masterClrMapping/>
-  </p:clrMapOvr>
-</p:sld>
-</file>
-
-<file path=ppt/slides/slide19.xml><?xml version="1.0" encoding="utf-8"?>
-<p:sld xmlns:a="http://schemas.openxmlformats.org/drawingml/2006/main" xmlns:r="http://schemas.openxmlformats.org/officeDocument/2006/relationships" xmlns:p="http://schemas.openxmlformats.org/presentationml/2006/main">
-  <p:cSld>
-    <p:spTree>
-      <p:nvGrpSpPr>
-        <p:cNvPr id="1" name=""/>
-        <p:cNvGrpSpPr/>
-        <p:nvPr/>
-      </p:nvGrpSpPr>
-      <p:grpSpPr>
-        <a:xfrm>
-          <a:off x="0" y="0"/>
-          <a:ext cx="0" cy="0"/>
-          <a:chOff x="0" y="0"/>
-          <a:chExt cx="0" cy="0"/>
-        </a:xfrm>
-      </p:grpSpPr>
-      <p:sp>
-        <p:nvSpPr>
-          <p:cNvPr id="21" name="Freeform: Shape 20">
-            <a:extLst>
-              <a:ext uri="{FF2B5EF4-FFF2-40B4-BE49-F238E27FC236}">
-                <a16:creationId xmlns:a16="http://schemas.microsoft.com/office/drawing/2014/main" id="{123B7D92-3F30-4D97-9C41-A75EC49CBA2E}"/>
-              </a:ext>
-            </a:extLst>
-          </p:cNvPr>
-          <p:cNvSpPr/>
-          <p:nvPr/>
-        </p:nvSpPr>
-        <p:spPr>
-          <a:xfrm>
-            <a:off x="74645" y="606490"/>
-            <a:ext cx="11430000" cy="5843002"/>
-          </a:xfrm>
-          <a:custGeom>
-            <a:avLst/>
-            <a:gdLst>
-              <a:gd name="connsiteX0" fmla="*/ 0 w 11430000"/>
-              <a:gd name="connsiteY0" fmla="*/ 0 h 5843002"/>
-              <a:gd name="connsiteX1" fmla="*/ 111967 w 11430000"/>
-              <a:gd name="connsiteY1" fmla="*/ 65314 h 5843002"/>
-              <a:gd name="connsiteX2" fmla="*/ 158620 w 11430000"/>
-              <a:gd name="connsiteY2" fmla="*/ 93306 h 5843002"/>
-              <a:gd name="connsiteX3" fmla="*/ 186612 w 11430000"/>
-              <a:gd name="connsiteY3" fmla="*/ 111967 h 5843002"/>
-              <a:gd name="connsiteX4" fmla="*/ 251926 w 11430000"/>
-              <a:gd name="connsiteY4" fmla="*/ 149290 h 5843002"/>
-              <a:gd name="connsiteX5" fmla="*/ 326571 w 11430000"/>
-              <a:gd name="connsiteY5" fmla="*/ 205273 h 5843002"/>
-              <a:gd name="connsiteX6" fmla="*/ 382555 w 11430000"/>
-              <a:gd name="connsiteY6" fmla="*/ 261257 h 5843002"/>
-              <a:gd name="connsiteX7" fmla="*/ 410547 w 11430000"/>
-              <a:gd name="connsiteY7" fmla="*/ 317241 h 5843002"/>
-              <a:gd name="connsiteX8" fmla="*/ 447869 w 11430000"/>
-              <a:gd name="connsiteY8" fmla="*/ 382555 h 5843002"/>
-              <a:gd name="connsiteX9" fmla="*/ 457200 w 11430000"/>
-              <a:gd name="connsiteY9" fmla="*/ 429208 h 5843002"/>
-              <a:gd name="connsiteX10" fmla="*/ 466531 w 11430000"/>
-              <a:gd name="connsiteY10" fmla="*/ 457200 h 5843002"/>
-              <a:gd name="connsiteX11" fmla="*/ 485192 w 11430000"/>
-              <a:gd name="connsiteY11" fmla="*/ 550506 h 5843002"/>
-              <a:gd name="connsiteX12" fmla="*/ 503853 w 11430000"/>
-              <a:gd name="connsiteY12" fmla="*/ 746449 h 5843002"/>
-              <a:gd name="connsiteX13" fmla="*/ 513184 w 11430000"/>
-              <a:gd name="connsiteY13" fmla="*/ 774441 h 5843002"/>
-              <a:gd name="connsiteX14" fmla="*/ 522514 w 11430000"/>
-              <a:gd name="connsiteY14" fmla="*/ 839755 h 5843002"/>
-              <a:gd name="connsiteX15" fmla="*/ 541175 w 11430000"/>
-              <a:gd name="connsiteY15" fmla="*/ 905069 h 5843002"/>
-              <a:gd name="connsiteX16" fmla="*/ 559837 w 11430000"/>
-              <a:gd name="connsiteY16" fmla="*/ 979714 h 5843002"/>
-              <a:gd name="connsiteX17" fmla="*/ 569167 w 11430000"/>
-              <a:gd name="connsiteY17" fmla="*/ 1007706 h 5843002"/>
-              <a:gd name="connsiteX18" fmla="*/ 578498 w 11430000"/>
-              <a:gd name="connsiteY18" fmla="*/ 1045028 h 5843002"/>
-              <a:gd name="connsiteX19" fmla="*/ 597159 w 11430000"/>
-              <a:gd name="connsiteY19" fmla="*/ 1101012 h 5843002"/>
-              <a:gd name="connsiteX20" fmla="*/ 615820 w 11430000"/>
-              <a:gd name="connsiteY20" fmla="*/ 1156996 h 5843002"/>
-              <a:gd name="connsiteX21" fmla="*/ 625151 w 11430000"/>
-              <a:gd name="connsiteY21" fmla="*/ 1184988 h 5843002"/>
-              <a:gd name="connsiteX22" fmla="*/ 634482 w 11430000"/>
-              <a:gd name="connsiteY22" fmla="*/ 1212979 h 5843002"/>
-              <a:gd name="connsiteX23" fmla="*/ 653143 w 11430000"/>
-              <a:gd name="connsiteY23" fmla="*/ 1296955 h 5843002"/>
-              <a:gd name="connsiteX24" fmla="*/ 671804 w 11430000"/>
-              <a:gd name="connsiteY24" fmla="*/ 1324947 h 5843002"/>
-              <a:gd name="connsiteX25" fmla="*/ 699796 w 11430000"/>
-              <a:gd name="connsiteY25" fmla="*/ 1455575 h 5843002"/>
-              <a:gd name="connsiteX26" fmla="*/ 709126 w 11430000"/>
-              <a:gd name="connsiteY26" fmla="*/ 1492898 h 5843002"/>
-              <a:gd name="connsiteX27" fmla="*/ 718457 w 11430000"/>
-              <a:gd name="connsiteY27" fmla="*/ 1520890 h 5843002"/>
-              <a:gd name="connsiteX28" fmla="*/ 727788 w 11430000"/>
-              <a:gd name="connsiteY28" fmla="*/ 1576873 h 5843002"/>
-              <a:gd name="connsiteX29" fmla="*/ 737118 w 11430000"/>
-              <a:gd name="connsiteY29" fmla="*/ 1623526 h 5843002"/>
-              <a:gd name="connsiteX30" fmla="*/ 746449 w 11430000"/>
-              <a:gd name="connsiteY30" fmla="*/ 1726163 h 5843002"/>
-              <a:gd name="connsiteX31" fmla="*/ 755779 w 11430000"/>
-              <a:gd name="connsiteY31" fmla="*/ 1800808 h 5843002"/>
-              <a:gd name="connsiteX32" fmla="*/ 746449 w 11430000"/>
-              <a:gd name="connsiteY32" fmla="*/ 2183363 h 5843002"/>
-              <a:gd name="connsiteX33" fmla="*/ 737118 w 11430000"/>
-              <a:gd name="connsiteY33" fmla="*/ 2276669 h 5843002"/>
-              <a:gd name="connsiteX34" fmla="*/ 718457 w 11430000"/>
-              <a:gd name="connsiteY34" fmla="*/ 2416628 h 5843002"/>
-              <a:gd name="connsiteX35" fmla="*/ 709126 w 11430000"/>
-              <a:gd name="connsiteY35" fmla="*/ 2509934 h 5843002"/>
-              <a:gd name="connsiteX36" fmla="*/ 699796 w 11430000"/>
-              <a:gd name="connsiteY36" fmla="*/ 2537926 h 5843002"/>
-              <a:gd name="connsiteX37" fmla="*/ 690465 w 11430000"/>
-              <a:gd name="connsiteY37" fmla="*/ 2640563 h 5843002"/>
-              <a:gd name="connsiteX38" fmla="*/ 671804 w 11430000"/>
-              <a:gd name="connsiteY38" fmla="*/ 2715208 h 5843002"/>
-              <a:gd name="connsiteX39" fmla="*/ 653143 w 11430000"/>
-              <a:gd name="connsiteY39" fmla="*/ 2817845 h 5843002"/>
-              <a:gd name="connsiteX40" fmla="*/ 643812 w 11430000"/>
-              <a:gd name="connsiteY40" fmla="*/ 2939143 h 5843002"/>
-              <a:gd name="connsiteX41" fmla="*/ 615820 w 11430000"/>
-              <a:gd name="connsiteY41" fmla="*/ 3069771 h 5843002"/>
-              <a:gd name="connsiteX42" fmla="*/ 587828 w 11430000"/>
-              <a:gd name="connsiteY42" fmla="*/ 3153747 h 5843002"/>
-              <a:gd name="connsiteX43" fmla="*/ 559837 w 11430000"/>
-              <a:gd name="connsiteY43" fmla="*/ 3247053 h 5843002"/>
-              <a:gd name="connsiteX44" fmla="*/ 550506 w 11430000"/>
-              <a:gd name="connsiteY44" fmla="*/ 3275045 h 5843002"/>
-              <a:gd name="connsiteX45" fmla="*/ 513184 w 11430000"/>
-              <a:gd name="connsiteY45" fmla="*/ 3349690 h 5843002"/>
-              <a:gd name="connsiteX46" fmla="*/ 494522 w 11430000"/>
-              <a:gd name="connsiteY46" fmla="*/ 3387012 h 5843002"/>
-              <a:gd name="connsiteX47" fmla="*/ 485192 w 11430000"/>
-              <a:gd name="connsiteY47" fmla="*/ 3442996 h 5843002"/>
-              <a:gd name="connsiteX48" fmla="*/ 475861 w 11430000"/>
-              <a:gd name="connsiteY48" fmla="*/ 3470988 h 5843002"/>
-              <a:gd name="connsiteX49" fmla="*/ 457200 w 11430000"/>
-              <a:gd name="connsiteY49" fmla="*/ 3554963 h 5843002"/>
-              <a:gd name="connsiteX50" fmla="*/ 447869 w 11430000"/>
-              <a:gd name="connsiteY50" fmla="*/ 3741575 h 5843002"/>
-              <a:gd name="connsiteX51" fmla="*/ 429208 w 11430000"/>
-              <a:gd name="connsiteY51" fmla="*/ 3825551 h 5843002"/>
-              <a:gd name="connsiteX52" fmla="*/ 419877 w 11430000"/>
-              <a:gd name="connsiteY52" fmla="*/ 3872204 h 5843002"/>
-              <a:gd name="connsiteX53" fmla="*/ 401216 w 11430000"/>
-              <a:gd name="connsiteY53" fmla="*/ 3937518 h 5843002"/>
-              <a:gd name="connsiteX54" fmla="*/ 382555 w 11430000"/>
-              <a:gd name="connsiteY54" fmla="*/ 3974841 h 5843002"/>
-              <a:gd name="connsiteX55" fmla="*/ 354563 w 11430000"/>
-              <a:gd name="connsiteY55" fmla="*/ 4040155 h 5843002"/>
-              <a:gd name="connsiteX56" fmla="*/ 345233 w 11430000"/>
-              <a:gd name="connsiteY56" fmla="*/ 4068147 h 5843002"/>
-              <a:gd name="connsiteX57" fmla="*/ 335902 w 11430000"/>
-              <a:gd name="connsiteY57" fmla="*/ 4105469 h 5843002"/>
-              <a:gd name="connsiteX58" fmla="*/ 317241 w 11430000"/>
-              <a:gd name="connsiteY58" fmla="*/ 4142792 h 5843002"/>
-              <a:gd name="connsiteX59" fmla="*/ 298579 w 11430000"/>
-              <a:gd name="connsiteY59" fmla="*/ 4226767 h 5843002"/>
-              <a:gd name="connsiteX60" fmla="*/ 317241 w 11430000"/>
-              <a:gd name="connsiteY60" fmla="*/ 4338734 h 5843002"/>
-              <a:gd name="connsiteX61" fmla="*/ 335902 w 11430000"/>
-              <a:gd name="connsiteY61" fmla="*/ 4394718 h 5843002"/>
-              <a:gd name="connsiteX62" fmla="*/ 363894 w 11430000"/>
-              <a:gd name="connsiteY62" fmla="*/ 4413379 h 5843002"/>
-              <a:gd name="connsiteX63" fmla="*/ 382555 w 11430000"/>
-              <a:gd name="connsiteY63" fmla="*/ 4450702 h 5843002"/>
-              <a:gd name="connsiteX64" fmla="*/ 438539 w 11430000"/>
-              <a:gd name="connsiteY64" fmla="*/ 4488024 h 5843002"/>
-              <a:gd name="connsiteX65" fmla="*/ 494522 w 11430000"/>
-              <a:gd name="connsiteY65" fmla="*/ 4525347 h 5843002"/>
-              <a:gd name="connsiteX66" fmla="*/ 531845 w 11430000"/>
-              <a:gd name="connsiteY66" fmla="*/ 4534677 h 5843002"/>
-              <a:gd name="connsiteX67" fmla="*/ 559837 w 11430000"/>
-              <a:gd name="connsiteY67" fmla="*/ 4553339 h 5843002"/>
-              <a:gd name="connsiteX68" fmla="*/ 597159 w 11430000"/>
-              <a:gd name="connsiteY68" fmla="*/ 4562669 h 5843002"/>
-              <a:gd name="connsiteX69" fmla="*/ 625151 w 11430000"/>
-              <a:gd name="connsiteY69" fmla="*/ 4572000 h 5843002"/>
-              <a:gd name="connsiteX70" fmla="*/ 662473 w 11430000"/>
-              <a:gd name="connsiteY70" fmla="*/ 4581330 h 5843002"/>
-              <a:gd name="connsiteX71" fmla="*/ 690465 w 11430000"/>
-              <a:gd name="connsiteY71" fmla="*/ 4590661 h 5843002"/>
-              <a:gd name="connsiteX72" fmla="*/ 755779 w 11430000"/>
-              <a:gd name="connsiteY72" fmla="*/ 4618653 h 5843002"/>
-              <a:gd name="connsiteX73" fmla="*/ 793102 w 11430000"/>
-              <a:gd name="connsiteY73" fmla="*/ 4627983 h 5843002"/>
-              <a:gd name="connsiteX74" fmla="*/ 821094 w 11430000"/>
-              <a:gd name="connsiteY74" fmla="*/ 4637314 h 5843002"/>
-              <a:gd name="connsiteX75" fmla="*/ 895739 w 11430000"/>
-              <a:gd name="connsiteY75" fmla="*/ 4655975 h 5843002"/>
-              <a:gd name="connsiteX76" fmla="*/ 923731 w 11430000"/>
-              <a:gd name="connsiteY76" fmla="*/ 4674637 h 5843002"/>
-              <a:gd name="connsiteX77" fmla="*/ 1129004 w 11430000"/>
-              <a:gd name="connsiteY77" fmla="*/ 4702628 h 5843002"/>
-              <a:gd name="connsiteX78" fmla="*/ 1175657 w 11430000"/>
-              <a:gd name="connsiteY78" fmla="*/ 4711959 h 5843002"/>
-              <a:gd name="connsiteX79" fmla="*/ 1511559 w 11430000"/>
-              <a:gd name="connsiteY79" fmla="*/ 4693298 h 5843002"/>
-              <a:gd name="connsiteX80" fmla="*/ 1576873 w 11430000"/>
-              <a:gd name="connsiteY80" fmla="*/ 4674637 h 5843002"/>
-              <a:gd name="connsiteX81" fmla="*/ 1604865 w 11430000"/>
-              <a:gd name="connsiteY81" fmla="*/ 4665306 h 5843002"/>
-              <a:gd name="connsiteX82" fmla="*/ 1651518 w 11430000"/>
-              <a:gd name="connsiteY82" fmla="*/ 4655975 h 5843002"/>
-              <a:gd name="connsiteX83" fmla="*/ 1726163 w 11430000"/>
-              <a:gd name="connsiteY83" fmla="*/ 4637314 h 5843002"/>
-              <a:gd name="connsiteX84" fmla="*/ 1800808 w 11430000"/>
-              <a:gd name="connsiteY84" fmla="*/ 4627983 h 5843002"/>
-              <a:gd name="connsiteX85" fmla="*/ 1838131 w 11430000"/>
-              <a:gd name="connsiteY85" fmla="*/ 4618653 h 5843002"/>
-              <a:gd name="connsiteX86" fmla="*/ 1903445 w 11430000"/>
-              <a:gd name="connsiteY86" fmla="*/ 4609322 h 5843002"/>
-              <a:gd name="connsiteX87" fmla="*/ 2024743 w 11430000"/>
-              <a:gd name="connsiteY87" fmla="*/ 4590661 h 5843002"/>
-              <a:gd name="connsiteX88" fmla="*/ 2174033 w 11430000"/>
-              <a:gd name="connsiteY88" fmla="*/ 4572000 h 5843002"/>
-              <a:gd name="connsiteX89" fmla="*/ 2202024 w 11430000"/>
-              <a:gd name="connsiteY89" fmla="*/ 4562669 h 5843002"/>
-              <a:gd name="connsiteX90" fmla="*/ 2276669 w 11430000"/>
-              <a:gd name="connsiteY90" fmla="*/ 4544008 h 5843002"/>
-              <a:gd name="connsiteX91" fmla="*/ 2295331 w 11430000"/>
-              <a:gd name="connsiteY91" fmla="*/ 4516016 h 5843002"/>
-              <a:gd name="connsiteX92" fmla="*/ 2351314 w 11430000"/>
-              <a:gd name="connsiteY92" fmla="*/ 4478694 h 5843002"/>
-              <a:gd name="connsiteX93" fmla="*/ 2369975 w 11430000"/>
-              <a:gd name="connsiteY93" fmla="*/ 4450702 h 5843002"/>
-              <a:gd name="connsiteX94" fmla="*/ 2425959 w 11430000"/>
-              <a:gd name="connsiteY94" fmla="*/ 4404049 h 5843002"/>
-              <a:gd name="connsiteX95" fmla="*/ 2472612 w 11430000"/>
-              <a:gd name="connsiteY95" fmla="*/ 4329404 h 5843002"/>
-              <a:gd name="connsiteX96" fmla="*/ 2528596 w 11430000"/>
-              <a:gd name="connsiteY96" fmla="*/ 4254759 h 5843002"/>
-              <a:gd name="connsiteX97" fmla="*/ 2537926 w 11430000"/>
-              <a:gd name="connsiteY97" fmla="*/ 4226767 h 5843002"/>
-              <a:gd name="connsiteX98" fmla="*/ 2603241 w 11430000"/>
-              <a:gd name="connsiteY98" fmla="*/ 4133461 h 5843002"/>
-              <a:gd name="connsiteX99" fmla="*/ 2612571 w 11430000"/>
-              <a:gd name="connsiteY99" fmla="*/ 4105469 h 5843002"/>
-              <a:gd name="connsiteX100" fmla="*/ 2668555 w 11430000"/>
-              <a:gd name="connsiteY100" fmla="*/ 4030824 h 5843002"/>
-              <a:gd name="connsiteX101" fmla="*/ 2687216 w 11430000"/>
-              <a:gd name="connsiteY101" fmla="*/ 3974841 h 5843002"/>
-              <a:gd name="connsiteX102" fmla="*/ 2733869 w 11430000"/>
-              <a:gd name="connsiteY102" fmla="*/ 3909526 h 5843002"/>
-              <a:gd name="connsiteX103" fmla="*/ 2761861 w 11430000"/>
-              <a:gd name="connsiteY103" fmla="*/ 3853543 h 5843002"/>
-              <a:gd name="connsiteX104" fmla="*/ 2780522 w 11430000"/>
-              <a:gd name="connsiteY104" fmla="*/ 3797559 h 5843002"/>
-              <a:gd name="connsiteX105" fmla="*/ 2789853 w 11430000"/>
-              <a:gd name="connsiteY105" fmla="*/ 3769567 h 5843002"/>
-              <a:gd name="connsiteX106" fmla="*/ 2817845 w 11430000"/>
-              <a:gd name="connsiteY106" fmla="*/ 3713583 h 5843002"/>
-              <a:gd name="connsiteX107" fmla="*/ 2836506 w 11430000"/>
-              <a:gd name="connsiteY107" fmla="*/ 3657600 h 5843002"/>
-              <a:gd name="connsiteX108" fmla="*/ 2845837 w 11430000"/>
-              <a:gd name="connsiteY108" fmla="*/ 3629608 h 5843002"/>
-              <a:gd name="connsiteX109" fmla="*/ 2873828 w 11430000"/>
-              <a:gd name="connsiteY109" fmla="*/ 3592286 h 5843002"/>
-              <a:gd name="connsiteX110" fmla="*/ 2901820 w 11430000"/>
-              <a:gd name="connsiteY110" fmla="*/ 3517641 h 5843002"/>
-              <a:gd name="connsiteX111" fmla="*/ 2929812 w 11430000"/>
-              <a:gd name="connsiteY111" fmla="*/ 3452326 h 5843002"/>
-              <a:gd name="connsiteX112" fmla="*/ 2967135 w 11430000"/>
-              <a:gd name="connsiteY112" fmla="*/ 3387012 h 5843002"/>
-              <a:gd name="connsiteX113" fmla="*/ 3004457 w 11430000"/>
-              <a:gd name="connsiteY113" fmla="*/ 3303037 h 5843002"/>
-              <a:gd name="connsiteX114" fmla="*/ 3013788 w 11430000"/>
-              <a:gd name="connsiteY114" fmla="*/ 3265714 h 5843002"/>
-              <a:gd name="connsiteX115" fmla="*/ 3041779 w 11430000"/>
-              <a:gd name="connsiteY115" fmla="*/ 3200400 h 5843002"/>
-              <a:gd name="connsiteX116" fmla="*/ 3060441 w 11430000"/>
-              <a:gd name="connsiteY116" fmla="*/ 3181739 h 5843002"/>
-              <a:gd name="connsiteX117" fmla="*/ 3079102 w 11430000"/>
-              <a:gd name="connsiteY117" fmla="*/ 3125755 h 5843002"/>
-              <a:gd name="connsiteX118" fmla="*/ 3125755 w 11430000"/>
-              <a:gd name="connsiteY118" fmla="*/ 3051110 h 5843002"/>
-              <a:gd name="connsiteX119" fmla="*/ 3144416 w 11430000"/>
-              <a:gd name="connsiteY119" fmla="*/ 2995126 h 5843002"/>
-              <a:gd name="connsiteX120" fmla="*/ 3153747 w 11430000"/>
-              <a:gd name="connsiteY120" fmla="*/ 2957804 h 5843002"/>
-              <a:gd name="connsiteX121" fmla="*/ 3172408 w 11430000"/>
-              <a:gd name="connsiteY121" fmla="*/ 2929812 h 5843002"/>
-              <a:gd name="connsiteX122" fmla="*/ 3181739 w 11430000"/>
-              <a:gd name="connsiteY122" fmla="*/ 2901820 h 5843002"/>
-              <a:gd name="connsiteX123" fmla="*/ 3200400 w 11430000"/>
-              <a:gd name="connsiteY123" fmla="*/ 2873828 h 5843002"/>
-              <a:gd name="connsiteX124" fmla="*/ 3209731 w 11430000"/>
-              <a:gd name="connsiteY124" fmla="*/ 2845837 h 5843002"/>
-              <a:gd name="connsiteX125" fmla="*/ 3247053 w 11430000"/>
-              <a:gd name="connsiteY125" fmla="*/ 2799183 h 5843002"/>
-              <a:gd name="connsiteX126" fmla="*/ 3256384 w 11430000"/>
-              <a:gd name="connsiteY126" fmla="*/ 2771192 h 5843002"/>
-              <a:gd name="connsiteX127" fmla="*/ 3275045 w 11430000"/>
-              <a:gd name="connsiteY127" fmla="*/ 2743200 h 5843002"/>
-              <a:gd name="connsiteX128" fmla="*/ 3303037 w 11430000"/>
-              <a:gd name="connsiteY128" fmla="*/ 2677886 h 5843002"/>
-              <a:gd name="connsiteX129" fmla="*/ 3321698 w 11430000"/>
-              <a:gd name="connsiteY129" fmla="*/ 2640563 h 5843002"/>
-              <a:gd name="connsiteX130" fmla="*/ 3359020 w 11430000"/>
-              <a:gd name="connsiteY130" fmla="*/ 2584579 h 5843002"/>
-              <a:gd name="connsiteX131" fmla="*/ 3368351 w 11430000"/>
-              <a:gd name="connsiteY131" fmla="*/ 2556588 h 5843002"/>
-              <a:gd name="connsiteX132" fmla="*/ 3387012 w 11430000"/>
-              <a:gd name="connsiteY132" fmla="*/ 2537926 h 5843002"/>
-              <a:gd name="connsiteX133" fmla="*/ 3415004 w 11430000"/>
-              <a:gd name="connsiteY133" fmla="*/ 2500604 h 5843002"/>
-              <a:gd name="connsiteX134" fmla="*/ 3442996 w 11430000"/>
-              <a:gd name="connsiteY134" fmla="*/ 2472612 h 5843002"/>
-              <a:gd name="connsiteX135" fmla="*/ 3461657 w 11430000"/>
-              <a:gd name="connsiteY135" fmla="*/ 2444620 h 5843002"/>
-              <a:gd name="connsiteX136" fmla="*/ 3517641 w 11430000"/>
-              <a:gd name="connsiteY136" fmla="*/ 2388637 h 5843002"/>
-              <a:gd name="connsiteX137" fmla="*/ 3554963 w 11430000"/>
-              <a:gd name="connsiteY137" fmla="*/ 2341983 h 5843002"/>
-              <a:gd name="connsiteX138" fmla="*/ 3582955 w 11430000"/>
-              <a:gd name="connsiteY138" fmla="*/ 2323322 h 5843002"/>
-              <a:gd name="connsiteX139" fmla="*/ 3657600 w 11430000"/>
-              <a:gd name="connsiteY139" fmla="*/ 2248677 h 5843002"/>
-              <a:gd name="connsiteX140" fmla="*/ 3685592 w 11430000"/>
-              <a:gd name="connsiteY140" fmla="*/ 2220686 h 5843002"/>
-              <a:gd name="connsiteX141" fmla="*/ 3704253 w 11430000"/>
-              <a:gd name="connsiteY141" fmla="*/ 2202024 h 5843002"/>
-              <a:gd name="connsiteX142" fmla="*/ 3732245 w 11430000"/>
-              <a:gd name="connsiteY142" fmla="*/ 2183363 h 5843002"/>
-              <a:gd name="connsiteX143" fmla="*/ 3788228 w 11430000"/>
-              <a:gd name="connsiteY143" fmla="*/ 2127379 h 5843002"/>
-              <a:gd name="connsiteX144" fmla="*/ 3844212 w 11430000"/>
-              <a:gd name="connsiteY144" fmla="*/ 2090057 h 5843002"/>
-              <a:gd name="connsiteX145" fmla="*/ 3872204 w 11430000"/>
-              <a:gd name="connsiteY145" fmla="*/ 2071396 h 5843002"/>
-              <a:gd name="connsiteX146" fmla="*/ 3909526 w 11430000"/>
-              <a:gd name="connsiteY146" fmla="*/ 2043404 h 5843002"/>
-              <a:gd name="connsiteX147" fmla="*/ 3946849 w 11430000"/>
-              <a:gd name="connsiteY147" fmla="*/ 2024743 h 5843002"/>
-              <a:gd name="connsiteX148" fmla="*/ 4002833 w 11430000"/>
-              <a:gd name="connsiteY148" fmla="*/ 1996751 h 5843002"/>
-              <a:gd name="connsiteX149" fmla="*/ 4040155 w 11430000"/>
-              <a:gd name="connsiteY149" fmla="*/ 1968759 h 5843002"/>
-              <a:gd name="connsiteX150" fmla="*/ 4077477 w 11430000"/>
-              <a:gd name="connsiteY150" fmla="*/ 1950098 h 5843002"/>
-              <a:gd name="connsiteX151" fmla="*/ 4105469 w 11430000"/>
-              <a:gd name="connsiteY151" fmla="*/ 1922106 h 5843002"/>
-              <a:gd name="connsiteX152" fmla="*/ 4142792 w 11430000"/>
-              <a:gd name="connsiteY152" fmla="*/ 1912775 h 5843002"/>
-              <a:gd name="connsiteX153" fmla="*/ 4198775 w 11430000"/>
-              <a:gd name="connsiteY153" fmla="*/ 1875453 h 5843002"/>
-              <a:gd name="connsiteX154" fmla="*/ 4226767 w 11430000"/>
-              <a:gd name="connsiteY154" fmla="*/ 1866122 h 5843002"/>
-              <a:gd name="connsiteX155" fmla="*/ 4292082 w 11430000"/>
-              <a:gd name="connsiteY155" fmla="*/ 1828800 h 5843002"/>
-              <a:gd name="connsiteX156" fmla="*/ 4404049 w 11430000"/>
-              <a:gd name="connsiteY156" fmla="*/ 1800808 h 5843002"/>
-              <a:gd name="connsiteX157" fmla="*/ 4441371 w 11430000"/>
-              <a:gd name="connsiteY157" fmla="*/ 1782147 h 5843002"/>
-              <a:gd name="connsiteX158" fmla="*/ 4525347 w 11430000"/>
-              <a:gd name="connsiteY158" fmla="*/ 1763486 h 5843002"/>
-              <a:gd name="connsiteX159" fmla="*/ 4637314 w 11430000"/>
-              <a:gd name="connsiteY159" fmla="*/ 1735494 h 5843002"/>
-              <a:gd name="connsiteX160" fmla="*/ 4674637 w 11430000"/>
-              <a:gd name="connsiteY160" fmla="*/ 1726163 h 5843002"/>
-              <a:gd name="connsiteX161" fmla="*/ 4711959 w 11430000"/>
-              <a:gd name="connsiteY161" fmla="*/ 1707502 h 5843002"/>
-              <a:gd name="connsiteX162" fmla="*/ 4795935 w 11430000"/>
-              <a:gd name="connsiteY162" fmla="*/ 1698171 h 5843002"/>
-              <a:gd name="connsiteX163" fmla="*/ 4851918 w 11430000"/>
-              <a:gd name="connsiteY163" fmla="*/ 1688841 h 5843002"/>
-              <a:gd name="connsiteX164" fmla="*/ 5019869 w 11430000"/>
-              <a:gd name="connsiteY164" fmla="*/ 1651518 h 5843002"/>
-              <a:gd name="connsiteX165" fmla="*/ 5150498 w 11430000"/>
-              <a:gd name="connsiteY165" fmla="*/ 1632857 h 5843002"/>
-              <a:gd name="connsiteX166" fmla="*/ 5206482 w 11430000"/>
-              <a:gd name="connsiteY166" fmla="*/ 1623526 h 5843002"/>
-              <a:gd name="connsiteX167" fmla="*/ 5234473 w 11430000"/>
-              <a:gd name="connsiteY167" fmla="*/ 1614196 h 5843002"/>
-              <a:gd name="connsiteX168" fmla="*/ 5346441 w 11430000"/>
-              <a:gd name="connsiteY168" fmla="*/ 1595534 h 5843002"/>
-              <a:gd name="connsiteX169" fmla="*/ 5402424 w 11430000"/>
-              <a:gd name="connsiteY169" fmla="*/ 1586204 h 5843002"/>
-              <a:gd name="connsiteX170" fmla="*/ 5449077 w 11430000"/>
-              <a:gd name="connsiteY170" fmla="*/ 1576873 h 5843002"/>
-              <a:gd name="connsiteX171" fmla="*/ 5561045 w 11430000"/>
-              <a:gd name="connsiteY171" fmla="*/ 1567543 h 5843002"/>
-              <a:gd name="connsiteX172" fmla="*/ 5673012 w 11430000"/>
-              <a:gd name="connsiteY172" fmla="*/ 1548881 h 5843002"/>
-              <a:gd name="connsiteX173" fmla="*/ 5701004 w 11430000"/>
-              <a:gd name="connsiteY173" fmla="*/ 1539551 h 5843002"/>
-              <a:gd name="connsiteX174" fmla="*/ 5775649 w 11430000"/>
-              <a:gd name="connsiteY174" fmla="*/ 1530220 h 5843002"/>
-              <a:gd name="connsiteX175" fmla="*/ 5850294 w 11430000"/>
-              <a:gd name="connsiteY175" fmla="*/ 1511559 h 5843002"/>
-              <a:gd name="connsiteX176" fmla="*/ 5924939 w 11430000"/>
-              <a:gd name="connsiteY176" fmla="*/ 1502228 h 5843002"/>
-              <a:gd name="connsiteX177" fmla="*/ 5962261 w 11430000"/>
-              <a:gd name="connsiteY177" fmla="*/ 1492898 h 5843002"/>
-              <a:gd name="connsiteX178" fmla="*/ 6064898 w 11430000"/>
-              <a:gd name="connsiteY178" fmla="*/ 1483567 h 5843002"/>
-              <a:gd name="connsiteX179" fmla="*/ 6120882 w 11430000"/>
-              <a:gd name="connsiteY179" fmla="*/ 1474237 h 5843002"/>
-              <a:gd name="connsiteX180" fmla="*/ 6447453 w 11430000"/>
-              <a:gd name="connsiteY180" fmla="*/ 1455575 h 5843002"/>
-              <a:gd name="connsiteX181" fmla="*/ 6606073 w 11430000"/>
-              <a:gd name="connsiteY181" fmla="*/ 1446245 h 5843002"/>
-              <a:gd name="connsiteX182" fmla="*/ 6699379 w 11430000"/>
-              <a:gd name="connsiteY182" fmla="*/ 1436914 h 5843002"/>
-              <a:gd name="connsiteX183" fmla="*/ 6783355 w 11430000"/>
-              <a:gd name="connsiteY183" fmla="*/ 1427583 h 5843002"/>
-              <a:gd name="connsiteX184" fmla="*/ 7081935 w 11430000"/>
-              <a:gd name="connsiteY184" fmla="*/ 1408922 h 5843002"/>
-              <a:gd name="connsiteX185" fmla="*/ 7492482 w 11430000"/>
-              <a:gd name="connsiteY185" fmla="*/ 1418253 h 5843002"/>
-              <a:gd name="connsiteX186" fmla="*/ 7576457 w 11430000"/>
-              <a:gd name="connsiteY186" fmla="*/ 1427583 h 5843002"/>
-              <a:gd name="connsiteX187" fmla="*/ 7791061 w 11430000"/>
-              <a:gd name="connsiteY187" fmla="*/ 1436914 h 5843002"/>
-              <a:gd name="connsiteX188" fmla="*/ 7893698 w 11430000"/>
-              <a:gd name="connsiteY188" fmla="*/ 1446245 h 5843002"/>
-              <a:gd name="connsiteX189" fmla="*/ 7977673 w 11430000"/>
-              <a:gd name="connsiteY189" fmla="*/ 1455575 h 5843002"/>
-              <a:gd name="connsiteX190" fmla="*/ 8173616 w 11430000"/>
-              <a:gd name="connsiteY190" fmla="*/ 1464906 h 5843002"/>
-              <a:gd name="connsiteX191" fmla="*/ 8808098 w 11430000"/>
-              <a:gd name="connsiteY191" fmla="*/ 1483567 h 5843002"/>
-              <a:gd name="connsiteX192" fmla="*/ 8910735 w 11430000"/>
-              <a:gd name="connsiteY192" fmla="*/ 1492898 h 5843002"/>
-              <a:gd name="connsiteX193" fmla="*/ 8948057 w 11430000"/>
-              <a:gd name="connsiteY193" fmla="*/ 1502228 h 5843002"/>
-              <a:gd name="connsiteX194" fmla="*/ 9097347 w 11430000"/>
-              <a:gd name="connsiteY194" fmla="*/ 1530220 h 5843002"/>
-              <a:gd name="connsiteX195" fmla="*/ 9190653 w 11430000"/>
-              <a:gd name="connsiteY195" fmla="*/ 1548881 h 5843002"/>
-              <a:gd name="connsiteX196" fmla="*/ 9218645 w 11430000"/>
-              <a:gd name="connsiteY196" fmla="*/ 1558212 h 5843002"/>
-              <a:gd name="connsiteX197" fmla="*/ 9311951 w 11430000"/>
-              <a:gd name="connsiteY197" fmla="*/ 1567543 h 5843002"/>
-              <a:gd name="connsiteX198" fmla="*/ 9367935 w 11430000"/>
-              <a:gd name="connsiteY198" fmla="*/ 1576873 h 5843002"/>
-              <a:gd name="connsiteX199" fmla="*/ 9395926 w 11430000"/>
-              <a:gd name="connsiteY199" fmla="*/ 1586204 h 5843002"/>
-              <a:gd name="connsiteX200" fmla="*/ 9545216 w 11430000"/>
-              <a:gd name="connsiteY200" fmla="*/ 1614196 h 5843002"/>
-              <a:gd name="connsiteX201" fmla="*/ 9629192 w 11430000"/>
-              <a:gd name="connsiteY201" fmla="*/ 1632857 h 5843002"/>
-              <a:gd name="connsiteX202" fmla="*/ 9666514 w 11430000"/>
-              <a:gd name="connsiteY202" fmla="*/ 1642188 h 5843002"/>
-              <a:gd name="connsiteX203" fmla="*/ 9759820 w 11430000"/>
-              <a:gd name="connsiteY203" fmla="*/ 1660849 h 5843002"/>
-              <a:gd name="connsiteX204" fmla="*/ 9825135 w 11430000"/>
-              <a:gd name="connsiteY204" fmla="*/ 1688841 h 5843002"/>
-              <a:gd name="connsiteX205" fmla="*/ 9853126 w 11430000"/>
-              <a:gd name="connsiteY205" fmla="*/ 1707502 h 5843002"/>
-              <a:gd name="connsiteX206" fmla="*/ 9890449 w 11430000"/>
-              <a:gd name="connsiteY206" fmla="*/ 1726163 h 5843002"/>
-              <a:gd name="connsiteX207" fmla="*/ 9918441 w 11430000"/>
-              <a:gd name="connsiteY207" fmla="*/ 1754155 h 5843002"/>
-              <a:gd name="connsiteX208" fmla="*/ 9946433 w 11430000"/>
-              <a:gd name="connsiteY208" fmla="*/ 1763486 h 5843002"/>
-              <a:gd name="connsiteX209" fmla="*/ 10021077 w 11430000"/>
-              <a:gd name="connsiteY209" fmla="*/ 1819469 h 5843002"/>
-              <a:gd name="connsiteX210" fmla="*/ 10021077 w 11430000"/>
-              <a:gd name="connsiteY210" fmla="*/ 1819469 h 5843002"/>
-              <a:gd name="connsiteX211" fmla="*/ 10086392 w 11430000"/>
-              <a:gd name="connsiteY211" fmla="*/ 1884783 h 5843002"/>
-              <a:gd name="connsiteX212" fmla="*/ 10161037 w 11430000"/>
-              <a:gd name="connsiteY212" fmla="*/ 1931437 h 5843002"/>
-              <a:gd name="connsiteX213" fmla="*/ 10189028 w 11430000"/>
-              <a:gd name="connsiteY213" fmla="*/ 1968759 h 5843002"/>
-              <a:gd name="connsiteX214" fmla="*/ 10207690 w 11430000"/>
-              <a:gd name="connsiteY214" fmla="*/ 1996751 h 5843002"/>
-              <a:gd name="connsiteX215" fmla="*/ 10235682 w 11430000"/>
-              <a:gd name="connsiteY215" fmla="*/ 2015412 h 5843002"/>
-              <a:gd name="connsiteX216" fmla="*/ 10310326 w 11430000"/>
-              <a:gd name="connsiteY216" fmla="*/ 2108718 h 5843002"/>
-              <a:gd name="connsiteX217" fmla="*/ 10347649 w 11430000"/>
-              <a:gd name="connsiteY217" fmla="*/ 2146041 h 5843002"/>
-              <a:gd name="connsiteX218" fmla="*/ 10403633 w 11430000"/>
-              <a:gd name="connsiteY218" fmla="*/ 2220686 h 5843002"/>
-              <a:gd name="connsiteX219" fmla="*/ 10431624 w 11430000"/>
-              <a:gd name="connsiteY219" fmla="*/ 2258008 h 5843002"/>
-              <a:gd name="connsiteX220" fmla="*/ 10450286 w 11430000"/>
-              <a:gd name="connsiteY220" fmla="*/ 2276669 h 5843002"/>
-              <a:gd name="connsiteX221" fmla="*/ 10496939 w 11430000"/>
-              <a:gd name="connsiteY221" fmla="*/ 2341983 h 5843002"/>
-              <a:gd name="connsiteX222" fmla="*/ 10534261 w 11430000"/>
-              <a:gd name="connsiteY222" fmla="*/ 2397967 h 5843002"/>
-              <a:gd name="connsiteX223" fmla="*/ 10543592 w 11430000"/>
-              <a:gd name="connsiteY223" fmla="*/ 2425959 h 5843002"/>
-              <a:gd name="connsiteX224" fmla="*/ 10580914 w 11430000"/>
-              <a:gd name="connsiteY224" fmla="*/ 2463281 h 5843002"/>
-              <a:gd name="connsiteX225" fmla="*/ 10608906 w 11430000"/>
-              <a:gd name="connsiteY225" fmla="*/ 2528596 h 5843002"/>
-              <a:gd name="connsiteX226" fmla="*/ 10646228 w 11430000"/>
-              <a:gd name="connsiteY226" fmla="*/ 2603241 h 5843002"/>
-              <a:gd name="connsiteX227" fmla="*/ 10674220 w 11430000"/>
-              <a:gd name="connsiteY227" fmla="*/ 2649894 h 5843002"/>
-              <a:gd name="connsiteX228" fmla="*/ 10702212 w 11430000"/>
-              <a:gd name="connsiteY228" fmla="*/ 2715208 h 5843002"/>
-              <a:gd name="connsiteX229" fmla="*/ 10730204 w 11430000"/>
-              <a:gd name="connsiteY229" fmla="*/ 2771192 h 5843002"/>
-              <a:gd name="connsiteX230" fmla="*/ 10758196 w 11430000"/>
-              <a:gd name="connsiteY230" fmla="*/ 2845837 h 5843002"/>
-              <a:gd name="connsiteX231" fmla="*/ 10767526 w 11430000"/>
-              <a:gd name="connsiteY231" fmla="*/ 2892490 h 5843002"/>
-              <a:gd name="connsiteX232" fmla="*/ 10786188 w 11430000"/>
-              <a:gd name="connsiteY232" fmla="*/ 2920481 h 5843002"/>
-              <a:gd name="connsiteX233" fmla="*/ 10795518 w 11430000"/>
-              <a:gd name="connsiteY233" fmla="*/ 2948473 h 5843002"/>
-              <a:gd name="connsiteX234" fmla="*/ 10804849 w 11430000"/>
-              <a:gd name="connsiteY234" fmla="*/ 2985796 h 5843002"/>
-              <a:gd name="connsiteX235" fmla="*/ 10832841 w 11430000"/>
-              <a:gd name="connsiteY235" fmla="*/ 3060441 h 5843002"/>
-              <a:gd name="connsiteX236" fmla="*/ 10842171 w 11430000"/>
-              <a:gd name="connsiteY236" fmla="*/ 3107094 h 5843002"/>
-              <a:gd name="connsiteX237" fmla="*/ 10851502 w 11430000"/>
-              <a:gd name="connsiteY237" fmla="*/ 3135086 h 5843002"/>
-              <a:gd name="connsiteX238" fmla="*/ 10860833 w 11430000"/>
-              <a:gd name="connsiteY238" fmla="*/ 3181739 h 5843002"/>
-              <a:gd name="connsiteX239" fmla="*/ 10870163 w 11430000"/>
-              <a:gd name="connsiteY239" fmla="*/ 3237722 h 5843002"/>
-              <a:gd name="connsiteX240" fmla="*/ 10888824 w 11430000"/>
-              <a:gd name="connsiteY240" fmla="*/ 3275045 h 5843002"/>
-              <a:gd name="connsiteX241" fmla="*/ 10898155 w 11430000"/>
-              <a:gd name="connsiteY241" fmla="*/ 3312367 h 5843002"/>
-              <a:gd name="connsiteX242" fmla="*/ 10907486 w 11430000"/>
-              <a:gd name="connsiteY242" fmla="*/ 3340359 h 5843002"/>
-              <a:gd name="connsiteX243" fmla="*/ 10926147 w 11430000"/>
-              <a:gd name="connsiteY243" fmla="*/ 3424334 h 5843002"/>
-              <a:gd name="connsiteX244" fmla="*/ 10935477 w 11430000"/>
-              <a:gd name="connsiteY244" fmla="*/ 3452326 h 5843002"/>
-              <a:gd name="connsiteX245" fmla="*/ 10944808 w 11430000"/>
-              <a:gd name="connsiteY245" fmla="*/ 3536302 h 5843002"/>
-              <a:gd name="connsiteX246" fmla="*/ 10954139 w 11430000"/>
-              <a:gd name="connsiteY246" fmla="*/ 3648269 h 5843002"/>
-              <a:gd name="connsiteX247" fmla="*/ 10963469 w 11430000"/>
-              <a:gd name="connsiteY247" fmla="*/ 3722914 h 5843002"/>
-              <a:gd name="connsiteX248" fmla="*/ 10954139 w 11430000"/>
-              <a:gd name="connsiteY248" fmla="*/ 4142792 h 5843002"/>
-              <a:gd name="connsiteX249" fmla="*/ 10944808 w 11430000"/>
-              <a:gd name="connsiteY249" fmla="*/ 4264090 h 5843002"/>
-              <a:gd name="connsiteX250" fmla="*/ 10935477 w 11430000"/>
-              <a:gd name="connsiteY250" fmla="*/ 4516016 h 5843002"/>
-              <a:gd name="connsiteX251" fmla="*/ 10944808 w 11430000"/>
-              <a:gd name="connsiteY251" fmla="*/ 5010539 h 5843002"/>
-              <a:gd name="connsiteX252" fmla="*/ 10963469 w 11430000"/>
-              <a:gd name="connsiteY252" fmla="*/ 5225143 h 5843002"/>
-              <a:gd name="connsiteX253" fmla="*/ 10991461 w 11430000"/>
-              <a:gd name="connsiteY253" fmla="*/ 5393094 h 5843002"/>
-              <a:gd name="connsiteX254" fmla="*/ 11000792 w 11430000"/>
-              <a:gd name="connsiteY254" fmla="*/ 5421086 h 5843002"/>
-              <a:gd name="connsiteX255" fmla="*/ 11010122 w 11430000"/>
-              <a:gd name="connsiteY255" fmla="*/ 5523722 h 5843002"/>
-              <a:gd name="connsiteX256" fmla="*/ 11028784 w 11430000"/>
-              <a:gd name="connsiteY256" fmla="*/ 5579706 h 5843002"/>
-              <a:gd name="connsiteX257" fmla="*/ 11056775 w 11430000"/>
-              <a:gd name="connsiteY257" fmla="*/ 5654351 h 5843002"/>
-              <a:gd name="connsiteX258" fmla="*/ 11066106 w 11430000"/>
-              <a:gd name="connsiteY258" fmla="*/ 5682343 h 5843002"/>
-              <a:gd name="connsiteX259" fmla="*/ 11084767 w 11430000"/>
-              <a:gd name="connsiteY259" fmla="*/ 5710334 h 5843002"/>
-              <a:gd name="connsiteX260" fmla="*/ 11094098 w 11430000"/>
-              <a:gd name="connsiteY260" fmla="*/ 5738326 h 5843002"/>
-              <a:gd name="connsiteX261" fmla="*/ 11140751 w 11430000"/>
-              <a:gd name="connsiteY261" fmla="*/ 5775649 h 5843002"/>
-              <a:gd name="connsiteX262" fmla="*/ 11196735 w 11430000"/>
-              <a:gd name="connsiteY262" fmla="*/ 5822302 h 5843002"/>
-              <a:gd name="connsiteX263" fmla="*/ 11252718 w 11430000"/>
-              <a:gd name="connsiteY263" fmla="*/ 5831632 h 5843002"/>
-              <a:gd name="connsiteX264" fmla="*/ 11430000 w 11430000"/>
-              <a:gd name="connsiteY264" fmla="*/ 5840963 h 5843002"/>
-            </a:gdLst>
-            <a:ahLst/>
-            <a:cxnLst>
-              <a:cxn ang="0">
-                <a:pos x="connsiteX0" y="connsiteY0"/>
-              </a:cxn>
-              <a:cxn ang="0">
-                <a:pos x="connsiteX1" y="connsiteY1"/>
-              </a:cxn>
-              <a:cxn ang="0">
-                <a:pos x="connsiteX2" y="connsiteY2"/>
-              </a:cxn>
-              <a:cxn ang="0">
-                <a:pos x="connsiteX3" y="connsiteY3"/>
-              </a:cxn>
-              <a:cxn ang="0">
-                <a:pos x="connsiteX4" y="connsiteY4"/>
-              </a:cxn>
-              <a:cxn ang="0">
-                <a:pos x="connsiteX5" y="connsiteY5"/>
-              </a:cxn>
-              <a:cxn ang="0">
-                <a:pos x="connsiteX6" y="connsiteY6"/>
-              </a:cxn>
-              <a:cxn ang="0">
-                <a:pos x="connsiteX7" y="connsiteY7"/>
-              </a:cxn>
-              <a:cxn ang="0">
-                <a:pos x="connsiteX8" y="connsiteY8"/>
-              </a:cxn>
-              <a:cxn ang="0">
-                <a:pos x="connsiteX9" y="connsiteY9"/>
-              </a:cxn>
-              <a:cxn ang="0">
-                <a:pos x="connsiteX10" y="connsiteY10"/>
-              </a:cxn>
-              <a:cxn ang="0">
-                <a:pos x="connsiteX11" y="connsiteY11"/>
-              </a:cxn>
-              <a:cxn ang="0">
-                <a:pos x="connsiteX12" y="connsiteY12"/>
-              </a:cxn>
-              <a:cxn ang="0">
-                <a:pos x="connsiteX13" y="connsiteY13"/>
-              </a:cxn>
-              <a:cxn ang="0">
-                <a:pos x="connsiteX14" y="connsiteY14"/>
-              </a:cxn>
-              <a:cxn ang="0">
-                <a:pos x="connsiteX15" y="connsiteY15"/>
-              </a:cxn>
-              <a:cxn ang="0">
-                <a:pos x="connsiteX16" y="connsiteY16"/>
-              </a:cxn>
-              <a:cxn ang="0">
-                <a:pos x="connsiteX17" y="connsiteY17"/>
-              </a:cxn>
-              <a:cxn ang="0">
-                <a:pos x="connsiteX18" y="connsiteY18"/>
-              </a:cxn>
-              <a:cxn ang="0">
-                <a:pos x="connsiteX19" y="connsiteY19"/>
-              </a:cxn>
-              <a:cxn ang="0">
-                <a:pos x="connsiteX20" y="connsiteY20"/>
-              </a:cxn>
-              <a:cxn ang="0">
-                <a:pos x="connsiteX21" y="connsiteY21"/>
-              </a:cxn>
-              <a:cxn ang="0">
-                <a:pos x="connsiteX22" y="connsiteY22"/>
-              </a:cxn>
-              <a:cxn ang="0">
-                <a:pos x="connsiteX23" y="connsiteY23"/>
-              </a:cxn>
-              <a:cxn ang="0">
-                <a:pos x="connsiteX24" y="connsiteY24"/>
-              </a:cxn>
-              <a:cxn ang="0">
-                <a:pos x="connsiteX25" y="connsiteY25"/>
-              </a:cxn>
-              <a:cxn ang="0">
-                <a:pos x="connsiteX26" y="connsiteY26"/>
-              </a:cxn>
-              <a:cxn ang="0">
-                <a:pos x="connsiteX27" y="connsiteY27"/>
-              </a:cxn>
-              <a:cxn ang="0">
-                <a:pos x="connsiteX28" y="connsiteY28"/>
-              </a:cxn>
-              <a:cxn ang="0">
-                <a:pos x="connsiteX29" y="connsiteY29"/>
-              </a:cxn>
-              <a:cxn ang="0">
-                <a:pos x="connsiteX30" y="connsiteY30"/>
-              </a:cxn>
-              <a:cxn ang="0">
-                <a:pos x="connsiteX31" y="connsiteY31"/>
-              </a:cxn>
-              <a:cxn ang="0">
-                <a:pos x="connsiteX32" y="connsiteY32"/>
-              </a:cxn>
-              <a:cxn ang="0">
-                <a:pos x="connsiteX33" y="connsiteY33"/>
-              </a:cxn>
-              <a:cxn ang="0">
-                <a:pos x="connsiteX34" y="connsiteY34"/>
-              </a:cxn>
-              <a:cxn ang="0">
-                <a:pos x="connsiteX35" y="connsiteY35"/>
-              </a:cxn>
-              <a:cxn ang="0">
-                <a:pos x="connsiteX36" y="connsiteY36"/>
-              </a:cxn>
-              <a:cxn ang="0">
-                <a:pos x="connsiteX37" y="connsiteY37"/>
-              </a:cxn>
-              <a:cxn ang="0">
-                <a:pos x="connsiteX38" y="connsiteY38"/>
-              </a:cxn>
-              <a:cxn ang="0">
-                <a:pos x="connsiteX39" y="connsiteY39"/>
-              </a:cxn>
-              <a:cxn ang="0">
-                <a:pos x="connsiteX40" y="connsiteY40"/>
-              </a:cxn>
-              <a:cxn ang="0">
-                <a:pos x="connsiteX41" y="connsiteY41"/>
-              </a:cxn>
-              <a:cxn ang="0">
-                <a:pos x="connsiteX42" y="connsiteY42"/>
-              </a:cxn>
-              <a:cxn ang="0">
-                <a:pos x="connsiteX43" y="connsiteY43"/>
-              </a:cxn>
-              <a:cxn ang="0">
-                <a:pos x="connsiteX44" y="connsiteY44"/>
-              </a:cxn>
-              <a:cxn ang="0">
-                <a:pos x="connsiteX45" y="connsiteY45"/>
-              </a:cxn>
-              <a:cxn ang="0">
-                <a:pos x="connsiteX46" y="connsiteY46"/>
-              </a:cxn>
-              <a:cxn ang="0">
-                <a:pos x="connsiteX47" y="connsiteY47"/>
-              </a:cxn>
-              <a:cxn ang="0">
-                <a:pos x="connsiteX48" y="connsiteY48"/>
-              </a:cxn>
-              <a:cxn ang="0">
-                <a:pos x="connsiteX49" y="connsiteY49"/>
-              </a:cxn>
-              <a:cxn ang="0">
-                <a:pos x="connsiteX50" y="connsiteY50"/>
-              </a:cxn>
-              <a:cxn ang="0">
-                <a:pos x="connsiteX51" y="connsiteY51"/>
-              </a:cxn>
-              <a:cxn ang="0">
-                <a:pos x="connsiteX52" y="connsiteY52"/>
-              </a:cxn>
-              <a:cxn ang="0">
-                <a:pos x="connsiteX53" y="connsiteY53"/>
-              </a:cxn>
-              <a:cxn ang="0">
-                <a:pos x="connsiteX54" y="connsiteY54"/>
-              </a:cxn>
-              <a:cxn ang="0">
-                <a:pos x="connsiteX55" y="connsiteY55"/>
-              </a:cxn>
-              <a:cxn ang="0">
-                <a:pos x="connsiteX56" y="connsiteY56"/>
-              </a:cxn>
-              <a:cxn ang="0">
-                <a:pos x="connsiteX57" y="connsiteY57"/>
-              </a:cxn>
-              <a:cxn ang="0">
-                <a:pos x="connsiteX58" y="connsiteY58"/>
-              </a:cxn>
-              <a:cxn ang="0">
-                <a:pos x="connsiteX59" y="connsiteY59"/>
-              </a:cxn>
-              <a:cxn ang="0">
-                <a:pos x="connsiteX60" y="connsiteY60"/>
-              </a:cxn>
-              <a:cxn ang="0">
-                <a:pos x="connsiteX61" y="connsiteY61"/>
-              </a:cxn>
-              <a:cxn ang="0">
-                <a:pos x="connsiteX62" y="connsiteY62"/>
-              </a:cxn>
-              <a:cxn ang="0">
-                <a:pos x="connsiteX63" y="connsiteY63"/>
-              </a:cxn>
-              <a:cxn ang="0">
-                <a:pos x="connsiteX64" y="connsiteY64"/>
-              </a:cxn>
-              <a:cxn ang="0">
-                <a:pos x="connsiteX65" y="connsiteY65"/>
-              </a:cxn>
-              <a:cxn ang="0">
-                <a:pos x="connsiteX66" y="connsiteY66"/>
-              </a:cxn>
-              <a:cxn ang="0">
-                <a:pos x="connsiteX67" y="connsiteY67"/>
-              </a:cxn>
-              <a:cxn ang="0">
-                <a:pos x="connsiteX68" y="connsiteY68"/>
-              </a:cxn>
-              <a:cxn ang="0">
-                <a:pos x="connsiteX69" y="connsiteY69"/>
-              </a:cxn>
-              <a:cxn ang="0">
-                <a:pos x="connsiteX70" y="connsiteY70"/>
-              </a:cxn>
-              <a:cxn ang="0">
-                <a:pos x="connsiteX71" y="connsiteY71"/>
-              </a:cxn>
-              <a:cxn ang="0">
-                <a:pos x="connsiteX72" y="connsiteY72"/>
-              </a:cxn>
-              <a:cxn ang="0">
-                <a:pos x="connsiteX73" y="connsiteY73"/>
-              </a:cxn>
-              <a:cxn ang="0">
-                <a:pos x="connsiteX74" y="connsiteY74"/>
-              </a:cxn>
-              <a:cxn ang="0">
-                <a:pos x="connsiteX75" y="connsiteY75"/>
-              </a:cxn>
-              <a:cxn ang="0">
-                <a:pos x="connsiteX76" y="connsiteY76"/>
-              </a:cxn>
-              <a:cxn ang="0">
-                <a:pos x="connsiteX77" y="connsiteY77"/>
-              </a:cxn>
-              <a:cxn ang="0">
-                <a:pos x="connsiteX78" y="connsiteY78"/>
-              </a:cxn>
-              <a:cxn ang="0">
-                <a:pos x="connsiteX79" y="connsiteY79"/>
-              </a:cxn>
-              <a:cxn ang="0">
-                <a:pos x="connsiteX80" y="connsiteY80"/>
-              </a:cxn>
-              <a:cxn ang="0">
-                <a:pos x="connsiteX81" y="connsiteY81"/>
-              </a:cxn>
-              <a:cxn ang="0">
-                <a:pos x="connsiteX82" y="connsiteY82"/>
-              </a:cxn>
-              <a:cxn ang="0">
-                <a:pos x="connsiteX83" y="connsiteY83"/>
-              </a:cxn>
-              <a:cxn ang="0">
-                <a:pos x="connsiteX84" y="connsiteY84"/>
-              </a:cxn>
-              <a:cxn ang="0">
-                <a:pos x="connsiteX85" y="connsiteY85"/>
-              </a:cxn>
-              <a:cxn ang="0">
-                <a:pos x="connsiteX86" y="connsiteY86"/>
-              </a:cxn>
-              <a:cxn ang="0">
-                <a:pos x="connsiteX87" y="connsiteY87"/>
-              </a:cxn>
-              <a:cxn ang="0">
-                <a:pos x="connsiteX88" y="connsiteY88"/>
-              </a:cxn>
-              <a:cxn ang="0">
-                <a:pos x="connsiteX89" y="connsiteY89"/>
-              </a:cxn>
-              <a:cxn ang="0">
-                <a:pos x="connsiteX90" y="connsiteY90"/>
-              </a:cxn>
-              <a:cxn ang="0">
-                <a:pos x="connsiteX91" y="connsiteY91"/>
-              </a:cxn>
-              <a:cxn ang="0">
-                <a:pos x="connsiteX92" y="connsiteY92"/>
-              </a:cxn>
-              <a:cxn ang="0">
-                <a:pos x="connsiteX93" y="connsiteY93"/>
-              </a:cxn>
-              <a:cxn ang="0">
-                <a:pos x="connsiteX94" y="connsiteY94"/>
-              </a:cxn>
-              <a:cxn ang="0">
-                <a:pos x="connsiteX95" y="connsiteY95"/>
-              </a:cxn>
-              <a:cxn ang="0">
-                <a:pos x="connsiteX96" y="connsiteY96"/>
-              </a:cxn>
-              <a:cxn ang="0">
-                <a:pos x="connsiteX97" y="connsiteY97"/>
-              </a:cxn>
-              <a:cxn ang="0">
-                <a:pos x="connsiteX98" y="connsiteY98"/>
-              </a:cxn>
-              <a:cxn ang="0">
-                <a:pos x="connsiteX99" y="connsiteY99"/>
-              </a:cxn>
-              <a:cxn ang="0">
-                <a:pos x="connsiteX100" y="connsiteY100"/>
-              </a:cxn>
-              <a:cxn ang="0">
-                <a:pos x="connsiteX101" y="connsiteY101"/>
-              </a:cxn>
-              <a:cxn ang="0">
-                <a:pos x="connsiteX102" y="connsiteY102"/>
-              </a:cxn>
-              <a:cxn ang="0">
-                <a:pos x="connsiteX103" y="connsiteY103"/>
-              </a:cxn>
-              <a:cxn ang="0">
-                <a:pos x="connsiteX104" y="connsiteY104"/>
-              </a:cxn>
-              <a:cxn ang="0">
-                <a:pos x="connsiteX105" y="connsiteY105"/>
-              </a:cxn>
-              <a:cxn ang="0">
-                <a:pos x="connsiteX106" y="connsiteY106"/>
-              </a:cxn>
-              <a:cxn ang="0">
-                <a:pos x="connsiteX107" y="connsiteY107"/>
-              </a:cxn>
-              <a:cxn ang="0">
-                <a:pos x="connsiteX108" y="connsiteY108"/>
-              </a:cxn>
-              <a:cxn ang="0">
-                <a:pos x="connsiteX109" y="connsiteY109"/>
-              </a:cxn>
-              <a:cxn ang="0">
-                <a:pos x="connsiteX110" y="connsiteY110"/>
-              </a:cxn>
-              <a:cxn ang="0">
-                <a:pos x="connsiteX111" y="connsiteY111"/>
-              </a:cxn>
-              <a:cxn ang="0">
-                <a:pos x="connsiteX112" y="connsiteY112"/>
-              </a:cxn>
-              <a:cxn ang="0">
-                <a:pos x="connsiteX113" y="connsiteY113"/>
-              </a:cxn>
-              <a:cxn ang="0">
-                <a:pos x="connsiteX114" y="connsiteY114"/>
-              </a:cxn>
-              <a:cxn ang="0">
-                <a:pos x="connsiteX115" y="connsiteY115"/>
-              </a:cxn>
-              <a:cxn ang="0">
-                <a:pos x="connsiteX116" y="connsiteY116"/>
-              </a:cxn>
-              <a:cxn ang="0">
-                <a:pos x="connsiteX117" y="connsiteY117"/>
-              </a:cxn>
-              <a:cxn ang="0">
-                <a:pos x="connsiteX118" y="connsiteY118"/>
-              </a:cxn>
-              <a:cxn ang="0">
-                <a:pos x="connsiteX119" y="connsiteY119"/>
-              </a:cxn>
-              <a:cxn ang="0">
-                <a:pos x="connsiteX120" y="connsiteY120"/>
-              </a:cxn>
-              <a:cxn ang="0">
-                <a:pos x="connsiteX121" y="connsiteY121"/>
-              </a:cxn>
-              <a:cxn ang="0">
-                <a:pos x="connsiteX122" y="connsiteY122"/>
-              </a:cxn>
-              <a:cxn ang="0">
-                <a:pos x="connsiteX123" y="connsiteY123"/>
-              </a:cxn>
-              <a:cxn ang="0">
-                <a:pos x="connsiteX124" y="connsiteY124"/>
-              </a:cxn>
-              <a:cxn ang="0">
-                <a:pos x="connsiteX125" y="connsiteY125"/>
-              </a:cxn>
-              <a:cxn ang="0">
-                <a:pos x="connsiteX126" y="connsiteY126"/>
-              </a:cxn>
-              <a:cxn ang="0">
-                <a:pos x="connsiteX127" y="connsiteY127"/>
-              </a:cxn>
-              <a:cxn ang="0">
-                <a:pos x="connsiteX128" y="connsiteY128"/>
-              </a:cxn>
-              <a:cxn ang="0">
-                <a:pos x="connsiteX129" y="connsiteY129"/>
-              </a:cxn>
-              <a:cxn ang="0">
-                <a:pos x="connsiteX130" y="connsiteY130"/>
-              </a:cxn>
-              <a:cxn ang="0">
-                <a:pos x="connsiteX131" y="connsiteY131"/>
-              </a:cxn>
-              <a:cxn ang="0">
-                <a:pos x="connsiteX132" y="connsiteY132"/>
-              </a:cxn>
-              <a:cxn ang="0">
-                <a:pos x="connsiteX133" y="connsiteY133"/>
-              </a:cxn>
-              <a:cxn ang="0">
-                <a:pos x="connsiteX134" y="connsiteY134"/>
-              </a:cxn>
-              <a:cxn ang="0">
-                <a:pos x="connsiteX135" y="connsiteY135"/>
-              </a:cxn>
-              <a:cxn ang="0">
-                <a:pos x="connsiteX136" y="connsiteY136"/>
-              </a:cxn>
-              <a:cxn ang="0">
-                <a:pos x="connsiteX137" y="connsiteY137"/>
-              </a:cxn>
-              <a:cxn ang="0">
-                <a:pos x="connsiteX138" y="connsiteY138"/>
-              </a:cxn>
-              <a:cxn ang="0">
-                <a:pos x="connsiteX139" y="connsiteY139"/>
-              </a:cxn>
-              <a:cxn ang="0">
-                <a:pos x="connsiteX140" y="connsiteY140"/>
-              </a:cxn>
-              <a:cxn ang="0">
-                <a:pos x="connsiteX141" y="connsiteY141"/>
-              </a:cxn>
-              <a:cxn ang="0">
-                <a:pos x="connsiteX142" y="connsiteY142"/>
-              </a:cxn>
-              <a:cxn ang="0">
-                <a:pos x="connsiteX143" y="connsiteY143"/>
-              </a:cxn>
-              <a:cxn ang="0">
-                <a:pos x="connsiteX144" y="connsiteY144"/>
-              </a:cxn>
-              <a:cxn ang="0">
-                <a:pos x="connsiteX145" y="connsiteY145"/>
-              </a:cxn>
-              <a:cxn ang="0">
-                <a:pos x="connsiteX146" y="connsiteY146"/>
-              </a:cxn>
-              <a:cxn ang="0">
-                <a:pos x="connsiteX147" y="connsiteY147"/>
-              </a:cxn>
-              <a:cxn ang="0">
-                <a:pos x="connsiteX148" y="connsiteY148"/>
-              </a:cxn>
-              <a:cxn ang="0">
-                <a:pos x="connsiteX149" y="connsiteY149"/>
-              </a:cxn>
-              <a:cxn ang="0">
-                <a:pos x="connsiteX150" y="connsiteY150"/>
-              </a:cxn>
-              <a:cxn ang="0">
-                <a:pos x="connsiteX151" y="connsiteY151"/>
-              </a:cxn>
-              <a:cxn ang="0">
-                <a:pos x="connsiteX152" y="connsiteY152"/>
-              </a:cxn>
-              <a:cxn ang="0">
-                <a:pos x="connsiteX153" y="connsiteY153"/>
-              </a:cxn>
-              <a:cxn ang="0">
-                <a:pos x="connsiteX154" y="connsiteY154"/>
-              </a:cxn>
-              <a:cxn ang="0">
-                <a:pos x="connsiteX155" y="connsiteY155"/>
-              </a:cxn>
-              <a:cxn ang="0">
-                <a:pos x="connsiteX156" y="connsiteY156"/>
-              </a:cxn>
-              <a:cxn ang="0">
-                <a:pos x="connsiteX157" y="connsiteY157"/>
-              </a:cxn>
-              <a:cxn ang="0">
-                <a:pos x="connsiteX158" y="connsiteY158"/>
-              </a:cxn>
-              <a:cxn ang="0">
-                <a:pos x="connsiteX159" y="connsiteY159"/>
-              </a:cxn>
-              <a:cxn ang="0">
-                <a:pos x="connsiteX160" y="connsiteY160"/>
-              </a:cxn>
-              <a:cxn ang="0">
-                <a:pos x="connsiteX161" y="connsiteY161"/>
-              </a:cxn>
-              <a:cxn ang="0">
-                <a:pos x="connsiteX162" y="connsiteY162"/>
-              </a:cxn>
-              <a:cxn ang="0">
-                <a:pos x="connsiteX163" y="connsiteY163"/>
-              </a:cxn>
-              <a:cxn ang="0">
-                <a:pos x="connsiteX164" y="connsiteY164"/>
-              </a:cxn>
-              <a:cxn ang="0">
-                <a:pos x="connsiteX165" y="connsiteY165"/>
-              </a:cxn>
-              <a:cxn ang="0">
-                <a:pos x="connsiteX166" y="connsiteY166"/>
-              </a:cxn>
-              <a:cxn ang="0">
-                <a:pos x="connsiteX167" y="connsiteY167"/>
-              </a:cxn>
-              <a:cxn ang="0">
-                <a:pos x="connsiteX168" y="connsiteY168"/>
-              </a:cxn>
-              <a:cxn ang="0">
-                <a:pos x="connsiteX169" y="connsiteY169"/>
-              </a:cxn>
-              <a:cxn ang="0">
-                <a:pos x="connsiteX170" y="connsiteY170"/>
-              </a:cxn>
-              <a:cxn ang="0">
-                <a:pos x="connsiteX171" y="connsiteY171"/>
-              </a:cxn>
-              <a:cxn ang="0">
-                <a:pos x="connsiteX172" y="connsiteY172"/>
-              </a:cxn>
-              <a:cxn ang="0">
-                <a:pos x="connsiteX173" y="connsiteY173"/>
-              </a:cxn>
-              <a:cxn ang="0">
-                <a:pos x="connsiteX174" y="connsiteY174"/>
-              </a:cxn>
-              <a:cxn ang="0">
-                <a:pos x="connsiteX175" y="connsiteY175"/>
-              </a:cxn>
-              <a:cxn ang="0">
-                <a:pos x="connsiteX176" y="connsiteY176"/>
-              </a:cxn>
-              <a:cxn ang="0">
-                <a:pos x="connsiteX177" y="connsiteY177"/>
-              </a:cxn>
-              <a:cxn ang="0">
-                <a:pos x="connsiteX178" y="connsiteY178"/>
-              </a:cxn>
-              <a:cxn ang="0">
-                <a:pos x="connsiteX179" y="connsiteY179"/>
-              </a:cxn>
-              <a:cxn ang="0">
-                <a:pos x="connsiteX180" y="connsiteY180"/>
-              </a:cxn>
-              <a:cxn ang="0">
-                <a:pos x="connsiteX181" y="connsiteY181"/>
-              </a:cxn>
-              <a:cxn ang="0">
-                <a:pos x="connsiteX182" y="connsiteY182"/>
-              </a:cxn>
-              <a:cxn ang="0">
-                <a:pos x="connsiteX183" y="connsiteY183"/>
-              </a:cxn>
-              <a:cxn ang="0">
-                <a:pos x="connsiteX184" y="connsiteY184"/>
-              </a:cxn>
-              <a:cxn ang="0">
-                <a:pos x="connsiteX185" y="connsiteY185"/>
-              </a:cxn>
-              <a:cxn ang="0">
-                <a:pos x="connsiteX186" y="connsiteY186"/>
-              </a:cxn>
-              <a:cxn ang="0">
-                <a:pos x="connsiteX187" y="connsiteY187"/>
-              </a:cxn>
-              <a:cxn ang="0">
-                <a:pos x="connsiteX188" y="connsiteY188"/>
-              </a:cxn>
-              <a:cxn ang="0">
-                <a:pos x="connsiteX189" y="connsiteY189"/>
-              </a:cxn>
-              <a:cxn ang="0">
-                <a:pos x="connsiteX190" y="connsiteY190"/>
-              </a:cxn>
-              <a:cxn ang="0">
-                <a:pos x="connsiteX191" y="connsiteY191"/>
-              </a:cxn>
-              <a:cxn ang="0">
-                <a:pos x="connsiteX192" y="connsiteY192"/>
-              </a:cxn>
-              <a:cxn ang="0">
-                <a:pos x="connsiteX193" y="connsiteY193"/>
-              </a:cxn>
-              <a:cxn ang="0">
-                <a:pos x="connsiteX194" y="connsiteY194"/>
-              </a:cxn>
-              <a:cxn ang="0">
-                <a:pos x="connsiteX195" y="connsiteY195"/>
-              </a:cxn>
-              <a:cxn ang="0">
-                <a:pos x="connsiteX196" y="connsiteY196"/>
-              </a:cxn>
-              <a:cxn ang="0">
-                <a:pos x="connsiteX197" y="connsiteY197"/>
-              </a:cxn>
-              <a:cxn ang="0">
-                <a:pos x="connsiteX198" y="connsiteY198"/>
-              </a:cxn>
-              <a:cxn ang="0">
-                <a:pos x="connsiteX199" y="connsiteY199"/>
-              </a:cxn>
-              <a:cxn ang="0">
-                <a:pos x="connsiteX200" y="connsiteY200"/>
-              </a:cxn>
-              <a:cxn ang="0">
-                <a:pos x="connsiteX201" y="connsiteY201"/>
-              </a:cxn>
-              <a:cxn ang="0">
-                <a:pos x="connsiteX202" y="connsiteY202"/>
-              </a:cxn>
-              <a:cxn ang="0">
-                <a:pos x="connsiteX203" y="connsiteY203"/>
-              </a:cxn>
-              <a:cxn ang="0">
-                <a:pos x="connsiteX204" y="connsiteY204"/>
-              </a:cxn>
-              <a:cxn ang="0">
-                <a:pos x="connsiteX205" y="connsiteY205"/>
-              </a:cxn>
-              <a:cxn ang="0">
-                <a:pos x="connsiteX206" y="connsiteY206"/>
-              </a:cxn>
-              <a:cxn ang="0">
-                <a:pos x="connsiteX207" y="connsiteY207"/>
-              </a:cxn>
-              <a:cxn ang="0">
-                <a:pos x="connsiteX208" y="connsiteY208"/>
-              </a:cxn>
-              <a:cxn ang="0">
-                <a:pos x="connsiteX209" y="connsiteY209"/>
-              </a:cxn>
-              <a:cxn ang="0">
-                <a:pos x="connsiteX210" y="connsiteY210"/>
-              </a:cxn>
-              <a:cxn ang="0">
-                <a:pos x="connsiteX211" y="connsiteY211"/>
-              </a:cxn>
-              <a:cxn ang="0">
-                <a:pos x="connsiteX212" y="connsiteY212"/>
-              </a:cxn>
-              <a:cxn ang="0">
-                <a:pos x="connsiteX213" y="connsiteY213"/>
-              </a:cxn>
-              <a:cxn ang="0">
-                <a:pos x="connsiteX214" y="connsiteY214"/>
-              </a:cxn>
-              <a:cxn ang="0">
-                <a:pos x="connsiteX215" y="connsiteY215"/>
-              </a:cxn>
-              <a:cxn ang="0">
-                <a:pos x="connsiteX216" y="connsiteY216"/>
-              </a:cxn>
-              <a:cxn ang="0">
-                <a:pos x="connsiteX217" y="connsiteY217"/>
-              </a:cxn>
-              <a:cxn ang="0">
-                <a:pos x="connsiteX218" y="connsiteY218"/>
-              </a:cxn>
-              <a:cxn ang="0">
-                <a:pos x="connsiteX219" y="connsiteY219"/>
-              </a:cxn>
-              <a:cxn ang="0">
-                <a:pos x="connsiteX220" y="connsiteY220"/>
-              </a:cxn>
-              <a:cxn ang="0">
-                <a:pos x="connsiteX221" y="connsiteY221"/>
-              </a:cxn>
-              <a:cxn ang="0">
-                <a:pos x="connsiteX222" y="connsiteY222"/>
-              </a:cxn>
-              <a:cxn ang="0">
-                <a:pos x="connsiteX223" y="connsiteY223"/>
-              </a:cxn>
-              <a:cxn ang="0">
-                <a:pos x="connsiteX224" y="connsiteY224"/>
-              </a:cxn>
-              <a:cxn ang="0">
-                <a:pos x="connsiteX225" y="connsiteY225"/>
-              </a:cxn>
-              <a:cxn ang="0">
-                <a:pos x="connsiteX226" y="connsiteY226"/>
-              </a:cxn>
-              <a:cxn ang="0">
-                <a:pos x="connsiteX227" y="connsiteY227"/>
-              </a:cxn>
-              <a:cxn ang="0">
-                <a:pos x="connsiteX228" y="connsiteY228"/>
-              </a:cxn>
-              <a:cxn ang="0">
-                <a:pos x="connsiteX229" y="connsiteY229"/>
-              </a:cxn>
-              <a:cxn ang="0">
-                <a:pos x="connsiteX230" y="connsiteY230"/>
-              </a:cxn>
-              <a:cxn ang="0">
-                <a:pos x="connsiteX231" y="connsiteY231"/>
-              </a:cxn>
-              <a:cxn ang="0">
-                <a:pos x="connsiteX232" y="connsiteY232"/>
-              </a:cxn>
-              <a:cxn ang="0">
-                <a:pos x="connsiteX233" y="connsiteY233"/>
-              </a:cxn>
-              <a:cxn ang="0">
-                <a:pos x="connsiteX234" y="connsiteY234"/>
-              </a:cxn>
-              <a:cxn ang="0">
-                <a:pos x="connsiteX235" y="connsiteY235"/>
-              </a:cxn>
-              <a:cxn ang="0">
-                <a:pos x="connsiteX236" y="connsiteY236"/>
-              </a:cxn>
-              <a:cxn ang="0">
-                <a:pos x="connsiteX237" y="connsiteY237"/>
-              </a:cxn>
-              <a:cxn ang="0">
-                <a:pos x="connsiteX238" y="connsiteY238"/>
-              </a:cxn>
-              <a:cxn ang="0">
-                <a:pos x="connsiteX239" y="connsiteY239"/>
-              </a:cxn>
-              <a:cxn ang="0">
-                <a:pos x="connsiteX240" y="connsiteY240"/>
-              </a:cxn>
-              <a:cxn ang="0">
-                <a:pos x="connsiteX241" y="connsiteY241"/>
-              </a:cxn>
-              <a:cxn ang="0">
-                <a:pos x="connsiteX242" y="connsiteY242"/>
-              </a:cxn>
-              <a:cxn ang="0">
-                <a:pos x="connsiteX243" y="connsiteY243"/>
-              </a:cxn>
-              <a:cxn ang="0">
-                <a:pos x="connsiteX244" y="connsiteY244"/>
-              </a:cxn>
-              <a:cxn ang="0">
-                <a:pos x="connsiteX245" y="connsiteY245"/>
-              </a:cxn>
-              <a:cxn ang="0">
-                <a:pos x="connsiteX246" y="connsiteY246"/>
-              </a:cxn>
-              <a:cxn ang="0">
-                <a:pos x="connsiteX247" y="connsiteY247"/>
-              </a:cxn>
-              <a:cxn ang="0">
-                <a:pos x="connsiteX248" y="connsiteY248"/>
-              </a:cxn>
-              <a:cxn ang="0">
-                <a:pos x="connsiteX249" y="connsiteY249"/>
-              </a:cxn>
-              <a:cxn ang="0">
-                <a:pos x="connsiteX250" y="connsiteY250"/>
-              </a:cxn>
-              <a:cxn ang="0">
-                <a:pos x="connsiteX251" y="connsiteY251"/>
-              </a:cxn>
-              <a:cxn ang="0">
-                <a:pos x="connsiteX252" y="connsiteY252"/>
-              </a:cxn>
-              <a:cxn ang="0">
-                <a:pos x="connsiteX253" y="connsiteY253"/>
-              </a:cxn>
-              <a:cxn ang="0">
-                <a:pos x="connsiteX254" y="connsiteY254"/>
-              </a:cxn>
-              <a:cxn ang="0">
-                <a:pos x="connsiteX255" y="connsiteY255"/>
-              </a:cxn>
-              <a:cxn ang="0">
-                <a:pos x="connsiteX256" y="connsiteY256"/>
-              </a:cxn>
-              <a:cxn ang="0">
-                <a:pos x="connsiteX257" y="connsiteY257"/>
-              </a:cxn>
-              <a:cxn ang="0">
-                <a:pos x="connsiteX258" y="connsiteY258"/>
-              </a:cxn>
-              <a:cxn ang="0">
-                <a:pos x="connsiteX259" y="connsiteY259"/>
-              </a:cxn>
-              <a:cxn ang="0">
-                <a:pos x="connsiteX260" y="connsiteY260"/>
-              </a:cxn>
-              <a:cxn ang="0">
-                <a:pos x="connsiteX261" y="connsiteY261"/>
-              </a:cxn>
-              <a:cxn ang="0">
-                <a:pos x="connsiteX262" y="connsiteY262"/>
-              </a:cxn>
-              <a:cxn ang="0">
-                <a:pos x="connsiteX263" y="connsiteY263"/>
-              </a:cxn>
-              <a:cxn ang="0">
-                <a:pos x="connsiteX264" y="connsiteY264"/>
-              </a:cxn>
-            </a:cxnLst>
-            <a:rect l="l" t="t" r="r" b="b"/>
-            <a:pathLst>
-              <a:path w="11430000" h="5843002">
-                <a:moveTo>
-                  <a:pt x="0" y="0"/>
-                </a:moveTo>
-                <a:cubicBezTo>
-                  <a:pt x="112166" y="48071"/>
-                  <a:pt x="22816" y="2909"/>
-                  <a:pt x="111967" y="65314"/>
-                </a:cubicBezTo>
-                <a:cubicBezTo>
-                  <a:pt x="126824" y="75714"/>
-                  <a:pt x="143241" y="83694"/>
-                  <a:pt x="158620" y="93306"/>
-                </a:cubicBezTo>
-                <a:cubicBezTo>
-                  <a:pt x="168129" y="99249"/>
-                  <a:pt x="176875" y="106403"/>
-                  <a:pt x="186612" y="111967"/>
-                </a:cubicBezTo>
-                <a:cubicBezTo>
-                  <a:pt x="236597" y="140529"/>
-                  <a:pt x="210240" y="118973"/>
-                  <a:pt x="251926" y="149290"/>
-                </a:cubicBezTo>
-                <a:cubicBezTo>
-                  <a:pt x="277079" y="167583"/>
-                  <a:pt x="309318" y="179395"/>
-                  <a:pt x="326571" y="205273"/>
-                </a:cubicBezTo>
-                <a:cubicBezTo>
-                  <a:pt x="353859" y="246204"/>
-                  <a:pt x="336262" y="226536"/>
-                  <a:pt x="382555" y="261257"/>
-                </a:cubicBezTo>
-                <a:cubicBezTo>
-                  <a:pt x="399663" y="312579"/>
-                  <a:pt x="381607" y="266595"/>
-                  <a:pt x="410547" y="317241"/>
-                </a:cubicBezTo>
-                <a:cubicBezTo>
-                  <a:pt x="457899" y="400108"/>
-                  <a:pt x="402404" y="314357"/>
-                  <a:pt x="447869" y="382555"/>
-                </a:cubicBezTo>
-                <a:cubicBezTo>
-                  <a:pt x="450979" y="398106"/>
-                  <a:pt x="453353" y="413823"/>
-                  <a:pt x="457200" y="429208"/>
-                </a:cubicBezTo>
-                <a:cubicBezTo>
-                  <a:pt x="459586" y="438750"/>
-                  <a:pt x="464319" y="447616"/>
-                  <a:pt x="466531" y="457200"/>
-                </a:cubicBezTo>
-                <a:cubicBezTo>
-                  <a:pt x="473663" y="488106"/>
-                  <a:pt x="485192" y="550506"/>
-                  <a:pt x="485192" y="550506"/>
-                </a:cubicBezTo>
-                <a:cubicBezTo>
-                  <a:pt x="488705" y="596176"/>
-                  <a:pt x="494278" y="693789"/>
-                  <a:pt x="503853" y="746449"/>
-                </a:cubicBezTo>
-                <a:cubicBezTo>
-                  <a:pt x="505612" y="756126"/>
-                  <a:pt x="510074" y="765110"/>
-                  <a:pt x="513184" y="774441"/>
-                </a:cubicBezTo>
-                <a:cubicBezTo>
-                  <a:pt x="516294" y="796212"/>
-                  <a:pt x="518580" y="818117"/>
-                  <a:pt x="522514" y="839755"/>
-                </a:cubicBezTo>
-                <a:cubicBezTo>
-                  <a:pt x="530987" y="886355"/>
-                  <a:pt x="530278" y="865113"/>
-                  <a:pt x="541175" y="905069"/>
-                </a:cubicBezTo>
-                <a:cubicBezTo>
-                  <a:pt x="547923" y="929813"/>
-                  <a:pt x="551727" y="955382"/>
-                  <a:pt x="559837" y="979714"/>
-                </a:cubicBezTo>
-                <a:cubicBezTo>
-                  <a:pt x="562947" y="989045"/>
-                  <a:pt x="566465" y="998249"/>
-                  <a:pt x="569167" y="1007706"/>
-                </a:cubicBezTo>
-                <a:cubicBezTo>
-                  <a:pt x="572690" y="1020036"/>
-                  <a:pt x="574813" y="1032745"/>
-                  <a:pt x="578498" y="1045028"/>
-                </a:cubicBezTo>
-                <a:cubicBezTo>
-                  <a:pt x="584150" y="1063869"/>
-                  <a:pt x="590939" y="1082351"/>
-                  <a:pt x="597159" y="1101012"/>
-                </a:cubicBezTo>
-                <a:lnTo>
-                  <a:pt x="615820" y="1156996"/>
-                </a:lnTo>
-                <a:lnTo>
-                  <a:pt x="625151" y="1184988"/>
-                </a:lnTo>
-                <a:cubicBezTo>
-                  <a:pt x="628261" y="1194318"/>
-                  <a:pt x="632553" y="1203335"/>
-                  <a:pt x="634482" y="1212979"/>
-                </a:cubicBezTo>
-                <a:cubicBezTo>
-                  <a:pt x="636144" y="1221288"/>
-                  <a:pt x="648200" y="1285421"/>
-                  <a:pt x="653143" y="1296955"/>
-                </a:cubicBezTo>
-                <a:cubicBezTo>
-                  <a:pt x="657560" y="1307262"/>
-                  <a:pt x="665584" y="1315616"/>
-                  <a:pt x="671804" y="1324947"/>
-                </a:cubicBezTo>
-                <a:cubicBezTo>
-                  <a:pt x="685352" y="1406233"/>
-                  <a:pt x="676546" y="1362570"/>
-                  <a:pt x="699796" y="1455575"/>
-                </a:cubicBezTo>
-                <a:cubicBezTo>
-                  <a:pt x="702906" y="1468016"/>
-                  <a:pt x="705071" y="1480732"/>
-                  <a:pt x="709126" y="1492898"/>
-                </a:cubicBezTo>
-                <a:cubicBezTo>
-                  <a:pt x="712236" y="1502229"/>
-                  <a:pt x="716323" y="1511289"/>
-                  <a:pt x="718457" y="1520890"/>
-                </a:cubicBezTo>
-                <a:cubicBezTo>
-                  <a:pt x="722561" y="1539358"/>
-                  <a:pt x="724404" y="1558260"/>
-                  <a:pt x="727788" y="1576873"/>
-                </a:cubicBezTo>
-                <a:cubicBezTo>
-                  <a:pt x="730625" y="1592476"/>
-                  <a:pt x="734008" y="1607975"/>
-                  <a:pt x="737118" y="1623526"/>
-                </a:cubicBezTo>
-                <a:cubicBezTo>
-                  <a:pt x="740228" y="1657738"/>
-                  <a:pt x="742853" y="1691998"/>
-                  <a:pt x="746449" y="1726163"/>
-                </a:cubicBezTo>
-                <a:cubicBezTo>
-                  <a:pt x="749074" y="1751101"/>
-                  <a:pt x="755779" y="1775733"/>
-                  <a:pt x="755779" y="1800808"/>
-                </a:cubicBezTo>
-                <a:cubicBezTo>
-                  <a:pt x="755779" y="1928364"/>
-                  <a:pt x="751447" y="2055905"/>
-                  <a:pt x="746449" y="2183363"/>
-                </a:cubicBezTo>
-                <a:cubicBezTo>
-                  <a:pt x="745224" y="2214596"/>
-                  <a:pt x="740081" y="2245553"/>
-                  <a:pt x="737118" y="2276669"/>
-                </a:cubicBezTo>
-                <a:cubicBezTo>
-                  <a:pt x="725819" y="2395309"/>
-                  <a:pt x="736422" y="2344772"/>
-                  <a:pt x="718457" y="2416628"/>
-                </a:cubicBezTo>
-                <a:cubicBezTo>
-                  <a:pt x="715347" y="2447730"/>
-                  <a:pt x="713879" y="2479040"/>
-                  <a:pt x="709126" y="2509934"/>
-                </a:cubicBezTo>
-                <a:cubicBezTo>
-                  <a:pt x="707630" y="2519655"/>
-                  <a:pt x="701187" y="2528190"/>
-                  <a:pt x="699796" y="2537926"/>
-                </a:cubicBezTo>
-                <a:cubicBezTo>
-                  <a:pt x="694938" y="2571934"/>
-                  <a:pt x="695823" y="2606630"/>
-                  <a:pt x="690465" y="2640563"/>
-                </a:cubicBezTo>
-                <a:cubicBezTo>
-                  <a:pt x="686465" y="2665897"/>
-                  <a:pt x="675431" y="2689818"/>
-                  <a:pt x="671804" y="2715208"/>
-                </a:cubicBezTo>
-                <a:cubicBezTo>
-                  <a:pt x="660659" y="2793217"/>
-                  <a:pt x="667807" y="2759186"/>
-                  <a:pt x="653143" y="2817845"/>
-                </a:cubicBezTo>
-                <a:cubicBezTo>
-                  <a:pt x="650033" y="2858278"/>
-                  <a:pt x="649057" y="2898932"/>
-                  <a:pt x="643812" y="2939143"/>
-                </a:cubicBezTo>
-                <a:cubicBezTo>
-                  <a:pt x="633816" y="3015777"/>
-                  <a:pt x="628324" y="3013503"/>
-                  <a:pt x="615820" y="3069771"/>
-                </a:cubicBezTo>
-                <a:cubicBezTo>
-                  <a:pt x="601349" y="3134889"/>
-                  <a:pt x="615699" y="3098007"/>
-                  <a:pt x="587828" y="3153747"/>
-                </a:cubicBezTo>
-                <a:cubicBezTo>
-                  <a:pt x="573554" y="3225123"/>
-                  <a:pt x="586141" y="3176910"/>
-                  <a:pt x="559837" y="3247053"/>
-                </a:cubicBezTo>
-                <a:cubicBezTo>
-                  <a:pt x="556384" y="3256262"/>
-                  <a:pt x="554576" y="3266091"/>
-                  <a:pt x="550506" y="3275045"/>
-                </a:cubicBezTo>
-                <a:cubicBezTo>
-                  <a:pt x="538995" y="3300370"/>
-                  <a:pt x="525625" y="3324808"/>
-                  <a:pt x="513184" y="3349690"/>
-                </a:cubicBezTo>
-                <a:lnTo>
-                  <a:pt x="494522" y="3387012"/>
-                </a:lnTo>
-                <a:cubicBezTo>
-                  <a:pt x="491412" y="3405673"/>
-                  <a:pt x="489296" y="3424528"/>
-                  <a:pt x="485192" y="3442996"/>
-                </a:cubicBezTo>
-                <a:cubicBezTo>
-                  <a:pt x="483058" y="3452597"/>
-                  <a:pt x="478563" y="3461531"/>
-                  <a:pt x="475861" y="3470988"/>
-                </a:cubicBezTo>
-                <a:cubicBezTo>
-                  <a:pt x="467079" y="3501724"/>
-                  <a:pt x="463611" y="3522908"/>
-                  <a:pt x="457200" y="3554963"/>
-                </a:cubicBezTo>
-                <a:cubicBezTo>
-                  <a:pt x="454090" y="3617167"/>
-                  <a:pt x="452646" y="3679477"/>
-                  <a:pt x="447869" y="3741575"/>
-                </a:cubicBezTo>
-                <a:cubicBezTo>
-                  <a:pt x="442163" y="3815753"/>
-                  <a:pt x="441797" y="3775196"/>
-                  <a:pt x="429208" y="3825551"/>
-                </a:cubicBezTo>
-                <a:cubicBezTo>
-                  <a:pt x="425361" y="3840936"/>
-                  <a:pt x="423317" y="3856723"/>
-                  <a:pt x="419877" y="3872204"/>
-                </a:cubicBezTo>
-                <a:cubicBezTo>
-                  <a:pt x="416233" y="3888600"/>
-                  <a:pt x="408411" y="3920729"/>
-                  <a:pt x="401216" y="3937518"/>
-                </a:cubicBezTo>
-                <a:cubicBezTo>
-                  <a:pt x="395737" y="3950303"/>
-                  <a:pt x="387439" y="3961817"/>
-                  <a:pt x="382555" y="3974841"/>
-                </a:cubicBezTo>
-                <a:cubicBezTo>
-                  <a:pt x="356733" y="4043699"/>
-                  <a:pt x="392380" y="3983429"/>
-                  <a:pt x="354563" y="4040155"/>
-                </a:cubicBezTo>
-                <a:cubicBezTo>
-                  <a:pt x="351453" y="4049486"/>
-                  <a:pt x="347935" y="4058690"/>
-                  <a:pt x="345233" y="4068147"/>
-                </a:cubicBezTo>
-                <a:cubicBezTo>
-                  <a:pt x="341710" y="4080477"/>
-                  <a:pt x="340405" y="4093462"/>
-                  <a:pt x="335902" y="4105469"/>
-                </a:cubicBezTo>
-                <a:cubicBezTo>
-                  <a:pt x="331018" y="4118493"/>
-                  <a:pt x="322125" y="4129768"/>
-                  <a:pt x="317241" y="4142792"/>
-                </a:cubicBezTo>
-                <a:cubicBezTo>
-                  <a:pt x="311593" y="4157853"/>
-                  <a:pt x="301113" y="4214097"/>
-                  <a:pt x="298579" y="4226767"/>
-                </a:cubicBezTo>
-                <a:cubicBezTo>
-                  <a:pt x="302585" y="4254807"/>
-                  <a:pt x="309054" y="4308716"/>
-                  <a:pt x="317241" y="4338734"/>
-                </a:cubicBezTo>
-                <a:cubicBezTo>
-                  <a:pt x="322417" y="4357712"/>
-                  <a:pt x="319535" y="4383807"/>
-                  <a:pt x="335902" y="4394718"/>
-                </a:cubicBezTo>
-                <a:lnTo>
-                  <a:pt x="363894" y="4413379"/>
-                </a:lnTo>
-                <a:cubicBezTo>
-                  <a:pt x="370114" y="4425820"/>
-                  <a:pt x="372720" y="4440867"/>
-                  <a:pt x="382555" y="4450702"/>
-                </a:cubicBezTo>
-                <a:cubicBezTo>
-                  <a:pt x="398414" y="4466561"/>
-                  <a:pt x="419878" y="4475583"/>
-                  <a:pt x="438539" y="4488024"/>
-                </a:cubicBezTo>
-                <a:lnTo>
-                  <a:pt x="494522" y="4525347"/>
-                </a:lnTo>
-                <a:lnTo>
-                  <a:pt x="531845" y="4534677"/>
-                </a:lnTo>
-                <a:cubicBezTo>
-                  <a:pt x="541176" y="4540898"/>
-                  <a:pt x="549530" y="4548921"/>
-                  <a:pt x="559837" y="4553339"/>
-                </a:cubicBezTo>
-                <a:cubicBezTo>
-                  <a:pt x="571624" y="4558390"/>
-                  <a:pt x="584829" y="4559146"/>
-                  <a:pt x="597159" y="4562669"/>
-                </a:cubicBezTo>
-                <a:cubicBezTo>
-                  <a:pt x="606616" y="4565371"/>
-                  <a:pt x="615694" y="4569298"/>
-                  <a:pt x="625151" y="4572000"/>
-                </a:cubicBezTo>
-                <a:cubicBezTo>
-                  <a:pt x="637481" y="4575523"/>
-                  <a:pt x="650143" y="4577807"/>
-                  <a:pt x="662473" y="4581330"/>
-                </a:cubicBezTo>
-                <a:cubicBezTo>
-                  <a:pt x="671930" y="4584032"/>
-                  <a:pt x="681425" y="4586787"/>
-                  <a:pt x="690465" y="4590661"/>
-                </a:cubicBezTo>
-                <a:cubicBezTo>
-                  <a:pt x="740214" y="4611982"/>
-                  <a:pt x="712026" y="4606152"/>
-                  <a:pt x="755779" y="4618653"/>
-                </a:cubicBezTo>
-                <a:cubicBezTo>
-                  <a:pt x="768109" y="4622176"/>
-                  <a:pt x="780772" y="4624460"/>
-                  <a:pt x="793102" y="4627983"/>
-                </a:cubicBezTo>
-                <a:cubicBezTo>
-                  <a:pt x="802559" y="4630685"/>
-                  <a:pt x="811605" y="4634726"/>
-                  <a:pt x="821094" y="4637314"/>
-                </a:cubicBezTo>
-                <a:cubicBezTo>
-                  <a:pt x="845838" y="4644062"/>
-                  <a:pt x="895739" y="4655975"/>
-                  <a:pt x="895739" y="4655975"/>
-                </a:cubicBezTo>
-                <a:cubicBezTo>
-                  <a:pt x="905070" y="4662196"/>
-                  <a:pt x="913013" y="4671339"/>
-                  <a:pt x="923731" y="4674637"/>
-                </a:cubicBezTo>
-                <a:cubicBezTo>
-                  <a:pt x="991346" y="4695442"/>
-                  <a:pt x="1059127" y="4696805"/>
-                  <a:pt x="1129004" y="4702628"/>
-                </a:cubicBezTo>
-                <a:cubicBezTo>
-                  <a:pt x="1144555" y="4705738"/>
-                  <a:pt x="1159798" y="4711959"/>
-                  <a:pt x="1175657" y="4711959"/>
-                </a:cubicBezTo>
-                <a:cubicBezTo>
-                  <a:pt x="1397597" y="4711959"/>
-                  <a:pt x="1374113" y="4712932"/>
-                  <a:pt x="1511559" y="4693298"/>
-                </a:cubicBezTo>
-                <a:cubicBezTo>
-                  <a:pt x="1578675" y="4670925"/>
-                  <a:pt x="1494861" y="4698069"/>
-                  <a:pt x="1576873" y="4674637"/>
-                </a:cubicBezTo>
-                <a:cubicBezTo>
-                  <a:pt x="1586330" y="4671935"/>
-                  <a:pt x="1595323" y="4667692"/>
-                  <a:pt x="1604865" y="4665306"/>
-                </a:cubicBezTo>
-                <a:cubicBezTo>
-                  <a:pt x="1620250" y="4661459"/>
-                  <a:pt x="1636065" y="4659541"/>
-                  <a:pt x="1651518" y="4655975"/>
-                </a:cubicBezTo>
-                <a:cubicBezTo>
-                  <a:pt x="1676509" y="4650208"/>
-                  <a:pt x="1700714" y="4640495"/>
-                  <a:pt x="1726163" y="4637314"/>
-                </a:cubicBezTo>
-                <a:cubicBezTo>
-                  <a:pt x="1751045" y="4634204"/>
-                  <a:pt x="1776074" y="4632105"/>
-                  <a:pt x="1800808" y="4627983"/>
-                </a:cubicBezTo>
-                <a:cubicBezTo>
-                  <a:pt x="1813457" y="4625875"/>
-                  <a:pt x="1825514" y="4620947"/>
-                  <a:pt x="1838131" y="4618653"/>
-                </a:cubicBezTo>
-                <a:cubicBezTo>
-                  <a:pt x="1859769" y="4614719"/>
-                  <a:pt x="1881674" y="4612432"/>
-                  <a:pt x="1903445" y="4609322"/>
-                </a:cubicBezTo>
-                <a:cubicBezTo>
-                  <a:pt x="1963380" y="4589345"/>
-                  <a:pt x="1914374" y="4603396"/>
-                  <a:pt x="2024743" y="4590661"/>
-                </a:cubicBezTo>
-                <a:lnTo>
-                  <a:pt x="2174033" y="4572000"/>
-                </a:lnTo>
-                <a:cubicBezTo>
-                  <a:pt x="2183363" y="4568890"/>
-                  <a:pt x="2192483" y="4565054"/>
-                  <a:pt x="2202024" y="4562669"/>
-                </a:cubicBezTo>
-                <a:lnTo>
-                  <a:pt x="2276669" y="4544008"/>
-                </a:lnTo>
-                <a:cubicBezTo>
-                  <a:pt x="2282890" y="4534677"/>
-                  <a:pt x="2286891" y="4523401"/>
-                  <a:pt x="2295331" y="4516016"/>
-                </a:cubicBezTo>
-                <a:cubicBezTo>
-                  <a:pt x="2312210" y="4501247"/>
-                  <a:pt x="2351314" y="4478694"/>
-                  <a:pt x="2351314" y="4478694"/>
-                </a:cubicBezTo>
-                <a:cubicBezTo>
-                  <a:pt x="2357534" y="4469363"/>
-                  <a:pt x="2362046" y="4458631"/>
-                  <a:pt x="2369975" y="4450702"/>
-                </a:cubicBezTo>
-                <a:cubicBezTo>
-                  <a:pt x="2413062" y="4407615"/>
-                  <a:pt x="2385195" y="4460099"/>
-                  <a:pt x="2425959" y="4404049"/>
-                </a:cubicBezTo>
-                <a:cubicBezTo>
-                  <a:pt x="2443217" y="4380319"/>
-                  <a:pt x="2455007" y="4352877"/>
-                  <a:pt x="2472612" y="4329404"/>
-                </a:cubicBezTo>
-                <a:lnTo>
-                  <a:pt x="2528596" y="4254759"/>
-                </a:lnTo>
-                <a:cubicBezTo>
-                  <a:pt x="2531706" y="4245428"/>
-                  <a:pt x="2533150" y="4235365"/>
-                  <a:pt x="2537926" y="4226767"/>
-                </a:cubicBezTo>
-                <a:cubicBezTo>
-                  <a:pt x="2554336" y="4197229"/>
-                  <a:pt x="2582273" y="4161417"/>
-                  <a:pt x="2603241" y="4133461"/>
-                </a:cubicBezTo>
-                <a:cubicBezTo>
-                  <a:pt x="2606351" y="4124130"/>
-                  <a:pt x="2607795" y="4114067"/>
-                  <a:pt x="2612571" y="4105469"/>
-                </a:cubicBezTo>
-                <a:cubicBezTo>
-                  <a:pt x="2638945" y="4057996"/>
-                  <a:pt x="2640244" y="4059136"/>
-                  <a:pt x="2668555" y="4030824"/>
-                </a:cubicBezTo>
-                <a:cubicBezTo>
-                  <a:pt x="2674775" y="4012163"/>
-                  <a:pt x="2676305" y="3991208"/>
-                  <a:pt x="2687216" y="3974841"/>
-                </a:cubicBezTo>
-                <a:cubicBezTo>
-                  <a:pt x="2714503" y="3933910"/>
-                  <a:pt x="2699149" y="3955820"/>
-                  <a:pt x="2733869" y="3909526"/>
-                </a:cubicBezTo>
-                <a:cubicBezTo>
-                  <a:pt x="2767903" y="3807427"/>
-                  <a:pt x="2713622" y="3962081"/>
-                  <a:pt x="2761861" y="3853543"/>
-                </a:cubicBezTo>
-                <a:cubicBezTo>
-                  <a:pt x="2769850" y="3835568"/>
-                  <a:pt x="2774302" y="3816220"/>
-                  <a:pt x="2780522" y="3797559"/>
-                </a:cubicBezTo>
-                <a:cubicBezTo>
-                  <a:pt x="2783632" y="3788228"/>
-                  <a:pt x="2785454" y="3778364"/>
-                  <a:pt x="2789853" y="3769567"/>
-                </a:cubicBezTo>
-                <a:cubicBezTo>
-                  <a:pt x="2799184" y="3750906"/>
-                  <a:pt x="2809820" y="3732842"/>
-                  <a:pt x="2817845" y="3713583"/>
-                </a:cubicBezTo>
-                <a:cubicBezTo>
-                  <a:pt x="2825411" y="3695426"/>
-                  <a:pt x="2830286" y="3676261"/>
-                  <a:pt x="2836506" y="3657600"/>
-                </a:cubicBezTo>
-                <a:cubicBezTo>
-                  <a:pt x="2839616" y="3648269"/>
-                  <a:pt x="2839936" y="3637476"/>
-                  <a:pt x="2845837" y="3629608"/>
-                </a:cubicBezTo>
-                <a:lnTo>
-                  <a:pt x="2873828" y="3592286"/>
-                </a:lnTo>
-                <a:cubicBezTo>
-                  <a:pt x="2889032" y="3531472"/>
-                  <a:pt x="2874713" y="3577277"/>
-                  <a:pt x="2901820" y="3517641"/>
-                </a:cubicBezTo>
-                <a:cubicBezTo>
-                  <a:pt x="2911622" y="3496077"/>
-                  <a:pt x="2919219" y="3473512"/>
-                  <a:pt x="2929812" y="3452326"/>
-                </a:cubicBezTo>
-                <a:cubicBezTo>
-                  <a:pt x="2963474" y="3385002"/>
-                  <a:pt x="2934422" y="3468794"/>
-                  <a:pt x="2967135" y="3387012"/>
-                </a:cubicBezTo>
-                <a:cubicBezTo>
-                  <a:pt x="3000448" y="3303731"/>
-                  <a:pt x="2968553" y="3356891"/>
-                  <a:pt x="3004457" y="3303037"/>
-                </a:cubicBezTo>
-                <a:cubicBezTo>
-                  <a:pt x="3007567" y="3290596"/>
-                  <a:pt x="3010265" y="3278045"/>
-                  <a:pt x="3013788" y="3265714"/>
-                </a:cubicBezTo>
-                <a:cubicBezTo>
-                  <a:pt x="3020009" y="3243941"/>
-                  <a:pt x="3029336" y="3219063"/>
-                  <a:pt x="3041779" y="3200400"/>
-                </a:cubicBezTo>
-                <a:cubicBezTo>
-                  <a:pt x="3046659" y="3193080"/>
-                  <a:pt x="3054220" y="3187959"/>
-                  <a:pt x="3060441" y="3181739"/>
-                </a:cubicBezTo>
-                <a:cubicBezTo>
-                  <a:pt x="3066661" y="3163078"/>
-                  <a:pt x="3068191" y="3142122"/>
-                  <a:pt x="3079102" y="3125755"/>
-                </a:cubicBezTo>
-                <a:cubicBezTo>
-                  <a:pt x="3091916" y="3106534"/>
-                  <a:pt x="3117718" y="3068791"/>
-                  <a:pt x="3125755" y="3051110"/>
-                </a:cubicBezTo>
-                <a:cubicBezTo>
-                  <a:pt x="3133895" y="3033202"/>
-                  <a:pt x="3139645" y="3014209"/>
-                  <a:pt x="3144416" y="2995126"/>
-                </a:cubicBezTo>
-                <a:cubicBezTo>
-                  <a:pt x="3147526" y="2982685"/>
-                  <a:pt x="3148695" y="2969591"/>
-                  <a:pt x="3153747" y="2957804"/>
-                </a:cubicBezTo>
-                <a:cubicBezTo>
-                  <a:pt x="3158164" y="2947497"/>
-                  <a:pt x="3167393" y="2939842"/>
-                  <a:pt x="3172408" y="2929812"/>
-                </a:cubicBezTo>
-                <a:cubicBezTo>
-                  <a:pt x="3176807" y="2921015"/>
-                  <a:pt x="3177340" y="2910617"/>
-                  <a:pt x="3181739" y="2901820"/>
-                </a:cubicBezTo>
-                <a:cubicBezTo>
-                  <a:pt x="3186754" y="2891790"/>
-                  <a:pt x="3195385" y="2883858"/>
-                  <a:pt x="3200400" y="2873828"/>
-                </a:cubicBezTo>
-                <a:cubicBezTo>
-                  <a:pt x="3204798" y="2865031"/>
-                  <a:pt x="3205333" y="2854634"/>
-                  <a:pt x="3209731" y="2845837"/>
-                </a:cubicBezTo>
-                <a:cubicBezTo>
-                  <a:pt x="3221502" y="2822296"/>
-                  <a:pt x="3229696" y="2816541"/>
-                  <a:pt x="3247053" y="2799183"/>
-                </a:cubicBezTo>
-                <a:cubicBezTo>
-                  <a:pt x="3250163" y="2789853"/>
-                  <a:pt x="3251986" y="2779989"/>
-                  <a:pt x="3256384" y="2771192"/>
-                </a:cubicBezTo>
-                <a:cubicBezTo>
-                  <a:pt x="3261399" y="2761162"/>
-                  <a:pt x="3271108" y="2753700"/>
-                  <a:pt x="3275045" y="2743200"/>
-                </a:cubicBezTo>
-                <a:cubicBezTo>
-                  <a:pt x="3301578" y="2672444"/>
-                  <a:pt x="3264575" y="2716346"/>
-                  <a:pt x="3303037" y="2677886"/>
-                </a:cubicBezTo>
-                <a:cubicBezTo>
-                  <a:pt x="3309257" y="2665445"/>
-                  <a:pt x="3314542" y="2652490"/>
-                  <a:pt x="3321698" y="2640563"/>
-                </a:cubicBezTo>
-                <a:cubicBezTo>
-                  <a:pt x="3333237" y="2621331"/>
-                  <a:pt x="3351927" y="2605856"/>
-                  <a:pt x="3359020" y="2584579"/>
-                </a:cubicBezTo>
-                <a:cubicBezTo>
-                  <a:pt x="3362130" y="2575249"/>
-                  <a:pt x="3363291" y="2565022"/>
-                  <a:pt x="3368351" y="2556588"/>
-                </a:cubicBezTo>
-                <a:cubicBezTo>
-                  <a:pt x="3372877" y="2549045"/>
-                  <a:pt x="3381380" y="2544684"/>
-                  <a:pt x="3387012" y="2537926"/>
-                </a:cubicBezTo>
-                <a:cubicBezTo>
-                  <a:pt x="3396967" y="2525979"/>
-                  <a:pt x="3404884" y="2512411"/>
-                  <a:pt x="3415004" y="2500604"/>
-                </a:cubicBezTo>
-                <a:cubicBezTo>
-                  <a:pt x="3423592" y="2490585"/>
-                  <a:pt x="3434548" y="2482749"/>
-                  <a:pt x="3442996" y="2472612"/>
-                </a:cubicBezTo>
-                <a:cubicBezTo>
-                  <a:pt x="3450175" y="2463997"/>
-                  <a:pt x="3454207" y="2453001"/>
-                  <a:pt x="3461657" y="2444620"/>
-                </a:cubicBezTo>
-                <a:cubicBezTo>
-                  <a:pt x="3479190" y="2424895"/>
-                  <a:pt x="3503002" y="2410596"/>
-                  <a:pt x="3517641" y="2388637"/>
-                </a:cubicBezTo>
-                <a:cubicBezTo>
-                  <a:pt x="3531495" y="2367855"/>
-                  <a:pt x="3535971" y="2357177"/>
-                  <a:pt x="3554963" y="2341983"/>
-                </a:cubicBezTo>
-                <a:cubicBezTo>
-                  <a:pt x="3563720" y="2334978"/>
-                  <a:pt x="3574573" y="2330772"/>
-                  <a:pt x="3582955" y="2323322"/>
-                </a:cubicBezTo>
-                <a:cubicBezTo>
-                  <a:pt x="3583019" y="2323265"/>
-                  <a:pt x="3640992" y="2265285"/>
-                  <a:pt x="3657600" y="2248677"/>
-                </a:cubicBezTo>
-                <a:lnTo>
-                  <a:pt x="3685592" y="2220686"/>
-                </a:lnTo>
-                <a:cubicBezTo>
-                  <a:pt x="3691813" y="2214465"/>
-                  <a:pt x="3696933" y="2206904"/>
-                  <a:pt x="3704253" y="2202024"/>
-                </a:cubicBezTo>
-                <a:cubicBezTo>
-                  <a:pt x="3713584" y="2195804"/>
-                  <a:pt x="3723864" y="2190813"/>
-                  <a:pt x="3732245" y="2183363"/>
-                </a:cubicBezTo>
-                <a:cubicBezTo>
-                  <a:pt x="3751970" y="2165830"/>
-                  <a:pt x="3766269" y="2142018"/>
-                  <a:pt x="3788228" y="2127379"/>
-                </a:cubicBezTo>
-                <a:lnTo>
-                  <a:pt x="3844212" y="2090057"/>
-                </a:lnTo>
-                <a:cubicBezTo>
-                  <a:pt x="3853543" y="2083837"/>
-                  <a:pt x="3863233" y="2078124"/>
-                  <a:pt x="3872204" y="2071396"/>
-                </a:cubicBezTo>
-                <a:cubicBezTo>
-                  <a:pt x="3884645" y="2062065"/>
-                  <a:pt x="3896339" y="2051646"/>
-                  <a:pt x="3909526" y="2043404"/>
-                </a:cubicBezTo>
-                <a:cubicBezTo>
-                  <a:pt x="3921321" y="2036032"/>
-                  <a:pt x="3934408" y="2030963"/>
-                  <a:pt x="3946849" y="2024743"/>
-                </a:cubicBezTo>
-                <a:cubicBezTo>
-                  <a:pt x="3990306" y="1981284"/>
-                  <a:pt x="3934048" y="2031143"/>
-                  <a:pt x="4002833" y="1996751"/>
-                </a:cubicBezTo>
-                <a:cubicBezTo>
-                  <a:pt x="4016742" y="1989796"/>
-                  <a:pt x="4026968" y="1977001"/>
-                  <a:pt x="4040155" y="1968759"/>
-                </a:cubicBezTo>
-                <a:cubicBezTo>
-                  <a:pt x="4051950" y="1961387"/>
-                  <a:pt x="4066159" y="1958183"/>
-                  <a:pt x="4077477" y="1950098"/>
-                </a:cubicBezTo>
-                <a:cubicBezTo>
-                  <a:pt x="4088215" y="1942428"/>
-                  <a:pt x="4094012" y="1928653"/>
-                  <a:pt x="4105469" y="1922106"/>
-                </a:cubicBezTo>
-                <a:cubicBezTo>
-                  <a:pt x="4116603" y="1915744"/>
-                  <a:pt x="4130351" y="1915885"/>
-                  <a:pt x="4142792" y="1912775"/>
-                </a:cubicBezTo>
-                <a:cubicBezTo>
-                  <a:pt x="4161453" y="1900334"/>
-                  <a:pt x="4177498" y="1882545"/>
-                  <a:pt x="4198775" y="1875453"/>
-                </a:cubicBezTo>
-                <a:cubicBezTo>
-                  <a:pt x="4208106" y="1872343"/>
-                  <a:pt x="4217970" y="1870521"/>
-                  <a:pt x="4226767" y="1866122"/>
-                </a:cubicBezTo>
-                <a:cubicBezTo>
-                  <a:pt x="4294095" y="1832458"/>
-                  <a:pt x="4210293" y="1861515"/>
-                  <a:pt x="4292082" y="1828800"/>
-                </a:cubicBezTo>
-                <a:cubicBezTo>
-                  <a:pt x="4344890" y="1807677"/>
-                  <a:pt x="4348978" y="1809987"/>
-                  <a:pt x="4404049" y="1800808"/>
-                </a:cubicBezTo>
-                <a:cubicBezTo>
-                  <a:pt x="4416490" y="1794588"/>
-                  <a:pt x="4428348" y="1787031"/>
-                  <a:pt x="4441371" y="1782147"/>
-                </a:cubicBezTo>
-                <a:cubicBezTo>
-                  <a:pt x="4458623" y="1775678"/>
-                  <a:pt x="4509967" y="1767035"/>
-                  <a:pt x="4525347" y="1763486"/>
-                </a:cubicBezTo>
-                <a:cubicBezTo>
-                  <a:pt x="4562833" y="1754835"/>
-                  <a:pt x="4599992" y="1744824"/>
-                  <a:pt x="4637314" y="1735494"/>
-                </a:cubicBezTo>
-                <a:cubicBezTo>
-                  <a:pt x="4649755" y="1732384"/>
-                  <a:pt x="4663167" y="1731898"/>
-                  <a:pt x="4674637" y="1726163"/>
-                </a:cubicBezTo>
-                <a:cubicBezTo>
-                  <a:pt x="4687078" y="1719943"/>
-                  <a:pt x="4698406" y="1710630"/>
-                  <a:pt x="4711959" y="1707502"/>
-                </a:cubicBezTo>
-                <a:cubicBezTo>
-                  <a:pt x="4739402" y="1701169"/>
-                  <a:pt x="4768018" y="1701893"/>
-                  <a:pt x="4795935" y="1698171"/>
-                </a:cubicBezTo>
-                <a:cubicBezTo>
-                  <a:pt x="4814687" y="1695671"/>
-                  <a:pt x="4833420" y="1692805"/>
-                  <a:pt x="4851918" y="1688841"/>
-                </a:cubicBezTo>
-                <a:cubicBezTo>
-                  <a:pt x="4933427" y="1671375"/>
-                  <a:pt x="4930979" y="1664216"/>
-                  <a:pt x="5019869" y="1651518"/>
-                </a:cubicBezTo>
-                <a:cubicBezTo>
-                  <a:pt x="5063412" y="1645298"/>
-                  <a:pt x="5107111" y="1640088"/>
-                  <a:pt x="5150498" y="1632857"/>
-                </a:cubicBezTo>
-                <a:cubicBezTo>
-                  <a:pt x="5169159" y="1629747"/>
-                  <a:pt x="5188014" y="1627630"/>
-                  <a:pt x="5206482" y="1623526"/>
-                </a:cubicBezTo>
-                <a:cubicBezTo>
-                  <a:pt x="5216083" y="1621393"/>
-                  <a:pt x="5224829" y="1616125"/>
-                  <a:pt x="5234473" y="1614196"/>
-                </a:cubicBezTo>
-                <a:cubicBezTo>
-                  <a:pt x="5271576" y="1606775"/>
-                  <a:pt x="5309118" y="1601754"/>
-                  <a:pt x="5346441" y="1595534"/>
-                </a:cubicBezTo>
-                <a:cubicBezTo>
-                  <a:pt x="5365102" y="1592424"/>
-                  <a:pt x="5383873" y="1589914"/>
-                  <a:pt x="5402424" y="1586204"/>
-                </a:cubicBezTo>
-                <a:cubicBezTo>
-                  <a:pt x="5417975" y="1583094"/>
-                  <a:pt x="5433327" y="1578726"/>
-                  <a:pt x="5449077" y="1576873"/>
-                </a:cubicBezTo>
-                <a:cubicBezTo>
-                  <a:pt x="5486273" y="1572497"/>
-                  <a:pt x="5523722" y="1570653"/>
-                  <a:pt x="5561045" y="1567543"/>
-                </a:cubicBezTo>
-                <a:cubicBezTo>
-                  <a:pt x="5598367" y="1561322"/>
-                  <a:pt x="5637116" y="1560845"/>
-                  <a:pt x="5673012" y="1548881"/>
-                </a:cubicBezTo>
-                <a:cubicBezTo>
-                  <a:pt x="5682343" y="1545771"/>
-                  <a:pt x="5691327" y="1541310"/>
-                  <a:pt x="5701004" y="1539551"/>
-                </a:cubicBezTo>
-                <a:cubicBezTo>
-                  <a:pt x="5725675" y="1535065"/>
-                  <a:pt x="5750767" y="1533330"/>
-                  <a:pt x="5775649" y="1530220"/>
-                </a:cubicBezTo>
-                <a:cubicBezTo>
-                  <a:pt x="5809706" y="1518868"/>
-                  <a:pt x="5808476" y="1517993"/>
-                  <a:pt x="5850294" y="1511559"/>
-                </a:cubicBezTo>
-                <a:cubicBezTo>
-                  <a:pt x="5875078" y="1507746"/>
-                  <a:pt x="5900205" y="1506350"/>
-                  <a:pt x="5924939" y="1502228"/>
-                </a:cubicBezTo>
-                <a:cubicBezTo>
-                  <a:pt x="5937588" y="1500120"/>
-                  <a:pt x="5949550" y="1494593"/>
-                  <a:pt x="5962261" y="1492898"/>
-                </a:cubicBezTo>
-                <a:cubicBezTo>
-                  <a:pt x="5996313" y="1488358"/>
-                  <a:pt x="6030780" y="1487581"/>
-                  <a:pt x="6064898" y="1483567"/>
-                </a:cubicBezTo>
-                <a:cubicBezTo>
-                  <a:pt x="6083687" y="1481357"/>
-                  <a:pt x="6102014" y="1475618"/>
-                  <a:pt x="6120882" y="1474237"/>
-                </a:cubicBezTo>
-                <a:cubicBezTo>
-                  <a:pt x="6229626" y="1466280"/>
-                  <a:pt x="6338599" y="1461855"/>
-                  <a:pt x="6447453" y="1455575"/>
-                </a:cubicBezTo>
-                <a:cubicBezTo>
-                  <a:pt x="6500330" y="1452524"/>
-                  <a:pt x="6553371" y="1451515"/>
-                  <a:pt x="6606073" y="1446245"/>
-                </a:cubicBezTo>
-                <a:lnTo>
-                  <a:pt x="6699379" y="1436914"/>
-                </a:lnTo>
-                <a:cubicBezTo>
-                  <a:pt x="6727389" y="1433966"/>
-                  <a:pt x="6755297" y="1430023"/>
-                  <a:pt x="6783355" y="1427583"/>
-                </a:cubicBezTo>
-                <a:cubicBezTo>
-                  <a:pt x="6877627" y="1419386"/>
-                  <a:pt x="6988930" y="1414089"/>
-                  <a:pt x="7081935" y="1408922"/>
-                </a:cubicBezTo>
-                <a:lnTo>
-                  <a:pt x="7492482" y="1418253"/>
-                </a:lnTo>
-                <a:cubicBezTo>
-                  <a:pt x="7520626" y="1419315"/>
-                  <a:pt x="7548348" y="1425826"/>
-                  <a:pt x="7576457" y="1427583"/>
-                </a:cubicBezTo>
-                <a:cubicBezTo>
-                  <a:pt x="7647920" y="1432049"/>
-                  <a:pt x="7719526" y="1433804"/>
-                  <a:pt x="7791061" y="1436914"/>
-                </a:cubicBezTo>
-                <a:lnTo>
-                  <a:pt x="7893698" y="1446245"/>
-                </a:lnTo>
-                <a:cubicBezTo>
-                  <a:pt x="7921722" y="1449047"/>
-                  <a:pt x="7949571" y="1453702"/>
-                  <a:pt x="7977673" y="1455575"/>
-                </a:cubicBezTo>
-                <a:cubicBezTo>
-                  <a:pt x="8042917" y="1459925"/>
-                  <a:pt x="8108309" y="1461641"/>
-                  <a:pt x="8173616" y="1464906"/>
-                </a:cubicBezTo>
-                <a:cubicBezTo>
-                  <a:pt x="8532419" y="1482847"/>
-                  <a:pt x="8216261" y="1471489"/>
-                  <a:pt x="8808098" y="1483567"/>
-                </a:cubicBezTo>
-                <a:cubicBezTo>
-                  <a:pt x="8842310" y="1486677"/>
-                  <a:pt x="8876683" y="1488358"/>
-                  <a:pt x="8910735" y="1492898"/>
-                </a:cubicBezTo>
-                <a:cubicBezTo>
-                  <a:pt x="8923446" y="1494593"/>
-                  <a:pt x="8935518" y="1499541"/>
-                  <a:pt x="8948057" y="1502228"/>
-                </a:cubicBezTo>
-                <a:cubicBezTo>
-                  <a:pt x="9114099" y="1537809"/>
-                  <a:pt x="8977757" y="1507798"/>
-                  <a:pt x="9097347" y="1530220"/>
-                </a:cubicBezTo>
-                <a:cubicBezTo>
-                  <a:pt x="9128522" y="1536065"/>
-                  <a:pt x="9160563" y="1538851"/>
-                  <a:pt x="9190653" y="1548881"/>
-                </a:cubicBezTo>
-                <a:cubicBezTo>
-                  <a:pt x="9199984" y="1551991"/>
-                  <a:pt x="9208924" y="1556716"/>
-                  <a:pt x="9218645" y="1558212"/>
-                </a:cubicBezTo>
-                <a:cubicBezTo>
-                  <a:pt x="9249539" y="1562965"/>
-                  <a:pt x="9280935" y="1563666"/>
-                  <a:pt x="9311951" y="1567543"/>
-                </a:cubicBezTo>
-                <a:cubicBezTo>
-                  <a:pt x="9330724" y="1569890"/>
-                  <a:pt x="9349274" y="1573763"/>
-                  <a:pt x="9367935" y="1576873"/>
-                </a:cubicBezTo>
-                <a:cubicBezTo>
-                  <a:pt x="9377265" y="1579983"/>
-                  <a:pt x="9386325" y="1584070"/>
-                  <a:pt x="9395926" y="1586204"/>
-                </a:cubicBezTo>
-                <a:cubicBezTo>
-                  <a:pt x="9537782" y="1617727"/>
-                  <a:pt x="9341844" y="1563357"/>
-                  <a:pt x="9545216" y="1614196"/>
-                </a:cubicBezTo>
-                <a:cubicBezTo>
-                  <a:pt x="9636284" y="1636961"/>
-                  <a:pt x="9522525" y="1609152"/>
-                  <a:pt x="9629192" y="1632857"/>
-                </a:cubicBezTo>
-                <a:cubicBezTo>
-                  <a:pt x="9641710" y="1635639"/>
-                  <a:pt x="9653939" y="1639673"/>
-                  <a:pt x="9666514" y="1642188"/>
-                </a:cubicBezTo>
-                <a:cubicBezTo>
-                  <a:pt x="9780902" y="1665065"/>
-                  <a:pt x="9673131" y="1639175"/>
-                  <a:pt x="9759820" y="1660849"/>
-                </a:cubicBezTo>
-                <a:cubicBezTo>
-                  <a:pt x="9830097" y="1707700"/>
-                  <a:pt x="9740779" y="1652688"/>
-                  <a:pt x="9825135" y="1688841"/>
-                </a:cubicBezTo>
-                <a:cubicBezTo>
-                  <a:pt x="9835442" y="1693258"/>
-                  <a:pt x="9843390" y="1701938"/>
-                  <a:pt x="9853126" y="1707502"/>
-                </a:cubicBezTo>
-                <a:cubicBezTo>
-                  <a:pt x="9865203" y="1714403"/>
-                  <a:pt x="9878008" y="1719943"/>
-                  <a:pt x="9890449" y="1726163"/>
-                </a:cubicBezTo>
-                <a:cubicBezTo>
-                  <a:pt x="9899780" y="1735494"/>
-                  <a:pt x="9907462" y="1746835"/>
-                  <a:pt x="9918441" y="1754155"/>
-                </a:cubicBezTo>
-                <a:cubicBezTo>
-                  <a:pt x="9926625" y="1759611"/>
-                  <a:pt x="9938135" y="1758206"/>
-                  <a:pt x="9946433" y="1763486"/>
-                </a:cubicBezTo>
-                <a:cubicBezTo>
-                  <a:pt x="9972672" y="1780184"/>
-                  <a:pt x="9996196" y="1800808"/>
-                  <a:pt x="10021077" y="1819469"/>
-                </a:cubicBezTo>
-                <a:lnTo>
-                  <a:pt x="10021077" y="1819469"/>
-                </a:lnTo>
-                <a:cubicBezTo>
-                  <a:pt x="10042849" y="1841240"/>
-                  <a:pt x="10058853" y="1871013"/>
-                  <a:pt x="10086392" y="1884783"/>
-                </a:cubicBezTo>
-                <a:cubicBezTo>
-                  <a:pt x="10115954" y="1899565"/>
-                  <a:pt x="10136814" y="1907214"/>
-                  <a:pt x="10161037" y="1931437"/>
-                </a:cubicBezTo>
-                <a:cubicBezTo>
-                  <a:pt x="10172033" y="1942433"/>
-                  <a:pt x="10179989" y="1956105"/>
-                  <a:pt x="10189028" y="1968759"/>
-                </a:cubicBezTo>
-                <a:cubicBezTo>
-                  <a:pt x="10195546" y="1977884"/>
-                  <a:pt x="10199760" y="1988821"/>
-                  <a:pt x="10207690" y="1996751"/>
-                </a:cubicBezTo>
-                <a:cubicBezTo>
-                  <a:pt x="10215620" y="2004680"/>
-                  <a:pt x="10227168" y="2008114"/>
-                  <a:pt x="10235682" y="2015412"/>
-                </a:cubicBezTo>
-                <a:cubicBezTo>
-                  <a:pt x="10364949" y="2126211"/>
-                  <a:pt x="10166253" y="1964645"/>
-                  <a:pt x="10310326" y="2108718"/>
-                </a:cubicBezTo>
-                <a:cubicBezTo>
-                  <a:pt x="10322767" y="2121159"/>
-                  <a:pt x="10337092" y="2131966"/>
-                  <a:pt x="10347649" y="2146041"/>
-                </a:cubicBezTo>
-                <a:lnTo>
-                  <a:pt x="10403633" y="2220686"/>
-                </a:lnTo>
-                <a:cubicBezTo>
-                  <a:pt x="10412963" y="2233127"/>
-                  <a:pt x="10420628" y="2247012"/>
-                  <a:pt x="10431624" y="2258008"/>
-                </a:cubicBezTo>
-                <a:cubicBezTo>
-                  <a:pt x="10437845" y="2264228"/>
-                  <a:pt x="10445173" y="2269511"/>
-                  <a:pt x="10450286" y="2276669"/>
-                </a:cubicBezTo>
-                <a:cubicBezTo>
-                  <a:pt x="10504483" y="2352544"/>
-                  <a:pt x="10454937" y="2299983"/>
-                  <a:pt x="10496939" y="2341983"/>
-                </a:cubicBezTo>
-                <a:cubicBezTo>
-                  <a:pt x="10519122" y="2408538"/>
-                  <a:pt x="10487668" y="2328078"/>
-                  <a:pt x="10534261" y="2397967"/>
-                </a:cubicBezTo>
-                <a:cubicBezTo>
-                  <a:pt x="10539717" y="2406151"/>
-                  <a:pt x="10537875" y="2417956"/>
-                  <a:pt x="10543592" y="2425959"/>
-                </a:cubicBezTo>
-                <a:cubicBezTo>
-                  <a:pt x="10553818" y="2440276"/>
-                  <a:pt x="10568473" y="2450840"/>
-                  <a:pt x="10580914" y="2463281"/>
-                </a:cubicBezTo>
-                <a:cubicBezTo>
-                  <a:pt x="10610953" y="2553394"/>
-                  <a:pt x="10562782" y="2413285"/>
-                  <a:pt x="10608906" y="2528596"/>
-                </a:cubicBezTo>
-                <a:cubicBezTo>
-                  <a:pt x="10637496" y="2600072"/>
-                  <a:pt x="10610462" y="2567473"/>
-                  <a:pt x="10646228" y="2603241"/>
-                </a:cubicBezTo>
-                <a:cubicBezTo>
-                  <a:pt x="10667887" y="2668213"/>
-                  <a:pt x="10640066" y="2598664"/>
-                  <a:pt x="10674220" y="2649894"/>
-                </a:cubicBezTo>
-                <a:cubicBezTo>
-                  <a:pt x="10701329" y="2690557"/>
-                  <a:pt x="10685621" y="2677879"/>
-                  <a:pt x="10702212" y="2715208"/>
-                </a:cubicBezTo>
-                <a:cubicBezTo>
-                  <a:pt x="10710686" y="2734274"/>
-                  <a:pt x="10721570" y="2752198"/>
-                  <a:pt x="10730204" y="2771192"/>
-                </a:cubicBezTo>
-                <a:cubicBezTo>
-                  <a:pt x="10734958" y="2781651"/>
-                  <a:pt x="10753880" y="2828572"/>
-                  <a:pt x="10758196" y="2845837"/>
-                </a:cubicBezTo>
-                <a:cubicBezTo>
-                  <a:pt x="10762042" y="2861222"/>
-                  <a:pt x="10761957" y="2877641"/>
-                  <a:pt x="10767526" y="2892490"/>
-                </a:cubicBezTo>
-                <a:cubicBezTo>
-                  <a:pt x="10771464" y="2902990"/>
-                  <a:pt x="10779967" y="2911151"/>
-                  <a:pt x="10786188" y="2920481"/>
-                </a:cubicBezTo>
-                <a:cubicBezTo>
-                  <a:pt x="10789298" y="2929812"/>
-                  <a:pt x="10792816" y="2939016"/>
-                  <a:pt x="10795518" y="2948473"/>
-                </a:cubicBezTo>
-                <a:cubicBezTo>
-                  <a:pt x="10799041" y="2960804"/>
-                  <a:pt x="10800794" y="2973630"/>
-                  <a:pt x="10804849" y="2985796"/>
-                </a:cubicBezTo>
-                <a:cubicBezTo>
-                  <a:pt x="10813406" y="3011467"/>
-                  <a:pt x="10826292" y="3034243"/>
-                  <a:pt x="10832841" y="3060441"/>
-                </a:cubicBezTo>
-                <a:cubicBezTo>
-                  <a:pt x="10836687" y="3075826"/>
-                  <a:pt x="10838325" y="3091709"/>
-                  <a:pt x="10842171" y="3107094"/>
-                </a:cubicBezTo>
-                <a:cubicBezTo>
-                  <a:pt x="10844556" y="3116636"/>
-                  <a:pt x="10849116" y="3125544"/>
-                  <a:pt x="10851502" y="3135086"/>
-                </a:cubicBezTo>
-                <a:cubicBezTo>
-                  <a:pt x="10855349" y="3150471"/>
-                  <a:pt x="10857996" y="3166136"/>
-                  <a:pt x="10860833" y="3181739"/>
-                </a:cubicBezTo>
-                <a:cubicBezTo>
-                  <a:pt x="10864217" y="3200352"/>
-                  <a:pt x="10864727" y="3219601"/>
-                  <a:pt x="10870163" y="3237722"/>
-                </a:cubicBezTo>
-                <a:cubicBezTo>
-                  <a:pt x="10874160" y="3251045"/>
-                  <a:pt x="10883940" y="3262021"/>
-                  <a:pt x="10888824" y="3275045"/>
-                </a:cubicBezTo>
-                <a:cubicBezTo>
-                  <a:pt x="10893327" y="3287052"/>
-                  <a:pt x="10894632" y="3300037"/>
-                  <a:pt x="10898155" y="3312367"/>
-                </a:cubicBezTo>
-                <a:cubicBezTo>
-                  <a:pt x="10900857" y="3321824"/>
-                  <a:pt x="10904784" y="3330902"/>
-                  <a:pt x="10907486" y="3340359"/>
-                </a:cubicBezTo>
-                <a:cubicBezTo>
-                  <a:pt x="10926633" y="3407373"/>
-                  <a:pt x="10906917" y="3347413"/>
-                  <a:pt x="10926147" y="3424334"/>
-                </a:cubicBezTo>
-                <a:cubicBezTo>
-                  <a:pt x="10928532" y="3433876"/>
-                  <a:pt x="10932367" y="3442995"/>
-                  <a:pt x="10935477" y="3452326"/>
-                </a:cubicBezTo>
-                <a:cubicBezTo>
-                  <a:pt x="10938587" y="3480318"/>
-                  <a:pt x="10942138" y="3508265"/>
-                  <a:pt x="10944808" y="3536302"/>
-                </a:cubicBezTo>
-                <a:cubicBezTo>
-                  <a:pt x="10948359" y="3573585"/>
-                  <a:pt x="10950412" y="3611003"/>
-                  <a:pt x="10954139" y="3648269"/>
-                </a:cubicBezTo>
-                <a:cubicBezTo>
-                  <a:pt x="10956634" y="3673220"/>
-                  <a:pt x="10960359" y="3698032"/>
-                  <a:pt x="10963469" y="3722914"/>
-                </a:cubicBezTo>
-                <a:cubicBezTo>
-                  <a:pt x="10960359" y="3862873"/>
-                  <a:pt x="10958963" y="4002881"/>
-                  <a:pt x="10954139" y="4142792"/>
-                </a:cubicBezTo>
-                <a:cubicBezTo>
-                  <a:pt x="10952741" y="4183320"/>
-                  <a:pt x="10946833" y="4223588"/>
-                  <a:pt x="10944808" y="4264090"/>
-                </a:cubicBezTo>
-                <a:cubicBezTo>
-                  <a:pt x="10940611" y="4348018"/>
-                  <a:pt x="10938587" y="4432041"/>
-                  <a:pt x="10935477" y="4516016"/>
-                </a:cubicBezTo>
-                <a:cubicBezTo>
-                  <a:pt x="10938587" y="4680857"/>
-                  <a:pt x="10938305" y="4845797"/>
-                  <a:pt x="10944808" y="5010539"/>
-                </a:cubicBezTo>
-                <a:cubicBezTo>
-                  <a:pt x="10947640" y="5082288"/>
-                  <a:pt x="10953314" y="5154060"/>
-                  <a:pt x="10963469" y="5225143"/>
-                </a:cubicBezTo>
-                <a:cubicBezTo>
-                  <a:pt x="10974140" y="5299840"/>
-                  <a:pt x="10974322" y="5333107"/>
-                  <a:pt x="10991461" y="5393094"/>
-                </a:cubicBezTo>
-                <a:cubicBezTo>
-                  <a:pt x="10994163" y="5402551"/>
-                  <a:pt x="10997682" y="5411755"/>
-                  <a:pt x="11000792" y="5421086"/>
-                </a:cubicBezTo>
-                <a:cubicBezTo>
-                  <a:pt x="11003902" y="5455298"/>
-                  <a:pt x="11004152" y="5489892"/>
-                  <a:pt x="11010122" y="5523722"/>
-                </a:cubicBezTo>
-                <a:cubicBezTo>
-                  <a:pt x="11013541" y="5543094"/>
-                  <a:pt x="11024013" y="5560622"/>
-                  <a:pt x="11028784" y="5579706"/>
-                </a:cubicBezTo>
-                <a:cubicBezTo>
-                  <a:pt x="11045984" y="5648512"/>
-                  <a:pt x="11027501" y="5586045"/>
-                  <a:pt x="11056775" y="5654351"/>
-                </a:cubicBezTo>
-                <a:cubicBezTo>
-                  <a:pt x="11060649" y="5663391"/>
-                  <a:pt x="11061707" y="5673546"/>
-                  <a:pt x="11066106" y="5682343"/>
-                </a:cubicBezTo>
-                <a:cubicBezTo>
-                  <a:pt x="11071121" y="5692373"/>
-                  <a:pt x="11079752" y="5700304"/>
-                  <a:pt x="11084767" y="5710334"/>
-                </a:cubicBezTo>
-                <a:cubicBezTo>
-                  <a:pt x="11089166" y="5719131"/>
-                  <a:pt x="11089038" y="5729892"/>
-                  <a:pt x="11094098" y="5738326"/>
-                </a:cubicBezTo>
-                <a:cubicBezTo>
-                  <a:pt x="11104958" y="5756426"/>
-                  <a:pt x="11125491" y="5762933"/>
-                  <a:pt x="11140751" y="5775649"/>
-                </a:cubicBezTo>
-                <a:cubicBezTo>
-                  <a:pt x="11158075" y="5790086"/>
-                  <a:pt x="11173568" y="5814580"/>
-                  <a:pt x="11196735" y="5822302"/>
-                </a:cubicBezTo>
-                <a:cubicBezTo>
-                  <a:pt x="11214683" y="5828284"/>
-                  <a:pt x="11234105" y="5828248"/>
-                  <a:pt x="11252718" y="5831632"/>
-                </a:cubicBezTo>
-                <a:cubicBezTo>
-                  <a:pt x="11351008" y="5849503"/>
-                  <a:pt x="11258967" y="5840963"/>
-                  <a:pt x="11430000" y="5840963"/>
-                </a:cubicBezTo>
-              </a:path>
-            </a:pathLst>
-          </a:custGeom>
-          <a:noFill/>
-          <a:ln w="57150">
-            <a:prstDash val="dash"/>
-          </a:ln>
-        </p:spPr>
-        <p:style>
-          <a:lnRef idx="2">
-            <a:schemeClr val="accent1">
-              <a:shade val="50000"/>
-            </a:schemeClr>
-          </a:lnRef>
-          <a:fillRef idx="1">
-            <a:schemeClr val="accent1"/>
-          </a:fillRef>
-          <a:effectRef idx="0">
-            <a:schemeClr val="accent1"/>
-          </a:effectRef>
-          <a:fontRef idx="minor">
-            <a:schemeClr val="lt1"/>
-          </a:fontRef>
-        </p:style>
-        <p:txBody>
-          <a:bodyPr rtlCol="0" anchor="ctr"/>
-          <a:lstStyle/>
-          <a:p>
-            <a:pPr algn="ctr"/>
-            <a:endParaRPr lang="en-US"/>
-          </a:p>
-        </p:txBody>
-      </p:sp>
-      <p:sp>
-        <p:nvSpPr>
-          <p:cNvPr id="9" name="Title 8">
-            <a:extLst>
-              <a:ext uri="{FF2B5EF4-FFF2-40B4-BE49-F238E27FC236}">
-                <a16:creationId xmlns:a16="http://schemas.microsoft.com/office/drawing/2014/main" id="{BEA5CA52-694B-4544-8893-152D4DAAFF5A}"/>
-              </a:ext>
-            </a:extLst>
-          </p:cNvPr>
-          <p:cNvSpPr>
-            <a:spLocks noGrp="1"/>
-          </p:cNvSpPr>
-          <p:nvPr>
-            <p:ph type="title"/>
-          </p:nvPr>
-        </p:nvSpPr>
-        <p:spPr>
-          <a:xfrm>
-            <a:off x="746450" y="606490"/>
-            <a:ext cx="10396882" cy="1151965"/>
-          </a:xfrm>
-        </p:spPr>
-        <p:txBody>
-          <a:bodyPr/>
-          <a:lstStyle/>
-          <a:p>
-            <a:r>
-              <a:rPr lang="en-US" dirty="0"/>
-              <a:t>The Journey</a:t>
-            </a:r>
-          </a:p>
-        </p:txBody>
-      </p:sp>
-      <p:sp>
-        <p:nvSpPr>
-          <p:cNvPr id="14" name="Rectangle: Rounded Corners 13">
-            <a:extLst>
-              <a:ext uri="{FF2B5EF4-FFF2-40B4-BE49-F238E27FC236}">
-                <a16:creationId xmlns:a16="http://schemas.microsoft.com/office/drawing/2014/main" id="{73A3DBCD-3CC3-467F-9AA7-8F5D627C4703}"/>
-              </a:ext>
-            </a:extLst>
-          </p:cNvPr>
-          <p:cNvSpPr/>
-          <p:nvPr/>
-        </p:nvSpPr>
-        <p:spPr>
-          <a:xfrm>
-            <a:off x="303246" y="2716305"/>
-            <a:ext cx="1356852" cy="1151965"/>
-          </a:xfrm>
-          <a:prstGeom prst="roundRect">
-            <a:avLst/>
-          </a:prstGeom>
-        </p:spPr>
-        <p:style>
-          <a:lnRef idx="2">
-            <a:schemeClr val="accent1">
-              <a:shade val="50000"/>
-            </a:schemeClr>
-          </a:lnRef>
-          <a:fillRef idx="1">
-            <a:schemeClr val="accent1"/>
-          </a:fillRef>
-          <a:effectRef idx="0">
-            <a:schemeClr val="accent1"/>
-          </a:effectRef>
-          <a:fontRef idx="minor">
-            <a:schemeClr val="lt1"/>
-          </a:fontRef>
-        </p:style>
-        <p:txBody>
-          <a:bodyPr rtlCol="0" anchor="ctr"/>
-          <a:lstStyle/>
-          <a:p>
-            <a:pPr algn="ctr"/>
-            <a:r>
-              <a:rPr lang="en-US" sz="2400" dirty="0"/>
-              <a:t>Pick a Dataset</a:t>
-            </a:r>
-          </a:p>
-        </p:txBody>
-      </p:sp>
-      <p:sp>
-        <p:nvSpPr>
-          <p:cNvPr id="15" name="Rectangle: Rounded Corners 14">
-            <a:extLst>
-              <a:ext uri="{FF2B5EF4-FFF2-40B4-BE49-F238E27FC236}">
-                <a16:creationId xmlns:a16="http://schemas.microsoft.com/office/drawing/2014/main" id="{7779BC99-C2CF-44E6-A056-02D04B259773}"/>
-              </a:ext>
-            </a:extLst>
-          </p:cNvPr>
-          <p:cNvSpPr/>
-          <p:nvPr/>
-        </p:nvSpPr>
-        <p:spPr>
-          <a:xfrm>
-            <a:off x="1888699" y="2942414"/>
-            <a:ext cx="3457545" cy="3003677"/>
-          </a:xfrm>
-          <a:prstGeom prst="roundRect">
-            <a:avLst/>
-          </a:prstGeom>
-        </p:spPr>
-        <p:style>
-          <a:lnRef idx="2">
-            <a:schemeClr val="accent1">
-              <a:shade val="50000"/>
-            </a:schemeClr>
-          </a:lnRef>
-          <a:fillRef idx="1">
-            <a:schemeClr val="accent1"/>
-          </a:fillRef>
-          <a:effectRef idx="0">
-            <a:schemeClr val="accent1"/>
-          </a:effectRef>
-          <a:fontRef idx="minor">
-            <a:schemeClr val="lt1"/>
-          </a:fontRef>
-        </p:style>
-        <p:txBody>
-          <a:bodyPr rtlCol="0" anchor="ctr"/>
-          <a:lstStyle/>
-          <a:p>
-            <a:pPr algn="ctr"/>
-            <a:r>
-              <a:rPr lang="en-US" sz="2400" dirty="0"/>
-              <a:t>Exploratory Data Analysis (EDA)</a:t>
-            </a:r>
-          </a:p>
-        </p:txBody>
-      </p:sp>
-      <p:sp>
-        <p:nvSpPr>
-          <p:cNvPr id="16" name="Rectangle: Rounded Corners 15">
-            <a:extLst>
-              <a:ext uri="{FF2B5EF4-FFF2-40B4-BE49-F238E27FC236}">
-                <a16:creationId xmlns:a16="http://schemas.microsoft.com/office/drawing/2014/main" id="{FC514B5F-82EA-471D-8419-E907A5EA489E}"/>
-              </a:ext>
-            </a:extLst>
-          </p:cNvPr>
-          <p:cNvSpPr/>
-          <p:nvPr/>
-        </p:nvSpPr>
-        <p:spPr>
-          <a:xfrm>
-            <a:off x="5651991" y="220114"/>
-            <a:ext cx="4651310" cy="4173248"/>
-          </a:xfrm>
-          <a:prstGeom prst="roundRect">
-            <a:avLst/>
-          </a:prstGeom>
-        </p:spPr>
-        <p:style>
-          <a:lnRef idx="2">
-            <a:schemeClr val="accent1">
-              <a:shade val="50000"/>
-            </a:schemeClr>
-          </a:lnRef>
-          <a:fillRef idx="1">
-            <a:schemeClr val="accent1"/>
-          </a:fillRef>
-          <a:effectRef idx="0">
-            <a:schemeClr val="accent1"/>
-          </a:effectRef>
-          <a:fontRef idx="minor">
-            <a:schemeClr val="lt1"/>
-          </a:fontRef>
-        </p:style>
-        <p:txBody>
-          <a:bodyPr rtlCol="0" anchor="ctr"/>
-          <a:lstStyle/>
-          <a:p>
-            <a:pPr algn="ctr"/>
-            <a:r>
-              <a:rPr lang="en-US" sz="2800" dirty="0"/>
-              <a:t>Models Used:</a:t>
-            </a:r>
-          </a:p>
-          <a:p>
-            <a:pPr algn="ctr"/>
-            <a:r>
-              <a:rPr lang="en-US" sz="2800" dirty="0"/>
-              <a:t>ARIMA </a:t>
-            </a:r>
-          </a:p>
-          <a:p>
-            <a:pPr algn="ctr"/>
-            <a:r>
-              <a:rPr lang="en-US" sz="2800" dirty="0"/>
-              <a:t>Profit</a:t>
-            </a:r>
-          </a:p>
-          <a:p>
-            <a:pPr algn="ctr"/>
-            <a:r>
-              <a:rPr lang="en-US" sz="2800" dirty="0"/>
-              <a:t>Regression Analysis</a:t>
-            </a:r>
-          </a:p>
-          <a:p>
-            <a:pPr algn="ctr"/>
-            <a:r>
-              <a:rPr lang="en-US" sz="2800" dirty="0"/>
-              <a:t>Ridge</a:t>
-            </a:r>
-          </a:p>
-          <a:p>
-            <a:pPr algn="ctr"/>
-            <a:r>
-              <a:rPr lang="en-US" sz="2800" dirty="0"/>
-              <a:t>LASSO</a:t>
-            </a:r>
-          </a:p>
-          <a:p>
-            <a:pPr algn="ctr"/>
-            <a:r>
-              <a:rPr lang="en-US" sz="2800" dirty="0"/>
-              <a:t>Forecast (R) </a:t>
-            </a:r>
-          </a:p>
-        </p:txBody>
-      </p:sp>
-      <p:sp>
-        <p:nvSpPr>
-          <p:cNvPr id="18" name="Rectangle: Rounded Corners 17">
-            <a:extLst>
-              <a:ext uri="{FF2B5EF4-FFF2-40B4-BE49-F238E27FC236}">
-                <a16:creationId xmlns:a16="http://schemas.microsoft.com/office/drawing/2014/main" id="{A7FC14AF-0941-4ABA-9B18-BDCC3B6FF3EA}"/>
-              </a:ext>
-            </a:extLst>
-          </p:cNvPr>
-          <p:cNvSpPr/>
-          <p:nvPr/>
-        </p:nvSpPr>
-        <p:spPr>
-          <a:xfrm>
-            <a:off x="10196000" y="4794126"/>
-            <a:ext cx="1356852" cy="1151965"/>
-          </a:xfrm>
-          <a:prstGeom prst="roundRect">
-            <a:avLst/>
-          </a:prstGeom>
-        </p:spPr>
-        <p:style>
-          <a:lnRef idx="2">
-            <a:schemeClr val="accent1">
-              <a:shade val="50000"/>
-            </a:schemeClr>
-          </a:lnRef>
-          <a:fillRef idx="1">
-            <a:schemeClr val="accent1"/>
-          </a:fillRef>
-          <a:effectRef idx="0">
-            <a:schemeClr val="accent1"/>
-          </a:effectRef>
-          <a:fontRef idx="minor">
-            <a:schemeClr val="lt1"/>
-          </a:fontRef>
-        </p:style>
-        <p:txBody>
-          <a:bodyPr rtlCol="0" anchor="ctr"/>
-          <a:lstStyle/>
-          <a:p>
-            <a:pPr algn="ctr"/>
-            <a:r>
-              <a:rPr lang="en-US" sz="1600" dirty="0"/>
-              <a:t>Summarize</a:t>
-            </a:r>
-            <a:endParaRPr lang="en-US" sz="1200" dirty="0"/>
-          </a:p>
-        </p:txBody>
-      </p:sp>
-      <p:sp>
-        <p:nvSpPr>
-          <p:cNvPr id="22" name="Freeform: Shape 21">
-            <a:extLst>
-              <a:ext uri="{FF2B5EF4-FFF2-40B4-BE49-F238E27FC236}">
-                <a16:creationId xmlns:a16="http://schemas.microsoft.com/office/drawing/2014/main" id="{3ED4A622-8F7F-460A-AA65-B454D69D1825}"/>
-              </a:ext>
-            </a:extLst>
-          </p:cNvPr>
-          <p:cNvSpPr/>
-          <p:nvPr/>
-        </p:nvSpPr>
-        <p:spPr>
-          <a:xfrm rot="20839679">
-            <a:off x="449710" y="781896"/>
-            <a:ext cx="108856" cy="331302"/>
-          </a:xfrm>
-          <a:custGeom>
-            <a:avLst/>
-            <a:gdLst>
-              <a:gd name="connsiteX0" fmla="*/ 0 w 121298"/>
-              <a:gd name="connsiteY0" fmla="*/ 0 h 587828"/>
-              <a:gd name="connsiteX1" fmla="*/ 9331 w 121298"/>
-              <a:gd name="connsiteY1" fmla="*/ 65314 h 587828"/>
-              <a:gd name="connsiteX2" fmla="*/ 18661 w 121298"/>
-              <a:gd name="connsiteY2" fmla="*/ 111967 h 587828"/>
-              <a:gd name="connsiteX3" fmla="*/ 27992 w 121298"/>
-              <a:gd name="connsiteY3" fmla="*/ 242595 h 587828"/>
-              <a:gd name="connsiteX4" fmla="*/ 37323 w 121298"/>
-              <a:gd name="connsiteY4" fmla="*/ 270587 h 587828"/>
-              <a:gd name="connsiteX5" fmla="*/ 46653 w 121298"/>
-              <a:gd name="connsiteY5" fmla="*/ 317240 h 587828"/>
-              <a:gd name="connsiteX6" fmla="*/ 65314 w 121298"/>
-              <a:gd name="connsiteY6" fmla="*/ 373224 h 587828"/>
-              <a:gd name="connsiteX7" fmla="*/ 93306 w 121298"/>
-              <a:gd name="connsiteY7" fmla="*/ 457200 h 587828"/>
-              <a:gd name="connsiteX8" fmla="*/ 102637 w 121298"/>
-              <a:gd name="connsiteY8" fmla="*/ 485191 h 587828"/>
-              <a:gd name="connsiteX9" fmla="*/ 111967 w 121298"/>
-              <a:gd name="connsiteY9" fmla="*/ 513183 h 587828"/>
-              <a:gd name="connsiteX10" fmla="*/ 121298 w 121298"/>
-              <a:gd name="connsiteY10" fmla="*/ 587828 h 587828"/>
-            </a:gdLst>
-            <a:ahLst/>
-            <a:cxnLst>
-              <a:cxn ang="0">
-                <a:pos x="connsiteX0" y="connsiteY0"/>
-              </a:cxn>
-              <a:cxn ang="0">
-                <a:pos x="connsiteX1" y="connsiteY1"/>
-              </a:cxn>
-              <a:cxn ang="0">
-                <a:pos x="connsiteX2" y="connsiteY2"/>
-              </a:cxn>
-              <a:cxn ang="0">
-                <a:pos x="connsiteX3" y="connsiteY3"/>
-              </a:cxn>
-              <a:cxn ang="0">
-                <a:pos x="connsiteX4" y="connsiteY4"/>
-              </a:cxn>
-              <a:cxn ang="0">
-                <a:pos x="connsiteX5" y="connsiteY5"/>
-              </a:cxn>
-              <a:cxn ang="0">
-                <a:pos x="connsiteX6" y="connsiteY6"/>
-              </a:cxn>
-              <a:cxn ang="0">
-                <a:pos x="connsiteX7" y="connsiteY7"/>
-              </a:cxn>
-              <a:cxn ang="0">
-                <a:pos x="connsiteX8" y="connsiteY8"/>
-              </a:cxn>
-              <a:cxn ang="0">
-                <a:pos x="connsiteX9" y="connsiteY9"/>
-              </a:cxn>
-              <a:cxn ang="0">
-                <a:pos x="connsiteX10" y="connsiteY10"/>
-              </a:cxn>
-            </a:cxnLst>
-            <a:rect l="l" t="t" r="r" b="b"/>
-            <a:pathLst>
-              <a:path w="121298" h="587828">
-                <a:moveTo>
-                  <a:pt x="0" y="0"/>
-                </a:moveTo>
-                <a:cubicBezTo>
-                  <a:pt x="3110" y="21771"/>
-                  <a:pt x="5716" y="43621"/>
-                  <a:pt x="9331" y="65314"/>
-                </a:cubicBezTo>
-                <a:cubicBezTo>
-                  <a:pt x="11938" y="80957"/>
-                  <a:pt x="17001" y="96195"/>
-                  <a:pt x="18661" y="111967"/>
-                </a:cubicBezTo>
-                <a:cubicBezTo>
-                  <a:pt x="23231" y="155381"/>
-                  <a:pt x="22891" y="199240"/>
-                  <a:pt x="27992" y="242595"/>
-                </a:cubicBezTo>
-                <a:cubicBezTo>
-                  <a:pt x="29141" y="252363"/>
-                  <a:pt x="34938" y="261045"/>
-                  <a:pt x="37323" y="270587"/>
-                </a:cubicBezTo>
-                <a:cubicBezTo>
-                  <a:pt x="41169" y="285972"/>
-                  <a:pt x="42480" y="301940"/>
-                  <a:pt x="46653" y="317240"/>
-                </a:cubicBezTo>
-                <a:cubicBezTo>
-                  <a:pt x="51829" y="336218"/>
-                  <a:pt x="59094" y="354563"/>
-                  <a:pt x="65314" y="373224"/>
-                </a:cubicBezTo>
-                <a:lnTo>
-                  <a:pt x="93306" y="457200"/>
-                </a:lnTo>
-                <a:lnTo>
-                  <a:pt x="102637" y="485191"/>
-                </a:lnTo>
-                <a:lnTo>
-                  <a:pt x="111967" y="513183"/>
-                </a:lnTo>
-                <a:lnTo>
-                  <a:pt x="121298" y="587828"/>
-                </a:lnTo>
-              </a:path>
-            </a:pathLst>
-          </a:custGeom>
-          <a:noFill/>
-          <a:ln w="57150">
-            <a:tailEnd type="triangle"/>
-          </a:ln>
-        </p:spPr>
-        <p:style>
-          <a:lnRef idx="2">
-            <a:schemeClr val="accent1">
-              <a:shade val="50000"/>
-            </a:schemeClr>
-          </a:lnRef>
-          <a:fillRef idx="1">
-            <a:schemeClr val="accent1"/>
-          </a:fillRef>
-          <a:effectRef idx="0">
-            <a:schemeClr val="accent1"/>
-          </a:effectRef>
-          <a:fontRef idx="minor">
-            <a:schemeClr val="lt1"/>
-          </a:fontRef>
-        </p:style>
-        <p:txBody>
-          <a:bodyPr rtlCol="0" anchor="ctr"/>
-          <a:lstStyle/>
-          <a:p>
-            <a:pPr algn="ctr"/>
-            <a:endParaRPr lang="en-US"/>
-          </a:p>
-        </p:txBody>
-      </p:sp>
-      <p:sp>
-        <p:nvSpPr>
-          <p:cNvPr id="23" name="Freeform: Shape 22">
-            <a:extLst>
-              <a:ext uri="{FF2B5EF4-FFF2-40B4-BE49-F238E27FC236}">
-                <a16:creationId xmlns:a16="http://schemas.microsoft.com/office/drawing/2014/main" id="{242233BF-68CF-4EB5-B3D9-6939F2CFEA69}"/>
-              </a:ext>
-            </a:extLst>
-          </p:cNvPr>
-          <p:cNvSpPr/>
-          <p:nvPr/>
-        </p:nvSpPr>
-        <p:spPr>
-          <a:xfrm rot="20237380">
-            <a:off x="446805" y="4943629"/>
-            <a:ext cx="114664" cy="305473"/>
-          </a:xfrm>
-          <a:custGeom>
-            <a:avLst/>
-            <a:gdLst>
-              <a:gd name="connsiteX0" fmla="*/ 0 w 121298"/>
-              <a:gd name="connsiteY0" fmla="*/ 0 h 587828"/>
-              <a:gd name="connsiteX1" fmla="*/ 9331 w 121298"/>
-              <a:gd name="connsiteY1" fmla="*/ 65314 h 587828"/>
-              <a:gd name="connsiteX2" fmla="*/ 18661 w 121298"/>
-              <a:gd name="connsiteY2" fmla="*/ 111967 h 587828"/>
-              <a:gd name="connsiteX3" fmla="*/ 27992 w 121298"/>
-              <a:gd name="connsiteY3" fmla="*/ 242595 h 587828"/>
-              <a:gd name="connsiteX4" fmla="*/ 37323 w 121298"/>
-              <a:gd name="connsiteY4" fmla="*/ 270587 h 587828"/>
-              <a:gd name="connsiteX5" fmla="*/ 46653 w 121298"/>
-              <a:gd name="connsiteY5" fmla="*/ 317240 h 587828"/>
-              <a:gd name="connsiteX6" fmla="*/ 65314 w 121298"/>
-              <a:gd name="connsiteY6" fmla="*/ 373224 h 587828"/>
-              <a:gd name="connsiteX7" fmla="*/ 93306 w 121298"/>
-              <a:gd name="connsiteY7" fmla="*/ 457200 h 587828"/>
-              <a:gd name="connsiteX8" fmla="*/ 102637 w 121298"/>
-              <a:gd name="connsiteY8" fmla="*/ 485191 h 587828"/>
-              <a:gd name="connsiteX9" fmla="*/ 111967 w 121298"/>
-              <a:gd name="connsiteY9" fmla="*/ 513183 h 587828"/>
-              <a:gd name="connsiteX10" fmla="*/ 121298 w 121298"/>
-              <a:gd name="connsiteY10" fmla="*/ 587828 h 587828"/>
-            </a:gdLst>
-            <a:ahLst/>
-            <a:cxnLst>
-              <a:cxn ang="0">
-                <a:pos x="connsiteX0" y="connsiteY0"/>
-              </a:cxn>
-              <a:cxn ang="0">
-                <a:pos x="connsiteX1" y="connsiteY1"/>
-              </a:cxn>
-              <a:cxn ang="0">
-                <a:pos x="connsiteX2" y="connsiteY2"/>
-              </a:cxn>
-              <a:cxn ang="0">
-                <a:pos x="connsiteX3" y="connsiteY3"/>
-              </a:cxn>
-              <a:cxn ang="0">
-                <a:pos x="connsiteX4" y="connsiteY4"/>
-              </a:cxn>
-              <a:cxn ang="0">
-                <a:pos x="connsiteX5" y="connsiteY5"/>
-              </a:cxn>
-              <a:cxn ang="0">
-                <a:pos x="connsiteX6" y="connsiteY6"/>
-              </a:cxn>
-              <a:cxn ang="0">
-                <a:pos x="connsiteX7" y="connsiteY7"/>
-              </a:cxn>
-              <a:cxn ang="0">
-                <a:pos x="connsiteX8" y="connsiteY8"/>
-              </a:cxn>
-              <a:cxn ang="0">
-                <a:pos x="connsiteX9" y="connsiteY9"/>
-              </a:cxn>
-              <a:cxn ang="0">
-                <a:pos x="connsiteX10" y="connsiteY10"/>
-              </a:cxn>
-            </a:cxnLst>
-            <a:rect l="l" t="t" r="r" b="b"/>
-            <a:pathLst>
-              <a:path w="121298" h="587828">
-                <a:moveTo>
-                  <a:pt x="0" y="0"/>
-                </a:moveTo>
-                <a:cubicBezTo>
-                  <a:pt x="3110" y="21771"/>
-                  <a:pt x="5716" y="43621"/>
-                  <a:pt x="9331" y="65314"/>
-                </a:cubicBezTo>
-                <a:cubicBezTo>
-                  <a:pt x="11938" y="80957"/>
-                  <a:pt x="17001" y="96195"/>
-                  <a:pt x="18661" y="111967"/>
-                </a:cubicBezTo>
-                <a:cubicBezTo>
-                  <a:pt x="23231" y="155381"/>
-                  <a:pt x="22891" y="199240"/>
-                  <a:pt x="27992" y="242595"/>
-                </a:cubicBezTo>
-                <a:cubicBezTo>
-                  <a:pt x="29141" y="252363"/>
-                  <a:pt x="34938" y="261045"/>
-                  <a:pt x="37323" y="270587"/>
-                </a:cubicBezTo>
-                <a:cubicBezTo>
-                  <a:pt x="41169" y="285972"/>
-                  <a:pt x="42480" y="301940"/>
-                  <a:pt x="46653" y="317240"/>
-                </a:cubicBezTo>
-                <a:cubicBezTo>
-                  <a:pt x="51829" y="336218"/>
-                  <a:pt x="59094" y="354563"/>
-                  <a:pt x="65314" y="373224"/>
-                </a:cubicBezTo>
-                <a:lnTo>
-                  <a:pt x="93306" y="457200"/>
-                </a:lnTo>
-                <a:lnTo>
-                  <a:pt x="102637" y="485191"/>
-                </a:lnTo>
-                <a:lnTo>
-                  <a:pt x="111967" y="513183"/>
-                </a:lnTo>
-                <a:lnTo>
-                  <a:pt x="121298" y="587828"/>
-                </a:lnTo>
-              </a:path>
-            </a:pathLst>
-          </a:custGeom>
-          <a:noFill/>
-          <a:ln w="57150">
-            <a:tailEnd type="triangle"/>
-          </a:ln>
-        </p:spPr>
-        <p:style>
-          <a:lnRef idx="2">
-            <a:schemeClr val="accent1">
-              <a:shade val="50000"/>
-            </a:schemeClr>
-          </a:lnRef>
-          <a:fillRef idx="1">
-            <a:schemeClr val="accent1"/>
-          </a:fillRef>
-          <a:effectRef idx="0">
-            <a:schemeClr val="accent1"/>
-          </a:effectRef>
-          <a:fontRef idx="minor">
-            <a:schemeClr val="lt1"/>
-          </a:fontRef>
-        </p:style>
-        <p:txBody>
-          <a:bodyPr rtlCol="0" anchor="ctr"/>
-          <a:lstStyle/>
-          <a:p>
-            <a:pPr algn="ctr"/>
-            <a:endParaRPr lang="en-US"/>
-          </a:p>
-        </p:txBody>
-      </p:sp>
-      <p:sp>
-        <p:nvSpPr>
-          <p:cNvPr id="24" name="Freeform: Shape 23">
-            <a:extLst>
-              <a:ext uri="{FF2B5EF4-FFF2-40B4-BE49-F238E27FC236}">
-                <a16:creationId xmlns:a16="http://schemas.microsoft.com/office/drawing/2014/main" id="{FFA82666-9BDA-4872-BC33-8A4A461228A0}"/>
-              </a:ext>
-            </a:extLst>
-          </p:cNvPr>
-          <p:cNvSpPr/>
-          <p:nvPr/>
-        </p:nvSpPr>
-        <p:spPr>
-          <a:xfrm rot="13135551" flipH="1">
-            <a:off x="4358426" y="2262489"/>
-            <a:ext cx="198384" cy="336757"/>
-          </a:xfrm>
-          <a:custGeom>
-            <a:avLst/>
-            <a:gdLst>
-              <a:gd name="connsiteX0" fmla="*/ 0 w 121298"/>
-              <a:gd name="connsiteY0" fmla="*/ 0 h 587828"/>
-              <a:gd name="connsiteX1" fmla="*/ 9331 w 121298"/>
-              <a:gd name="connsiteY1" fmla="*/ 65314 h 587828"/>
-              <a:gd name="connsiteX2" fmla="*/ 18661 w 121298"/>
-              <a:gd name="connsiteY2" fmla="*/ 111967 h 587828"/>
-              <a:gd name="connsiteX3" fmla="*/ 27992 w 121298"/>
-              <a:gd name="connsiteY3" fmla="*/ 242595 h 587828"/>
-              <a:gd name="connsiteX4" fmla="*/ 37323 w 121298"/>
-              <a:gd name="connsiteY4" fmla="*/ 270587 h 587828"/>
-              <a:gd name="connsiteX5" fmla="*/ 46653 w 121298"/>
-              <a:gd name="connsiteY5" fmla="*/ 317240 h 587828"/>
-              <a:gd name="connsiteX6" fmla="*/ 65314 w 121298"/>
-              <a:gd name="connsiteY6" fmla="*/ 373224 h 587828"/>
-              <a:gd name="connsiteX7" fmla="*/ 93306 w 121298"/>
-              <a:gd name="connsiteY7" fmla="*/ 457200 h 587828"/>
-              <a:gd name="connsiteX8" fmla="*/ 102637 w 121298"/>
-              <a:gd name="connsiteY8" fmla="*/ 485191 h 587828"/>
-              <a:gd name="connsiteX9" fmla="*/ 111967 w 121298"/>
-              <a:gd name="connsiteY9" fmla="*/ 513183 h 587828"/>
-              <a:gd name="connsiteX10" fmla="*/ 121298 w 121298"/>
-              <a:gd name="connsiteY10" fmla="*/ 587828 h 587828"/>
-            </a:gdLst>
-            <a:ahLst/>
-            <a:cxnLst>
-              <a:cxn ang="0">
-                <a:pos x="connsiteX0" y="connsiteY0"/>
-              </a:cxn>
-              <a:cxn ang="0">
-                <a:pos x="connsiteX1" y="connsiteY1"/>
-              </a:cxn>
-              <a:cxn ang="0">
-                <a:pos x="connsiteX2" y="connsiteY2"/>
-              </a:cxn>
-              <a:cxn ang="0">
-                <a:pos x="connsiteX3" y="connsiteY3"/>
-              </a:cxn>
-              <a:cxn ang="0">
-                <a:pos x="connsiteX4" y="connsiteY4"/>
-              </a:cxn>
-              <a:cxn ang="0">
-                <a:pos x="connsiteX5" y="connsiteY5"/>
-              </a:cxn>
-              <a:cxn ang="0">
-                <a:pos x="connsiteX6" y="connsiteY6"/>
-              </a:cxn>
-              <a:cxn ang="0">
-                <a:pos x="connsiteX7" y="connsiteY7"/>
-              </a:cxn>
-              <a:cxn ang="0">
-                <a:pos x="connsiteX8" y="connsiteY8"/>
-              </a:cxn>
-              <a:cxn ang="0">
-                <a:pos x="connsiteX9" y="connsiteY9"/>
-              </a:cxn>
-              <a:cxn ang="0">
-                <a:pos x="connsiteX10" y="connsiteY10"/>
-              </a:cxn>
-            </a:cxnLst>
-            <a:rect l="l" t="t" r="r" b="b"/>
-            <a:pathLst>
-              <a:path w="121298" h="587828">
-                <a:moveTo>
-                  <a:pt x="0" y="0"/>
-                </a:moveTo>
-                <a:cubicBezTo>
-                  <a:pt x="3110" y="21771"/>
-                  <a:pt x="5716" y="43621"/>
-                  <a:pt x="9331" y="65314"/>
-                </a:cubicBezTo>
-                <a:cubicBezTo>
-                  <a:pt x="11938" y="80957"/>
-                  <a:pt x="17001" y="96195"/>
-                  <a:pt x="18661" y="111967"/>
-                </a:cubicBezTo>
-                <a:cubicBezTo>
-                  <a:pt x="23231" y="155381"/>
-                  <a:pt x="22891" y="199240"/>
-                  <a:pt x="27992" y="242595"/>
-                </a:cubicBezTo>
-                <a:cubicBezTo>
-                  <a:pt x="29141" y="252363"/>
-                  <a:pt x="34938" y="261045"/>
-                  <a:pt x="37323" y="270587"/>
-                </a:cubicBezTo>
-                <a:cubicBezTo>
-                  <a:pt x="41169" y="285972"/>
-                  <a:pt x="42480" y="301940"/>
-                  <a:pt x="46653" y="317240"/>
-                </a:cubicBezTo>
-                <a:cubicBezTo>
-                  <a:pt x="51829" y="336218"/>
-                  <a:pt x="59094" y="354563"/>
-                  <a:pt x="65314" y="373224"/>
-                </a:cubicBezTo>
-                <a:lnTo>
-                  <a:pt x="93306" y="457200"/>
-                </a:lnTo>
-                <a:lnTo>
-                  <a:pt x="102637" y="485191"/>
-                </a:lnTo>
-                <a:lnTo>
-                  <a:pt x="111967" y="513183"/>
-                </a:lnTo>
-                <a:lnTo>
-                  <a:pt x="121298" y="587828"/>
-                </a:lnTo>
-              </a:path>
-            </a:pathLst>
-          </a:custGeom>
-          <a:noFill/>
-          <a:ln w="57150">
-            <a:tailEnd type="triangle"/>
-          </a:ln>
-        </p:spPr>
-        <p:style>
-          <a:lnRef idx="2">
-            <a:schemeClr val="accent1">
-              <a:shade val="50000"/>
-            </a:schemeClr>
-          </a:lnRef>
-          <a:fillRef idx="1">
-            <a:schemeClr val="accent1"/>
-          </a:fillRef>
-          <a:effectRef idx="0">
-            <a:schemeClr val="accent1"/>
-          </a:effectRef>
-          <a:fontRef idx="minor">
-            <a:schemeClr val="lt1"/>
-          </a:fontRef>
-        </p:style>
-        <p:txBody>
-          <a:bodyPr rtlCol="0" anchor="ctr"/>
-          <a:lstStyle/>
-          <a:p>
-            <a:pPr algn="ctr"/>
-            <a:endParaRPr lang="en-US"/>
-          </a:p>
-        </p:txBody>
-      </p:sp>
-      <p:sp>
-        <p:nvSpPr>
-          <p:cNvPr id="25" name="Freeform: Shape 24">
-            <a:extLst>
-              <a:ext uri="{FF2B5EF4-FFF2-40B4-BE49-F238E27FC236}">
-                <a16:creationId xmlns:a16="http://schemas.microsoft.com/office/drawing/2014/main" id="{951D848B-2293-43AE-9CFE-55463EF3ED35}"/>
-              </a:ext>
-            </a:extLst>
-          </p:cNvPr>
-          <p:cNvSpPr/>
-          <p:nvPr/>
-        </p:nvSpPr>
-        <p:spPr>
-          <a:xfrm rot="20839679">
-            <a:off x="10869882" y="3443836"/>
-            <a:ext cx="45719" cy="330869"/>
-          </a:xfrm>
-          <a:custGeom>
-            <a:avLst/>
-            <a:gdLst>
-              <a:gd name="connsiteX0" fmla="*/ 0 w 121298"/>
-              <a:gd name="connsiteY0" fmla="*/ 0 h 587828"/>
-              <a:gd name="connsiteX1" fmla="*/ 9331 w 121298"/>
-              <a:gd name="connsiteY1" fmla="*/ 65314 h 587828"/>
-              <a:gd name="connsiteX2" fmla="*/ 18661 w 121298"/>
-              <a:gd name="connsiteY2" fmla="*/ 111967 h 587828"/>
-              <a:gd name="connsiteX3" fmla="*/ 27992 w 121298"/>
-              <a:gd name="connsiteY3" fmla="*/ 242595 h 587828"/>
-              <a:gd name="connsiteX4" fmla="*/ 37323 w 121298"/>
-              <a:gd name="connsiteY4" fmla="*/ 270587 h 587828"/>
-              <a:gd name="connsiteX5" fmla="*/ 46653 w 121298"/>
-              <a:gd name="connsiteY5" fmla="*/ 317240 h 587828"/>
-              <a:gd name="connsiteX6" fmla="*/ 65314 w 121298"/>
-              <a:gd name="connsiteY6" fmla="*/ 373224 h 587828"/>
-              <a:gd name="connsiteX7" fmla="*/ 93306 w 121298"/>
-              <a:gd name="connsiteY7" fmla="*/ 457200 h 587828"/>
-              <a:gd name="connsiteX8" fmla="*/ 102637 w 121298"/>
-              <a:gd name="connsiteY8" fmla="*/ 485191 h 587828"/>
-              <a:gd name="connsiteX9" fmla="*/ 111967 w 121298"/>
-              <a:gd name="connsiteY9" fmla="*/ 513183 h 587828"/>
-              <a:gd name="connsiteX10" fmla="*/ 121298 w 121298"/>
-              <a:gd name="connsiteY10" fmla="*/ 587828 h 587828"/>
-            </a:gdLst>
-            <a:ahLst/>
-            <a:cxnLst>
-              <a:cxn ang="0">
-                <a:pos x="connsiteX0" y="connsiteY0"/>
-              </a:cxn>
-              <a:cxn ang="0">
-                <a:pos x="connsiteX1" y="connsiteY1"/>
-              </a:cxn>
-              <a:cxn ang="0">
-                <a:pos x="connsiteX2" y="connsiteY2"/>
-              </a:cxn>
-              <a:cxn ang="0">
-                <a:pos x="connsiteX3" y="connsiteY3"/>
-              </a:cxn>
-              <a:cxn ang="0">
-                <a:pos x="connsiteX4" y="connsiteY4"/>
-              </a:cxn>
-              <a:cxn ang="0">
-                <a:pos x="connsiteX5" y="connsiteY5"/>
-              </a:cxn>
-              <a:cxn ang="0">
-                <a:pos x="connsiteX6" y="connsiteY6"/>
-              </a:cxn>
-              <a:cxn ang="0">
-                <a:pos x="connsiteX7" y="connsiteY7"/>
-              </a:cxn>
-              <a:cxn ang="0">
-                <a:pos x="connsiteX8" y="connsiteY8"/>
-              </a:cxn>
-              <a:cxn ang="0">
-                <a:pos x="connsiteX9" y="connsiteY9"/>
-              </a:cxn>
-              <a:cxn ang="0">
-                <a:pos x="connsiteX10" y="connsiteY10"/>
-              </a:cxn>
-            </a:cxnLst>
-            <a:rect l="l" t="t" r="r" b="b"/>
-            <a:pathLst>
-              <a:path w="121298" h="587828">
-                <a:moveTo>
-                  <a:pt x="0" y="0"/>
-                </a:moveTo>
-                <a:cubicBezTo>
-                  <a:pt x="3110" y="21771"/>
-                  <a:pt x="5716" y="43621"/>
-                  <a:pt x="9331" y="65314"/>
-                </a:cubicBezTo>
-                <a:cubicBezTo>
-                  <a:pt x="11938" y="80957"/>
-                  <a:pt x="17001" y="96195"/>
-                  <a:pt x="18661" y="111967"/>
-                </a:cubicBezTo>
-                <a:cubicBezTo>
-                  <a:pt x="23231" y="155381"/>
-                  <a:pt x="22891" y="199240"/>
-                  <a:pt x="27992" y="242595"/>
-                </a:cubicBezTo>
-                <a:cubicBezTo>
-                  <a:pt x="29141" y="252363"/>
-                  <a:pt x="34938" y="261045"/>
-                  <a:pt x="37323" y="270587"/>
-                </a:cubicBezTo>
-                <a:cubicBezTo>
-                  <a:pt x="41169" y="285972"/>
-                  <a:pt x="42480" y="301940"/>
-                  <a:pt x="46653" y="317240"/>
-                </a:cubicBezTo>
-                <a:cubicBezTo>
-                  <a:pt x="51829" y="336218"/>
-                  <a:pt x="59094" y="354563"/>
-                  <a:pt x="65314" y="373224"/>
-                </a:cubicBezTo>
-                <a:lnTo>
-                  <a:pt x="93306" y="457200"/>
-                </a:lnTo>
-                <a:lnTo>
-                  <a:pt x="102637" y="485191"/>
-                </a:lnTo>
-                <a:lnTo>
-                  <a:pt x="111967" y="513183"/>
-                </a:lnTo>
-                <a:lnTo>
-                  <a:pt x="121298" y="587828"/>
-                </a:lnTo>
-              </a:path>
-            </a:pathLst>
-          </a:custGeom>
-          <a:noFill/>
-          <a:ln w="57150">
-            <a:tailEnd type="triangle"/>
-          </a:ln>
-        </p:spPr>
-        <p:style>
-          <a:lnRef idx="2">
-            <a:schemeClr val="accent1">
-              <a:shade val="50000"/>
-            </a:schemeClr>
-          </a:lnRef>
-          <a:fillRef idx="1">
-            <a:schemeClr val="accent1"/>
-          </a:fillRef>
-          <a:effectRef idx="0">
-            <a:schemeClr val="accent1"/>
-          </a:effectRef>
-          <a:fontRef idx="minor">
-            <a:schemeClr val="lt1"/>
-          </a:fontRef>
-        </p:style>
-        <p:txBody>
-          <a:bodyPr rtlCol="0" anchor="ctr"/>
-          <a:lstStyle/>
-          <a:p>
-            <a:pPr algn="ctr"/>
-            <a:endParaRPr lang="en-US"/>
-          </a:p>
-        </p:txBody>
-      </p:sp>
-    </p:spTree>
-    <p:extLst>
-      <p:ext uri="{BB962C8B-B14F-4D97-AF65-F5344CB8AC3E}">
-        <p14:creationId xmlns:p14="http://schemas.microsoft.com/office/powerpoint/2010/main" val="3985899822"/>
       </p:ext>
     </p:extLst>
   </p:cSld>
@@ -26249,6 +23001,217 @@
       </p:par>
     </p:tnLst>
   </p:timing>
+</p:sld>
+</file>
+
+<file path=ppt/slides/slide20.xml><?xml version="1.0" encoding="utf-8"?>
+<p:sld xmlns:a="http://schemas.openxmlformats.org/drawingml/2006/main" xmlns:r="http://schemas.openxmlformats.org/officeDocument/2006/relationships" xmlns:p="http://schemas.openxmlformats.org/presentationml/2006/main">
+  <p:cSld>
+    <p:spTree>
+      <p:nvGrpSpPr>
+        <p:cNvPr id="1" name=""/>
+        <p:cNvGrpSpPr/>
+        <p:nvPr/>
+      </p:nvGrpSpPr>
+      <p:grpSpPr>
+        <a:xfrm>
+          <a:off x="0" y="0"/>
+          <a:ext cx="0" cy="0"/>
+          <a:chOff x="0" y="0"/>
+          <a:chExt cx="0" cy="0"/>
+        </a:xfrm>
+      </p:grpSpPr>
+      <p:sp>
+        <p:nvSpPr>
+          <p:cNvPr id="5" name="Title 4">
+            <a:extLst>
+              <a:ext uri="{FF2B5EF4-FFF2-40B4-BE49-F238E27FC236}">
+                <a16:creationId xmlns:a16="http://schemas.microsoft.com/office/drawing/2014/main" id="{307DE1FA-3DA6-4D03-AEE0-B09F1A80C165}"/>
+              </a:ext>
+            </a:extLst>
+          </p:cNvPr>
+          <p:cNvSpPr>
+            <a:spLocks noGrp="1"/>
+          </p:cNvSpPr>
+          <p:nvPr>
+            <p:ph type="title"/>
+          </p:nvPr>
+        </p:nvSpPr>
+        <p:spPr>
+          <a:xfrm>
+            <a:off x="685801" y="311727"/>
+            <a:ext cx="10396882" cy="1151965"/>
+          </a:xfrm>
+        </p:spPr>
+        <p:txBody>
+          <a:bodyPr/>
+          <a:lstStyle/>
+          <a:p>
+            <a:r>
+              <a:rPr lang="en-US" dirty="0"/>
+              <a:t>Links</a:t>
+            </a:r>
+          </a:p>
+        </p:txBody>
+      </p:sp>
+      <p:sp>
+        <p:nvSpPr>
+          <p:cNvPr id="6" name="TextBox 5">
+            <a:extLst>
+              <a:ext uri="{FF2B5EF4-FFF2-40B4-BE49-F238E27FC236}">
+                <a16:creationId xmlns:a16="http://schemas.microsoft.com/office/drawing/2014/main" id="{5E4B5739-93ED-4CC1-91CA-B51CC6D1E894}"/>
+              </a:ext>
+            </a:extLst>
+          </p:cNvPr>
+          <p:cNvSpPr txBox="1"/>
+          <p:nvPr/>
+        </p:nvSpPr>
+        <p:spPr>
+          <a:xfrm>
+            <a:off x="936134" y="1336119"/>
+            <a:ext cx="10570065" cy="4185761"/>
+          </a:xfrm>
+          <a:prstGeom prst="rect">
+            <a:avLst/>
+          </a:prstGeom>
+          <a:noFill/>
+        </p:spPr>
+        <p:txBody>
+          <a:bodyPr wrap="square" rtlCol="0">
+            <a:spAutoFit/>
+          </a:bodyPr>
+          <a:lstStyle/>
+          <a:p>
+            <a:r>
+              <a:rPr lang="en-US" sz="1400" dirty="0"/>
+              <a:t>PPT Presentation</a:t>
+            </a:r>
+          </a:p>
+          <a:p>
+            <a:r>
+              <a:rPr lang="en-US" sz="1400" dirty="0">
+                <a:hlinkClick r:id="rId2"/>
+              </a:rPr>
+              <a:t>https://github.com/loriepeach1/project3_iowa/blob/master/other/presentation.pptx</a:t>
+            </a:r>
+            <a:endParaRPr lang="en-US" sz="1400" dirty="0"/>
+          </a:p>
+          <a:p>
+            <a:endParaRPr lang="en-US" sz="1400" dirty="0"/>
+          </a:p>
+          <a:p>
+            <a:r>
+              <a:rPr lang="en-US" sz="1400" dirty="0"/>
+              <a:t>ARIMA Model </a:t>
+            </a:r>
+          </a:p>
+          <a:p>
+            <a:r>
+              <a:rPr lang="en-US" sz="1400" dirty="0">
+                <a:hlinkClick r:id="rId3"/>
+              </a:rPr>
+              <a:t>https://github.com/loriepeach1/project3_iowa</a:t>
+            </a:r>
+            <a:endParaRPr lang="en-US" sz="1400" dirty="0"/>
+          </a:p>
+          <a:p>
+            <a:endParaRPr lang="en-US" sz="1400" dirty="0"/>
+          </a:p>
+          <a:p>
+            <a:r>
+              <a:rPr lang="en-US" sz="1400" dirty="0"/>
+              <a:t>Tableau Dashboard Forecast vs. Actual </a:t>
+            </a:r>
+          </a:p>
+          <a:p>
+            <a:r>
+              <a:rPr lang="en-US" sz="1400" u="sng" dirty="0">
+                <a:hlinkClick r:id="rId4"/>
+              </a:rPr>
+              <a:t>https://public.tableau.com/profile/farah.clerveau#!/vizhome/Iowa_Tableau/HoltsWinter?publish=yes</a:t>
+            </a:r>
+            <a:endParaRPr lang="en-US" sz="1400" dirty="0"/>
+          </a:p>
+          <a:p>
+            <a:endParaRPr lang="en-US" sz="1400" dirty="0"/>
+          </a:p>
+          <a:p>
+            <a:r>
+              <a:rPr lang="en-US" sz="1400" dirty="0"/>
+              <a:t>R Studio – Holt Winters Method </a:t>
+            </a:r>
+          </a:p>
+          <a:p>
+            <a:r>
+              <a:rPr lang="en-US" sz="1400" dirty="0"/>
+              <a:t>Includes screen images of </a:t>
+            </a:r>
+            <a:r>
+              <a:rPr lang="en-US" sz="1400" dirty="0" err="1"/>
+              <a:t>Tableu</a:t>
+            </a:r>
+            <a:r>
+              <a:rPr lang="en-US" sz="1400" dirty="0"/>
+              <a:t> used for analysis.   (File is too large to upload.)</a:t>
+            </a:r>
+          </a:p>
+          <a:p>
+            <a:r>
+              <a:rPr lang="en-US" sz="1400" dirty="0">
+                <a:hlinkClick r:id="rId5"/>
+              </a:rPr>
+              <a:t>https://github.com/adrianjackson86/Final_Project_AJ.git</a:t>
+            </a:r>
+            <a:endParaRPr lang="en-US" sz="1400" dirty="0"/>
+          </a:p>
+          <a:p>
+            <a:endParaRPr lang="en-US" sz="1400" dirty="0"/>
+          </a:p>
+          <a:p>
+            <a:r>
+              <a:rPr lang="en-US" sz="1400" dirty="0"/>
+              <a:t>Linear Regression</a:t>
+            </a:r>
+          </a:p>
+          <a:p>
+            <a:r>
+              <a:rPr lang="en-US" sz="1400" dirty="0">
+                <a:hlinkClick r:id="rId6"/>
+              </a:rPr>
+              <a:t>https://github.com/franciskbg/Machine_Learning_Alchohol_sales_Prediction</a:t>
+            </a:r>
+            <a:endParaRPr lang="en-US" sz="1400" dirty="0"/>
+          </a:p>
+          <a:p>
+            <a:endParaRPr lang="en-US" sz="1400" dirty="0"/>
+          </a:p>
+          <a:p>
+            <a:r>
+              <a:rPr lang="en-US" sz="1400" dirty="0"/>
+              <a:t>Dataset</a:t>
+            </a:r>
+          </a:p>
+          <a:p>
+            <a:r>
+              <a:rPr lang="en-US" sz="1400" dirty="0">
+                <a:hlinkClick r:id="rId7"/>
+              </a:rPr>
+              <a:t>https://console.cloud.google.com/marketplace/details/iowa-department-of-commerce/iowa-liquor-sales?filter=solution-type:dataset&amp;filter=category:machine-learning&amp;id=18f0a495-8e20-4124-a349-0c4c167b60ab</a:t>
+            </a:r>
+            <a:endParaRPr lang="en-US" sz="1400" dirty="0"/>
+          </a:p>
+        </p:txBody>
+      </p:sp>
+    </p:spTree>
+    <p:extLst>
+      <p:ext uri="{BB962C8B-B14F-4D97-AF65-F5344CB8AC3E}">
+        <p14:creationId xmlns:p14="http://schemas.microsoft.com/office/powerpoint/2010/main" val="2556030527"/>
+      </p:ext>
+    </p:extLst>
+  </p:cSld>
+  <p:clrMapOvr>
+    <a:masterClrMapping/>
+  </p:clrMapOvr>
 </p:sld>
 </file>
 

</xml_diff>